<commit_message>
Characters and Strings Lecture update
</commit_message>
<xml_diff>
--- a/slides/On-Campus/02_03_CharactersAndStrings.pptx
+++ b/slides/On-Campus/02_03_CharactersAndStrings.pptx
@@ -5,10 +5,10 @@
     <p:sldMasterId id="2147483648" r:id="rId4"/>
   </p:sldMasterIdLst>
   <p:notesMasterIdLst>
-    <p:notesMasterId r:id="rId25"/>
+    <p:notesMasterId r:id="rId30"/>
   </p:notesMasterIdLst>
   <p:handoutMasterIdLst>
-    <p:handoutMasterId r:id="rId26"/>
+    <p:handoutMasterId r:id="rId31"/>
   </p:handoutMasterIdLst>
   <p:sldIdLst>
     <p:sldId id="256" r:id="rId5"/>
@@ -19,18 +19,23 @@
     <p:sldId id="271" r:id="rId10"/>
     <p:sldId id="272" r:id="rId11"/>
     <p:sldId id="267" r:id="rId12"/>
-    <p:sldId id="258" r:id="rId13"/>
-    <p:sldId id="259" r:id="rId14"/>
-    <p:sldId id="260" r:id="rId15"/>
+    <p:sldId id="279" r:id="rId13"/>
+    <p:sldId id="280" r:id="rId14"/>
+    <p:sldId id="281" r:id="rId15"/>
     <p:sldId id="277" r:id="rId16"/>
     <p:sldId id="269" r:id="rId17"/>
     <p:sldId id="257" r:id="rId18"/>
     <p:sldId id="275" r:id="rId19"/>
-    <p:sldId id="263" r:id="rId20"/>
-    <p:sldId id="276" r:id="rId21"/>
-    <p:sldId id="265" r:id="rId22"/>
-    <p:sldId id="273" r:id="rId23"/>
-    <p:sldId id="278" r:id="rId24"/>
+    <p:sldId id="282" r:id="rId20"/>
+    <p:sldId id="283" r:id="rId21"/>
+    <p:sldId id="263" r:id="rId22"/>
+    <p:sldId id="276" r:id="rId23"/>
+    <p:sldId id="265" r:id="rId24"/>
+    <p:sldId id="273" r:id="rId25"/>
+    <p:sldId id="285" r:id="rId26"/>
+    <p:sldId id="284" r:id="rId27"/>
+    <p:sldId id="286" r:id="rId28"/>
+    <p:sldId id="278" r:id="rId29"/>
   </p:sldIdLst>
   <p:sldSz cx="13817600" cy="7772400"/>
   <p:notesSz cx="6858000" cy="9144000"/>
@@ -151,6 +156,379 @@
 </p:presentation>
 </file>
 
+<file path=ppt/changesInfos/changesInfo1.xml><?xml version="1.0" encoding="utf-8"?>
+<pc:chgInfo xmlns:a="http://schemas.openxmlformats.org/drawingml/2006/main" xmlns:r="http://schemas.openxmlformats.org/officeDocument/2006/relationships" xmlns:ac="http://schemas.microsoft.com/office/drawing/2013/main/command" xmlns:pc="http://schemas.microsoft.com/office/powerpoint/2013/main/command">
+  <pc:docChgLst>
+    <pc:chgData name="Marcia Moraes" userId="c9c67e8a-58e2-4733-9a1c-5d44fec4775b" providerId="ADAL" clId="{782DD80B-8497-4C78-88BF-7159EC0EB292}"/>
+    <pc:docChg chg="custSel addSld delSld modSld sldOrd">
+      <pc:chgData name="Marcia Moraes" userId="c9c67e8a-58e2-4733-9a1c-5d44fec4775b" providerId="ADAL" clId="{782DD80B-8497-4C78-88BF-7159EC0EB292}" dt="2023-08-10T21:09:24.931" v="146"/>
+      <pc:docMkLst>
+        <pc:docMk/>
+      </pc:docMkLst>
+      <pc:sldChg chg="delSp">
+        <pc:chgData name="Marcia Moraes" userId="c9c67e8a-58e2-4733-9a1c-5d44fec4775b" providerId="ADAL" clId="{782DD80B-8497-4C78-88BF-7159EC0EB292}" dt="2023-08-10T17:03:12.043" v="46" actId="478"/>
+        <pc:sldMkLst>
+          <pc:docMk/>
+          <pc:sldMk cId="482869905" sldId="257"/>
+        </pc:sldMkLst>
+        <pc:picChg chg="del">
+          <ac:chgData name="Marcia Moraes" userId="c9c67e8a-58e2-4733-9a1c-5d44fec4775b" providerId="ADAL" clId="{782DD80B-8497-4C78-88BF-7159EC0EB292}" dt="2023-08-10T17:03:12.043" v="46" actId="478"/>
+          <ac:picMkLst>
+            <pc:docMk/>
+            <pc:sldMk cId="482869905" sldId="257"/>
+            <ac:picMk id="1026" creationId="{BD4EDBCB-50BF-A44E-9ACE-664BDDA0ADF6}"/>
+          </ac:picMkLst>
+        </pc:picChg>
+      </pc:sldChg>
+      <pc:sldChg chg="modSp add del">
+        <pc:chgData name="Marcia Moraes" userId="c9c67e8a-58e2-4733-9a1c-5d44fec4775b" providerId="ADAL" clId="{782DD80B-8497-4C78-88BF-7159EC0EB292}" dt="2023-08-10T16:59:03.098" v="41" actId="2696"/>
+        <pc:sldMkLst>
+          <pc:docMk/>
+          <pc:sldMk cId="3146645207" sldId="258"/>
+        </pc:sldMkLst>
+        <pc:spChg chg="mod">
+          <ac:chgData name="Marcia Moraes" userId="c9c67e8a-58e2-4733-9a1c-5d44fec4775b" providerId="ADAL" clId="{782DD80B-8497-4C78-88BF-7159EC0EB292}" dt="2023-08-10T16:57:57.022" v="37" actId="20577"/>
+          <ac:spMkLst>
+            <pc:docMk/>
+            <pc:sldMk cId="3146645207" sldId="258"/>
+            <ac:spMk id="3" creationId="{BE65F122-2B5E-194D-8CC7-FF10DD3264C1}"/>
+          </ac:spMkLst>
+        </pc:spChg>
+      </pc:sldChg>
+      <pc:sldChg chg="del">
+        <pc:chgData name="Marcia Moraes" userId="c9c67e8a-58e2-4733-9a1c-5d44fec4775b" providerId="ADAL" clId="{782DD80B-8497-4C78-88BF-7159EC0EB292}" dt="2023-08-10T16:59:26.398" v="42" actId="2696"/>
+        <pc:sldMkLst>
+          <pc:docMk/>
+          <pc:sldMk cId="1168442721" sldId="259"/>
+        </pc:sldMkLst>
+      </pc:sldChg>
+      <pc:sldChg chg="del">
+        <pc:chgData name="Marcia Moraes" userId="c9c67e8a-58e2-4733-9a1c-5d44fec4775b" providerId="ADAL" clId="{782DD80B-8497-4C78-88BF-7159EC0EB292}" dt="2023-08-10T17:00:22.846" v="45" actId="2696"/>
+        <pc:sldMkLst>
+          <pc:docMk/>
+          <pc:sldMk cId="709799232" sldId="260"/>
+        </pc:sldMkLst>
+      </pc:sldChg>
+      <pc:sldChg chg="modSp">
+        <pc:chgData name="Marcia Moraes" userId="c9c67e8a-58e2-4733-9a1c-5d44fec4775b" providerId="ADAL" clId="{782DD80B-8497-4C78-88BF-7159EC0EB292}" dt="2023-08-10T16:44:42.944" v="3" actId="14100"/>
+        <pc:sldMkLst>
+          <pc:docMk/>
+          <pc:sldMk cId="876244202" sldId="266"/>
+        </pc:sldMkLst>
+        <pc:spChg chg="mod">
+          <ac:chgData name="Marcia Moraes" userId="c9c67e8a-58e2-4733-9a1c-5d44fec4775b" providerId="ADAL" clId="{782DD80B-8497-4C78-88BF-7159EC0EB292}" dt="2023-08-10T16:44:37.002" v="2" actId="14"/>
+          <ac:spMkLst>
+            <pc:docMk/>
+            <pc:sldMk cId="876244202" sldId="266"/>
+            <ac:spMk id="5" creationId="{D45B7610-981A-7441-A483-AB5BABDA0AB4}"/>
+          </ac:spMkLst>
+        </pc:spChg>
+        <pc:picChg chg="mod">
+          <ac:chgData name="Marcia Moraes" userId="c9c67e8a-58e2-4733-9a1c-5d44fec4775b" providerId="ADAL" clId="{782DD80B-8497-4C78-88BF-7159EC0EB292}" dt="2023-08-10T16:44:42.944" v="3" actId="14100"/>
+          <ac:picMkLst>
+            <pc:docMk/>
+            <pc:sldMk cId="876244202" sldId="266"/>
+            <ac:picMk id="1026" creationId="{1F717CB0-92E6-4EB8-80C2-70E21F159AED}"/>
+          </ac:picMkLst>
+        </pc:picChg>
+      </pc:sldChg>
+      <pc:sldChg chg="modSp">
+        <pc:chgData name="Marcia Moraes" userId="c9c67e8a-58e2-4733-9a1c-5d44fec4775b" providerId="ADAL" clId="{782DD80B-8497-4C78-88BF-7159EC0EB292}" dt="2023-08-10T16:45:10.742" v="24" actId="20577"/>
+        <pc:sldMkLst>
+          <pc:docMk/>
+          <pc:sldMk cId="2614426722" sldId="268"/>
+        </pc:sldMkLst>
+        <pc:spChg chg="mod">
+          <ac:chgData name="Marcia Moraes" userId="c9c67e8a-58e2-4733-9a1c-5d44fec4775b" providerId="ADAL" clId="{782DD80B-8497-4C78-88BF-7159EC0EB292}" dt="2023-08-10T16:45:10.742" v="24" actId="20577"/>
+          <ac:spMkLst>
+            <pc:docMk/>
+            <pc:sldMk cId="2614426722" sldId="268"/>
+            <ac:spMk id="3" creationId="{BF92A239-A7CC-0648-A509-B3B45DB8F5FA}"/>
+          </ac:spMkLst>
+        </pc:spChg>
+      </pc:sldChg>
+      <pc:sldChg chg="modSp">
+        <pc:chgData name="Marcia Moraes" userId="c9c67e8a-58e2-4733-9a1c-5d44fec4775b" providerId="ADAL" clId="{782DD80B-8497-4C78-88BF-7159EC0EB292}" dt="2023-08-10T16:53:53.714" v="32" actId="255"/>
+        <pc:sldMkLst>
+          <pc:docMk/>
+          <pc:sldMk cId="2322425887" sldId="270"/>
+        </pc:sldMkLst>
+        <pc:spChg chg="mod">
+          <ac:chgData name="Marcia Moraes" userId="c9c67e8a-58e2-4733-9a1c-5d44fec4775b" providerId="ADAL" clId="{782DD80B-8497-4C78-88BF-7159EC0EB292}" dt="2023-08-10T16:53:53.714" v="32" actId="255"/>
+          <ac:spMkLst>
+            <pc:docMk/>
+            <pc:sldMk cId="2322425887" sldId="270"/>
+            <ac:spMk id="8" creationId="{00000000-0000-0000-0000-000000000000}"/>
+          </ac:spMkLst>
+        </pc:spChg>
+      </pc:sldChg>
+      <pc:sldChg chg="addSp delSp modSp delAnim modAnim">
+        <pc:chgData name="Marcia Moraes" userId="c9c67e8a-58e2-4733-9a1c-5d44fec4775b" providerId="ADAL" clId="{782DD80B-8497-4C78-88BF-7159EC0EB292}" dt="2023-08-10T21:09:24.931" v="146"/>
+        <pc:sldMkLst>
+          <pc:docMk/>
+          <pc:sldMk cId="2264662996" sldId="273"/>
+        </pc:sldMkLst>
+        <pc:spChg chg="mod">
+          <ac:chgData name="Marcia Moraes" userId="c9c67e8a-58e2-4733-9a1c-5d44fec4775b" providerId="ADAL" clId="{782DD80B-8497-4C78-88BF-7159EC0EB292}" dt="2023-08-10T21:09:21.334" v="145" actId="20577"/>
+          <ac:spMkLst>
+            <pc:docMk/>
+            <pc:sldMk cId="2264662996" sldId="273"/>
+            <ac:spMk id="6" creationId="{61A47B75-5CF5-8148-89FC-032FCDA5013B}"/>
+          </ac:spMkLst>
+        </pc:spChg>
+        <pc:spChg chg="del">
+          <ac:chgData name="Marcia Moraes" userId="c9c67e8a-58e2-4733-9a1c-5d44fec4775b" providerId="ADAL" clId="{782DD80B-8497-4C78-88BF-7159EC0EB292}" dt="2023-08-10T20:56:29.322" v="96" actId="478"/>
+          <ac:spMkLst>
+            <pc:docMk/>
+            <pc:sldMk cId="2264662996" sldId="273"/>
+            <ac:spMk id="7" creationId="{61A47B75-5CF5-8148-89FC-032FCDA5013B}"/>
+          </ac:spMkLst>
+        </pc:spChg>
+        <pc:spChg chg="del">
+          <ac:chgData name="Marcia Moraes" userId="c9c67e8a-58e2-4733-9a1c-5d44fec4775b" providerId="ADAL" clId="{782DD80B-8497-4C78-88BF-7159EC0EB292}" dt="2023-08-10T20:56:30.934" v="97" actId="478"/>
+          <ac:spMkLst>
+            <pc:docMk/>
+            <pc:sldMk cId="2264662996" sldId="273"/>
+            <ac:spMk id="8" creationId="{61A47B75-5CF5-8148-89FC-032FCDA5013B}"/>
+          </ac:spMkLst>
+        </pc:spChg>
+        <pc:picChg chg="add mod modCrop">
+          <ac:chgData name="Marcia Moraes" userId="c9c67e8a-58e2-4733-9a1c-5d44fec4775b" providerId="ADAL" clId="{782DD80B-8497-4C78-88BF-7159EC0EB292}" dt="2023-08-10T20:57:24.693" v="104" actId="1076"/>
+          <ac:picMkLst>
+            <pc:docMk/>
+            <pc:sldMk cId="2264662996" sldId="273"/>
+            <ac:picMk id="3" creationId="{86A5ECAB-7AB0-420D-B935-6E9DB4268B7B}"/>
+          </ac:picMkLst>
+        </pc:picChg>
+      </pc:sldChg>
+      <pc:sldChg chg="modSp">
+        <pc:chgData name="Marcia Moraes" userId="c9c67e8a-58e2-4733-9a1c-5d44fec4775b" providerId="ADAL" clId="{782DD80B-8497-4C78-88BF-7159EC0EB292}" dt="2023-08-10T16:53:29.208" v="31" actId="6549"/>
+        <pc:sldMkLst>
+          <pc:docMk/>
+          <pc:sldMk cId="160463758" sldId="274"/>
+        </pc:sldMkLst>
+        <pc:spChg chg="mod">
+          <ac:chgData name="Marcia Moraes" userId="c9c67e8a-58e2-4733-9a1c-5d44fec4775b" providerId="ADAL" clId="{782DD80B-8497-4C78-88BF-7159EC0EB292}" dt="2023-08-10T16:53:29.208" v="31" actId="6549"/>
+          <ac:spMkLst>
+            <pc:docMk/>
+            <pc:sldMk cId="160463758" sldId="274"/>
+            <ac:spMk id="5" creationId="{B660E42F-A030-8247-8A16-084F302E6354}"/>
+          </ac:spMkLst>
+        </pc:spChg>
+        <pc:spChg chg="mod">
+          <ac:chgData name="Marcia Moraes" userId="c9c67e8a-58e2-4733-9a1c-5d44fec4775b" providerId="ADAL" clId="{782DD80B-8497-4C78-88BF-7159EC0EB292}" dt="2023-08-10T16:52:58.010" v="28" actId="1076"/>
+          <ac:spMkLst>
+            <pc:docMk/>
+            <pc:sldMk cId="160463758" sldId="274"/>
+            <ac:spMk id="6" creationId="{0D646D64-CCCE-4C18-BF92-92BEA82B8BC9}"/>
+          </ac:spMkLst>
+        </pc:spChg>
+      </pc:sldChg>
+      <pc:sldChg chg="modTransition">
+        <pc:chgData name="Marcia Moraes" userId="c9c67e8a-58e2-4733-9a1c-5d44fec4775b" providerId="ADAL" clId="{782DD80B-8497-4C78-88BF-7159EC0EB292}" dt="2023-08-10T20:58:30.087" v="107"/>
+        <pc:sldMkLst>
+          <pc:docMk/>
+          <pc:sldMk cId="2552361361" sldId="278"/>
+        </pc:sldMkLst>
+      </pc:sldChg>
+      <pc:sldChg chg="add">
+        <pc:chgData name="Marcia Moraes" userId="c9c67e8a-58e2-4733-9a1c-5d44fec4775b" providerId="ADAL" clId="{782DD80B-8497-4C78-88BF-7159EC0EB292}" dt="2023-08-10T16:58:30.572" v="38"/>
+        <pc:sldMkLst>
+          <pc:docMk/>
+          <pc:sldMk cId="1175657051" sldId="279"/>
+        </pc:sldMkLst>
+      </pc:sldChg>
+      <pc:sldChg chg="modSp add">
+        <pc:chgData name="Marcia Moraes" userId="c9c67e8a-58e2-4733-9a1c-5d44fec4775b" providerId="ADAL" clId="{782DD80B-8497-4C78-88BF-7159EC0EB292}" dt="2023-08-10T17:00:14.821" v="44" actId="14100"/>
+        <pc:sldMkLst>
+          <pc:docMk/>
+          <pc:sldMk cId="3534300162" sldId="281"/>
+        </pc:sldMkLst>
+        <pc:spChg chg="mod">
+          <ac:chgData name="Marcia Moraes" userId="c9c67e8a-58e2-4733-9a1c-5d44fec4775b" providerId="ADAL" clId="{782DD80B-8497-4C78-88BF-7159EC0EB292}" dt="2023-08-10T17:00:14.821" v="44" actId="14100"/>
+          <ac:spMkLst>
+            <pc:docMk/>
+            <pc:sldMk cId="3534300162" sldId="281"/>
+            <ac:spMk id="3" creationId="{5917E1AE-69D5-6C45-B867-FE376B246A13}"/>
+          </ac:spMkLst>
+        </pc:spChg>
+      </pc:sldChg>
+      <pc:sldChg chg="addSp delSp modSp add">
+        <pc:chgData name="Marcia Moraes" userId="c9c67e8a-58e2-4733-9a1c-5d44fec4775b" providerId="ADAL" clId="{782DD80B-8497-4C78-88BF-7159EC0EB292}" dt="2023-08-10T17:11:38.657" v="56" actId="1076"/>
+        <pc:sldMkLst>
+          <pc:docMk/>
+          <pc:sldMk cId="1614057216" sldId="282"/>
+        </pc:sldMkLst>
+        <pc:spChg chg="del">
+          <ac:chgData name="Marcia Moraes" userId="c9c67e8a-58e2-4733-9a1c-5d44fec4775b" providerId="ADAL" clId="{782DD80B-8497-4C78-88BF-7159EC0EB292}" dt="2023-08-10T17:10:50.610" v="48" actId="478"/>
+          <ac:spMkLst>
+            <pc:docMk/>
+            <pc:sldMk cId="1614057216" sldId="282"/>
+            <ac:spMk id="3" creationId="{E94F0243-6D59-E442-BBF0-CCD40CD0F3CA}"/>
+          </ac:spMkLst>
+        </pc:spChg>
+        <pc:spChg chg="add del mod">
+          <ac:chgData name="Marcia Moraes" userId="c9c67e8a-58e2-4733-9a1c-5d44fec4775b" providerId="ADAL" clId="{782DD80B-8497-4C78-88BF-7159EC0EB292}" dt="2023-08-10T17:10:53.185" v="49" actId="478"/>
+          <ac:spMkLst>
+            <pc:docMk/>
+            <pc:sldMk cId="1614057216" sldId="282"/>
+            <ac:spMk id="5" creationId="{8139A48B-9655-4BAC-B311-F2A869A03220}"/>
+          </ac:spMkLst>
+        </pc:spChg>
+        <pc:picChg chg="add mod modCrop">
+          <ac:chgData name="Marcia Moraes" userId="c9c67e8a-58e2-4733-9a1c-5d44fec4775b" providerId="ADAL" clId="{782DD80B-8497-4C78-88BF-7159EC0EB292}" dt="2023-08-10T17:11:38.657" v="56" actId="1076"/>
+          <ac:picMkLst>
+            <pc:docMk/>
+            <pc:sldMk cId="1614057216" sldId="282"/>
+            <ac:picMk id="6" creationId="{36AC8121-D986-4F38-BBCF-5BF6C8B5DFEF}"/>
+          </ac:picMkLst>
+        </pc:picChg>
+      </pc:sldChg>
+      <pc:sldChg chg="addSp delSp modSp add">
+        <pc:chgData name="Marcia Moraes" userId="c9c67e8a-58e2-4733-9a1c-5d44fec4775b" providerId="ADAL" clId="{782DD80B-8497-4C78-88BF-7159EC0EB292}" dt="2023-08-10T20:08:31.584" v="94" actId="1076"/>
+        <pc:sldMkLst>
+          <pc:docMk/>
+          <pc:sldMk cId="2136151688" sldId="283"/>
+        </pc:sldMkLst>
+        <pc:spChg chg="mod">
+          <ac:chgData name="Marcia Moraes" userId="c9c67e8a-58e2-4733-9a1c-5d44fec4775b" providerId="ADAL" clId="{782DD80B-8497-4C78-88BF-7159EC0EB292}" dt="2023-08-10T20:00:51.183" v="79" actId="20577"/>
+          <ac:spMkLst>
+            <pc:docMk/>
+            <pc:sldMk cId="2136151688" sldId="283"/>
+            <ac:spMk id="2" creationId="{26C4DA0D-6620-6F49-A65E-18A9237B730E}"/>
+          </ac:spMkLst>
+        </pc:spChg>
+        <pc:picChg chg="add mod modCrop">
+          <ac:chgData name="Marcia Moraes" userId="c9c67e8a-58e2-4733-9a1c-5d44fec4775b" providerId="ADAL" clId="{782DD80B-8497-4C78-88BF-7159EC0EB292}" dt="2023-08-10T20:07:18.198" v="88" actId="1076"/>
+          <ac:picMkLst>
+            <pc:docMk/>
+            <pc:sldMk cId="2136151688" sldId="283"/>
+            <ac:picMk id="3" creationId="{3A433226-BB30-4EA3-B4B8-4C2C59D3DA50}"/>
+          </ac:picMkLst>
+        </pc:picChg>
+        <pc:picChg chg="add mod modCrop">
+          <ac:chgData name="Marcia Moraes" userId="c9c67e8a-58e2-4733-9a1c-5d44fec4775b" providerId="ADAL" clId="{782DD80B-8497-4C78-88BF-7159EC0EB292}" dt="2023-08-10T20:08:31.584" v="94" actId="1076"/>
+          <ac:picMkLst>
+            <pc:docMk/>
+            <pc:sldMk cId="2136151688" sldId="283"/>
+            <ac:picMk id="4" creationId="{5EDEC5B4-4AAD-4208-955F-106124E443E3}"/>
+          </ac:picMkLst>
+        </pc:picChg>
+        <pc:picChg chg="del">
+          <ac:chgData name="Marcia Moraes" userId="c9c67e8a-58e2-4733-9a1c-5d44fec4775b" providerId="ADAL" clId="{782DD80B-8497-4C78-88BF-7159EC0EB292}" dt="2023-08-10T19:54:49.939" v="58" actId="478"/>
+          <ac:picMkLst>
+            <pc:docMk/>
+            <pc:sldMk cId="2136151688" sldId="283"/>
+            <ac:picMk id="6" creationId="{36AC8121-D986-4F38-BBCF-5BF6C8B5DFEF}"/>
+          </ac:picMkLst>
+        </pc:picChg>
+      </pc:sldChg>
+      <pc:sldChg chg="addSp delSp modSp add delAnim">
+        <pc:chgData name="Marcia Moraes" userId="c9c67e8a-58e2-4733-9a1c-5d44fec4775b" providerId="ADAL" clId="{782DD80B-8497-4C78-88BF-7159EC0EB292}" dt="2023-08-10T21:06:45.415" v="133" actId="113"/>
+        <pc:sldMkLst>
+          <pc:docMk/>
+          <pc:sldMk cId="2866524206" sldId="284"/>
+        </pc:sldMkLst>
+        <pc:spChg chg="add mod">
+          <ac:chgData name="Marcia Moraes" userId="c9c67e8a-58e2-4733-9a1c-5d44fec4775b" providerId="ADAL" clId="{782DD80B-8497-4C78-88BF-7159EC0EB292}" dt="2023-08-10T21:04:53.268" v="116" actId="113"/>
+          <ac:spMkLst>
+            <pc:docMk/>
+            <pc:sldMk cId="2866524206" sldId="284"/>
+            <ac:spMk id="3" creationId="{0899DD9E-B5F8-4D99-98F7-7C57134C173A}"/>
+          </ac:spMkLst>
+        </pc:spChg>
+        <pc:spChg chg="mod">
+          <ac:chgData name="Marcia Moraes" userId="c9c67e8a-58e2-4733-9a1c-5d44fec4775b" providerId="ADAL" clId="{782DD80B-8497-4C78-88BF-7159EC0EB292}" dt="2023-08-10T21:05:03.719" v="125" actId="20577"/>
+          <ac:spMkLst>
+            <pc:docMk/>
+            <pc:sldMk cId="2866524206" sldId="284"/>
+            <ac:spMk id="4" creationId="{00000000-0000-0000-0000-000000000000}"/>
+          </ac:spMkLst>
+        </pc:spChg>
+        <pc:spChg chg="del">
+          <ac:chgData name="Marcia Moraes" userId="c9c67e8a-58e2-4733-9a1c-5d44fec4775b" providerId="ADAL" clId="{782DD80B-8497-4C78-88BF-7159EC0EB292}" dt="2023-08-10T20:57:50.754" v="106" actId="478"/>
+          <ac:spMkLst>
+            <pc:docMk/>
+            <pc:sldMk cId="2866524206" sldId="284"/>
+            <ac:spMk id="6" creationId="{61A47B75-5CF5-8148-89FC-032FCDA5013B}"/>
+          </ac:spMkLst>
+        </pc:spChg>
+        <pc:spChg chg="del">
+          <ac:chgData name="Marcia Moraes" userId="c9c67e8a-58e2-4733-9a1c-5d44fec4775b" providerId="ADAL" clId="{782DD80B-8497-4C78-88BF-7159EC0EB292}" dt="2023-08-10T21:04:09.905" v="110" actId="478"/>
+          <ac:spMkLst>
+            <pc:docMk/>
+            <pc:sldMk cId="2866524206" sldId="284"/>
+            <ac:spMk id="7" creationId="{61A47B75-5CF5-8148-89FC-032FCDA5013B}"/>
+          </ac:spMkLst>
+        </pc:spChg>
+        <pc:spChg chg="del">
+          <ac:chgData name="Marcia Moraes" userId="c9c67e8a-58e2-4733-9a1c-5d44fec4775b" providerId="ADAL" clId="{782DD80B-8497-4C78-88BF-7159EC0EB292}" dt="2023-08-10T21:04:04.960" v="109" actId="478"/>
+          <ac:spMkLst>
+            <pc:docMk/>
+            <pc:sldMk cId="2866524206" sldId="284"/>
+            <ac:spMk id="8" creationId="{61A47B75-5CF5-8148-89FC-032FCDA5013B}"/>
+          </ac:spMkLst>
+        </pc:spChg>
+        <pc:spChg chg="add mod">
+          <ac:chgData name="Marcia Moraes" userId="c9c67e8a-58e2-4733-9a1c-5d44fec4775b" providerId="ADAL" clId="{782DD80B-8497-4C78-88BF-7159EC0EB292}" dt="2023-08-10T21:06:45.415" v="133" actId="113"/>
+          <ac:spMkLst>
+            <pc:docMk/>
+            <pc:sldMk cId="2866524206" sldId="284"/>
+            <ac:spMk id="9" creationId="{0F7B3CF4-D174-41F3-B4D8-F2F47B10E6C8}"/>
+          </ac:spMkLst>
+        </pc:spChg>
+      </pc:sldChg>
+      <pc:sldChg chg="delSp add ord delAnim modAnim">
+        <pc:chgData name="Marcia Moraes" userId="c9c67e8a-58e2-4733-9a1c-5d44fec4775b" providerId="ADAL" clId="{782DD80B-8497-4C78-88BF-7159EC0EB292}" dt="2023-08-10T21:09:07.941" v="143"/>
+        <pc:sldMkLst>
+          <pc:docMk/>
+          <pc:sldMk cId="4151940406" sldId="285"/>
+        </pc:sldMkLst>
+        <pc:spChg chg="del">
+          <ac:chgData name="Marcia Moraes" userId="c9c67e8a-58e2-4733-9a1c-5d44fec4775b" providerId="ADAL" clId="{782DD80B-8497-4C78-88BF-7159EC0EB292}" dt="2023-08-10T21:05:28.168" v="128" actId="478"/>
+          <ac:spMkLst>
+            <pc:docMk/>
+            <pc:sldMk cId="4151940406" sldId="285"/>
+            <ac:spMk id="8" creationId="{61A47B75-5CF5-8148-89FC-032FCDA5013B}"/>
+          </ac:spMkLst>
+        </pc:spChg>
+      </pc:sldChg>
+      <pc:sldChg chg="addSp delSp modSp add delAnim modAnim">
+        <pc:chgData name="Marcia Moraes" userId="c9c67e8a-58e2-4733-9a1c-5d44fec4775b" providerId="ADAL" clId="{782DD80B-8497-4C78-88BF-7159EC0EB292}" dt="2023-08-10T21:08:44.994" v="142"/>
+        <pc:sldMkLst>
+          <pc:docMk/>
+          <pc:sldMk cId="2125741387" sldId="286"/>
+        </pc:sldMkLst>
+        <pc:spChg chg="add mod">
+          <ac:chgData name="Marcia Moraes" userId="c9c67e8a-58e2-4733-9a1c-5d44fec4775b" providerId="ADAL" clId="{782DD80B-8497-4C78-88BF-7159EC0EB292}" dt="2023-08-10T21:08:24.361" v="140" actId="113"/>
+          <ac:spMkLst>
+            <pc:docMk/>
+            <pc:sldMk cId="2125741387" sldId="286"/>
+            <ac:spMk id="3" creationId="{1F0F88B9-C8CF-4880-8C8A-4164D23B7F2B}"/>
+          </ac:spMkLst>
+        </pc:spChg>
+        <pc:spChg chg="mod">
+          <ac:chgData name="Marcia Moraes" userId="c9c67e8a-58e2-4733-9a1c-5d44fec4775b" providerId="ADAL" clId="{782DD80B-8497-4C78-88BF-7159EC0EB292}" dt="2023-08-10T21:07:22.522" v="135" actId="20577"/>
+          <ac:spMkLst>
+            <pc:docMk/>
+            <pc:sldMk cId="2125741387" sldId="286"/>
+            <ac:spMk id="4" creationId="{00000000-0000-0000-0000-000000000000}"/>
+          </ac:spMkLst>
+        </pc:spChg>
+        <pc:spChg chg="del">
+          <ac:chgData name="Marcia Moraes" userId="c9c67e8a-58e2-4733-9a1c-5d44fec4775b" providerId="ADAL" clId="{782DD80B-8497-4C78-88BF-7159EC0EB292}" dt="2023-08-10T21:07:07.104" v="134" actId="478"/>
+          <ac:spMkLst>
+            <pc:docMk/>
+            <pc:sldMk cId="2125741387" sldId="286"/>
+            <ac:spMk id="7" creationId="{61A47B75-5CF5-8148-89FC-032FCDA5013B}"/>
+          </ac:spMkLst>
+        </pc:spChg>
+      </pc:sldChg>
+    </pc:docChg>
+  </pc:docChgLst>
+</pc:chgInfo>
+</file>
+
 <file path=ppt/handoutMasters/handoutMaster1.xml><?xml version="1.0" encoding="utf-8"?>
 <p:handoutMaster xmlns:a="http://schemas.openxmlformats.org/drawingml/2006/main" xmlns:r="http://schemas.openxmlformats.org/officeDocument/2006/relationships" xmlns:p="http://schemas.openxmlformats.org/presentationml/2006/main">
   <p:cSld>
@@ -233,7 +611,7 @@
           <a:p>
             <a:fld id="{4D7E51A5-B478-1E40-8CBB-0DAA8831E99D}" type="datetimeFigureOut">
               <a:rPr lang="en-US" smtClean="0"/>
-              <a:t>1/26/2023</a:t>
+              <a:t>8/10/2023</a:t>
             </a:fld>
             <a:endParaRPr lang="en-US"/>
           </a:p>
@@ -398,7 +776,7 @@
           <a:p>
             <a:fld id="{D0ED587F-861E-6740-9643-E3DDAE89B8D6}" type="datetimeFigureOut">
               <a:rPr lang="en-US" smtClean="0"/>
-              <a:t>1/26/2023</a:t>
+              <a:t>8/10/2023</a:t>
             </a:fld>
             <a:endParaRPr lang="en-US"/>
           </a:p>
@@ -7303,7 +7681,7 @@
         <p:spPr>
           <a:xfrm>
             <a:off x="6908800" y="1776683"/>
-            <a:ext cx="6280728" cy="4186659"/>
+            <a:ext cx="6280728" cy="4698017"/>
           </a:xfrm>
         </p:spPr>
         <p:txBody>
@@ -7311,41 +7689,41 @@
           <a:lstStyle/>
           <a:p>
             <a:r>
-              <a:rPr lang="en-US" dirty="0"/>
+              <a:rPr lang="en-US" sz="2000" dirty="0"/>
               <a:t>Storing variables in memory</a:t>
             </a:r>
           </a:p>
           <a:p>
             <a:pPr lvl="1"/>
             <a:r>
-              <a:rPr lang="en-US" dirty="0"/>
+              <a:rPr lang="en-US" sz="2000" dirty="0"/>
               <a:t>Wherever the computer decides</a:t>
             </a:r>
           </a:p>
           <a:p>
             <a:pPr lvl="1"/>
             <a:r>
-              <a:rPr lang="en-US" dirty="0"/>
+              <a:rPr lang="en-US" sz="2000" dirty="0"/>
               <a:t>Value stored in the location</a:t>
             </a:r>
           </a:p>
           <a:p>
             <a:pPr lvl="1"/>
             <a:r>
-              <a:rPr lang="en-US" dirty="0"/>
+              <a:rPr lang="en-US" sz="2000" dirty="0"/>
               <a:t>Variable name points towards location</a:t>
             </a:r>
           </a:p>
           <a:p>
             <a:r>
-              <a:rPr lang="en-US" dirty="0"/>
+              <a:rPr lang="en-US" sz="2000" dirty="0"/>
               <a:t>Example</a:t>
             </a:r>
           </a:p>
           <a:p>
             <a:pPr lvl="1"/>
             <a:r>
-              <a:rPr lang="en-US" dirty="0">
+              <a:rPr lang="en-US" sz="2000" dirty="0">
                 <a:latin typeface="Consolas" panose="020B0609020204030204" pitchFamily="49" charset="0"/>
                 <a:cs typeface="Consolas" panose="020B0609020204030204" pitchFamily="49" charset="0"/>
               </a:rPr>
@@ -7355,7 +7733,7 @@
           <a:p>
             <a:pPr lvl="1"/>
             <a:r>
-              <a:rPr lang="en-US" dirty="0">
+              <a:rPr lang="en-US" sz="2000" dirty="0">
                 <a:latin typeface="Consolas" panose="020B0609020204030204" pitchFamily="49" charset="0"/>
                 <a:cs typeface="Consolas" panose="020B0609020204030204" pitchFamily="49" charset="0"/>
               </a:rPr>
@@ -7364,14 +7742,14 @@
           </a:p>
           <a:p>
             <a:pPr lvl="1"/>
-            <a:endParaRPr lang="en-US" dirty="0">
+            <a:endParaRPr lang="en-US" sz="2000" dirty="0">
               <a:latin typeface="Consolas" panose="020B0609020204030204" pitchFamily="49" charset="0"/>
               <a:cs typeface="Consolas" panose="020B0609020204030204" pitchFamily="49" charset="0"/>
             </a:endParaRPr>
           </a:p>
           <a:p>
             <a:r>
-              <a:rPr lang="en-US" dirty="0">
+              <a:rPr lang="en-US" sz="2000" dirty="0">
                 <a:latin typeface="Consolas" panose="020B0609020204030204" pitchFamily="49" charset="0"/>
                 <a:cs typeface="Consolas" panose="020B0609020204030204" pitchFamily="49" charset="0"/>
               </a:rPr>
@@ -7381,23 +7759,12 @@
           <a:p>
             <a:pPr lvl="1"/>
             <a:r>
-              <a:rPr lang="en-US" dirty="0">
+              <a:rPr lang="en-US" sz="2000" dirty="0">
                 <a:latin typeface="Consolas" panose="020B0609020204030204" pitchFamily="49" charset="0"/>
                 <a:cs typeface="Consolas" panose="020B0609020204030204" pitchFamily="49" charset="0"/>
               </a:rPr>
-              <a:t>String mascot = </a:t>
-            </a:r>
-            <a:r>
-              <a:rPr lang="en-US">
-                <a:latin typeface="Consolas" panose="020B0609020204030204" pitchFamily="49" charset="0"/>
-                <a:cs typeface="Consolas" panose="020B0609020204030204" pitchFamily="49" charset="0"/>
-              </a:rPr>
-              <a:t>“CAM”;</a:t>
-            </a:r>
-            <a:endParaRPr lang="en-US" dirty="0">
-              <a:latin typeface="Consolas" panose="020B0609020204030204" pitchFamily="49" charset="0"/>
-              <a:cs typeface="Consolas" panose="020B0609020204030204" pitchFamily="49" charset="0"/>
-            </a:endParaRPr>
+              <a:t>String mascot = “CAM”;</a:t>
+            </a:r>
           </a:p>
         </p:txBody>
       </p:sp>
@@ -7967,7 +8334,7 @@
     </p:spTree>
     <p:extLst>
       <p:ext uri="{BB962C8B-B14F-4D97-AF65-F5344CB8AC3E}">
-        <p14:creationId xmlns:p14="http://schemas.microsoft.com/office/powerpoint/2010/main" val="1168442721"/>
+        <p14:creationId xmlns:p14="http://schemas.microsoft.com/office/powerpoint/2010/main" val="1072400253"/>
       </p:ext>
     </p:extLst>
   </p:cSld>
@@ -8549,8 +8916,8 @@
         </p:nvSpPr>
         <p:spPr>
           <a:xfrm>
-            <a:off x="7305627" y="1766200"/>
-            <a:ext cx="5280770" cy="5047985"/>
+            <a:off x="7305627" y="218957"/>
+            <a:ext cx="6149116" cy="6775509"/>
           </a:xfrm>
         </p:spPr>
         <p:txBody>
@@ -8558,48 +8925,48 @@
           <a:lstStyle/>
           <a:p>
             <a:r>
-              <a:rPr lang="en-US" dirty="0"/>
+              <a:rPr lang="en-US" sz="2000" dirty="0"/>
               <a:t>Ordered Collection of characters </a:t>
             </a:r>
           </a:p>
           <a:p>
             <a:pPr lvl="1"/>
             <a:r>
-              <a:rPr lang="en-US" dirty="0"/>
+              <a:rPr lang="en-US" sz="2000" dirty="0"/>
               <a:t>Indexed – starting at 0</a:t>
             </a:r>
           </a:p>
           <a:p>
             <a:pPr lvl="1"/>
             <a:r>
-              <a:rPr lang="en-US" dirty="0"/>
+              <a:rPr lang="en-US" sz="2000" dirty="0"/>
               <a:t>‘C’ is at index 0</a:t>
             </a:r>
           </a:p>
           <a:p>
             <a:pPr lvl="1"/>
             <a:r>
-              <a:rPr lang="en-US" dirty="0"/>
+              <a:rPr lang="en-US" sz="2000" dirty="0"/>
               <a:t>‘A’ is at index 1</a:t>
             </a:r>
           </a:p>
           <a:p>
             <a:r>
-              <a:rPr lang="en-US" b="1" dirty="0">
+              <a:rPr lang="en-US" sz="2000" b="1" dirty="0">
                 <a:latin typeface="Consolas" panose="020B0609020204030204" pitchFamily="49" charset="0"/>
                 <a:cs typeface="Consolas" panose="020B0609020204030204" pitchFamily="49" charset="0"/>
               </a:rPr>
               <a:t>char character = </a:t>
             </a:r>
             <a:r>
-              <a:rPr lang="en-US" b="1" dirty="0" err="1">
+              <a:rPr lang="en-US" sz="2000" b="1" dirty="0" err="1">
                 <a:latin typeface="Consolas" panose="020B0609020204030204" pitchFamily="49" charset="0"/>
                 <a:cs typeface="Consolas" panose="020B0609020204030204" pitchFamily="49" charset="0"/>
               </a:rPr>
               <a:t>mascot.charAt</a:t>
             </a:r>
             <a:r>
-              <a:rPr lang="en-US" b="1" dirty="0">
+              <a:rPr lang="en-US" sz="2000" b="1" dirty="0">
                 <a:latin typeface="Consolas" panose="020B0609020204030204" pitchFamily="49" charset="0"/>
                 <a:cs typeface="Consolas" panose="020B0609020204030204" pitchFamily="49" charset="0"/>
               </a:rPr>
@@ -8609,55 +8976,55 @@
           <a:p>
             <a:pPr lvl="1"/>
             <a:r>
-              <a:rPr lang="en-US" dirty="0"/>
+              <a:rPr lang="en-US" sz="2000" dirty="0"/>
               <a:t>returns ’M’ (character)</a:t>
             </a:r>
           </a:p>
           <a:p>
             <a:r>
-              <a:rPr lang="en-US" dirty="0"/>
+              <a:rPr lang="en-US" sz="2000" dirty="0"/>
               <a:t>How many  characters?</a:t>
             </a:r>
           </a:p>
           <a:p>
             <a:pPr lvl="1"/>
             <a:r>
-              <a:rPr lang="en-US" b="1" dirty="0">
+              <a:rPr lang="en-US" sz="2000" b="1" dirty="0">
                 <a:latin typeface="Consolas" panose="020B0609020204030204" pitchFamily="49" charset="0"/>
                 <a:cs typeface="Consolas" panose="020B0609020204030204" pitchFamily="49" charset="0"/>
               </a:rPr>
               <a:t>int </a:t>
             </a:r>
             <a:r>
-              <a:rPr lang="en-US" b="1" dirty="0" err="1">
+              <a:rPr lang="en-US" sz="2000" b="1" dirty="0" err="1">
                 <a:latin typeface="Consolas" panose="020B0609020204030204" pitchFamily="49" charset="0"/>
                 <a:cs typeface="Consolas" panose="020B0609020204030204" pitchFamily="49" charset="0"/>
               </a:rPr>
               <a:t>len</a:t>
             </a:r>
             <a:r>
-              <a:rPr lang="en-US" b="1" dirty="0">
+              <a:rPr lang="en-US" sz="2000" b="1" dirty="0">
                 <a:latin typeface="Consolas" panose="020B0609020204030204" pitchFamily="49" charset="0"/>
                 <a:cs typeface="Consolas" panose="020B0609020204030204" pitchFamily="49" charset="0"/>
               </a:rPr>
               <a:t> = </a:t>
             </a:r>
             <a:r>
-              <a:rPr lang="en-US" b="1" dirty="0" err="1">
+              <a:rPr lang="en-US" sz="2000" b="1" dirty="0" err="1">
                 <a:latin typeface="Consolas" panose="020B0609020204030204" pitchFamily="49" charset="0"/>
                 <a:cs typeface="Consolas" panose="020B0609020204030204" pitchFamily="49" charset="0"/>
               </a:rPr>
               <a:t>mascot.length</a:t>
             </a:r>
             <a:r>
-              <a:rPr lang="en-US" b="1" dirty="0">
+              <a:rPr lang="en-US" sz="2000" b="1" dirty="0">
                 <a:latin typeface="Consolas" panose="020B0609020204030204" pitchFamily="49" charset="0"/>
                 <a:cs typeface="Consolas" panose="020B0609020204030204" pitchFamily="49" charset="0"/>
               </a:rPr>
               <a:t>(); </a:t>
             </a:r>
             <a:r>
-              <a:rPr lang="en-US" dirty="0">
+              <a:rPr lang="en-US" sz="2000" dirty="0">
                 <a:latin typeface="Consolas" panose="020B0609020204030204" pitchFamily="49" charset="0"/>
                 <a:cs typeface="Consolas" panose="020B0609020204030204" pitchFamily="49" charset="0"/>
               </a:rPr>
@@ -8666,7 +9033,7 @@
           </a:p>
           <a:p>
             <a:r>
-              <a:rPr lang="en-US" dirty="0">
+              <a:rPr lang="en-US" sz="2000" dirty="0">
                 <a:latin typeface="Consolas" panose="020B0609020204030204" pitchFamily="49" charset="0"/>
                 <a:cs typeface="Consolas" panose="020B0609020204030204" pitchFamily="49" charset="0"/>
               </a:rPr>
@@ -8676,7 +9043,7 @@
           <a:p>
             <a:pPr lvl="1"/>
             <a:r>
-              <a:rPr lang="en-US" dirty="0">
+              <a:rPr lang="en-US" sz="2000" dirty="0">
                 <a:latin typeface="Consolas" panose="020B0609020204030204" pitchFamily="49" charset="0"/>
                 <a:cs typeface="Consolas" panose="020B0609020204030204" pitchFamily="49" charset="0"/>
               </a:rPr>
@@ -8686,7 +9053,7 @@
           <a:p>
             <a:pPr lvl="1"/>
             <a:r>
-              <a:rPr lang="en-US" dirty="0">
+              <a:rPr lang="en-US" sz="2000" dirty="0">
                 <a:latin typeface="Consolas" panose="020B0609020204030204" pitchFamily="49" charset="0"/>
                 <a:cs typeface="Consolas" panose="020B0609020204030204" pitchFamily="49" charset="0"/>
               </a:rPr>
@@ -8696,7 +9063,7 @@
           <a:p>
             <a:pPr lvl="1"/>
             <a:r>
-              <a:rPr lang="en-US" dirty="0">
+              <a:rPr lang="en-US" sz="2000" dirty="0">
                 <a:latin typeface="Consolas" panose="020B0609020204030204" pitchFamily="49" charset="0"/>
                 <a:cs typeface="Consolas" panose="020B0609020204030204" pitchFamily="49" charset="0"/>
               </a:rPr>
@@ -9275,7 +9642,7 @@
     </p:spTree>
     <p:extLst>
       <p:ext uri="{BB962C8B-B14F-4D97-AF65-F5344CB8AC3E}">
-        <p14:creationId xmlns:p14="http://schemas.microsoft.com/office/powerpoint/2010/main" val="709799232"/>
+        <p14:creationId xmlns:p14="http://schemas.microsoft.com/office/powerpoint/2010/main" val="3534300162"/>
       </p:ext>
     </p:extLst>
   </p:cSld>
@@ -10052,53 +10419,6 @@
           </a:p>
         </p:txBody>
       </p:sp>
-      <p:pic>
-        <p:nvPicPr>
-          <p:cNvPr id="1026" name="Picture 2">
-            <a:extLst>
-              <a:ext uri="{FF2B5EF4-FFF2-40B4-BE49-F238E27FC236}">
-                <a16:creationId xmlns:a16="http://schemas.microsoft.com/office/drawing/2014/main" id="{BD4EDBCB-50BF-A44E-9ACE-664BDDA0ADF6}"/>
-              </a:ext>
-            </a:extLst>
-          </p:cNvPr>
-          <p:cNvPicPr>
-            <a:picLocks noChangeAspect="1" noChangeArrowheads="1"/>
-          </p:cNvPicPr>
-          <p:nvPr/>
-        </p:nvPicPr>
-        <p:blipFill>
-          <a:blip r:embed="rId3">
-            <a:extLst>
-              <a:ext uri="{28A0092B-C50C-407E-A947-70E740481C1C}">
-                <a14:useLocalDpi xmlns:a14="http://schemas.microsoft.com/office/drawing/2010/main" val="0"/>
-              </a:ext>
-            </a:extLst>
-          </a:blip>
-          <a:srcRect/>
-          <a:stretch>
-            <a:fillRect/>
-          </a:stretch>
-        </p:blipFill>
-        <p:spPr bwMode="auto">
-          <a:xfrm>
-            <a:off x="11391900" y="-1"/>
-            <a:ext cx="2425701" cy="2425701"/>
-          </a:xfrm>
-          <a:prstGeom prst="rect">
-            <a:avLst/>
-          </a:prstGeom>
-          <a:noFill/>
-          <a:extLst>
-            <a:ext uri="{909E8E84-426E-40DD-AFC4-6F175D3DCCD1}">
-              <a14:hiddenFill xmlns:a14="http://schemas.microsoft.com/office/drawing/2010/main">
-                <a:solidFill>
-                  <a:srgbClr val="FFFFFF"/>
-                </a:solidFill>
-              </a14:hiddenFill>
-            </a:ext>
-          </a:extLst>
-        </p:spPr>
-      </p:pic>
       <p:sp>
         <p:nvSpPr>
           <p:cNvPr id="6" name="Rectangle 5">
@@ -12374,6 +12694,255 @@
 </file>
 
 <file path=ppt/slides/slide16.xml><?xml version="1.0" encoding="utf-8"?>
+<p:sld xmlns:a="http://schemas.openxmlformats.org/drawingml/2006/main" xmlns:r="http://schemas.openxmlformats.org/officeDocument/2006/relationships" xmlns:p="http://schemas.openxmlformats.org/presentationml/2006/main">
+  <p:cSld>
+    <p:spTree>
+      <p:nvGrpSpPr>
+        <p:cNvPr id="1" name=""/>
+        <p:cNvGrpSpPr/>
+        <p:nvPr/>
+      </p:nvGrpSpPr>
+      <p:grpSpPr>
+        <a:xfrm>
+          <a:off x="0" y="0"/>
+          <a:ext cx="0" cy="0"/>
+          <a:chOff x="0" y="0"/>
+          <a:chExt cx="0" cy="0"/>
+        </a:xfrm>
+      </p:grpSpPr>
+      <p:sp>
+        <p:nvSpPr>
+          <p:cNvPr id="2" name="Title 1">
+            <a:extLst>
+              <a:ext uri="{FF2B5EF4-FFF2-40B4-BE49-F238E27FC236}">
+                <a16:creationId xmlns:a16="http://schemas.microsoft.com/office/drawing/2014/main" id="{26C4DA0D-6620-6F49-A65E-18A9237B730E}"/>
+              </a:ext>
+            </a:extLst>
+          </p:cNvPr>
+          <p:cNvSpPr>
+            <a:spLocks noGrp="1"/>
+          </p:cNvSpPr>
+          <p:nvPr>
+            <p:ph type="title"/>
+          </p:nvPr>
+        </p:nvSpPr>
+        <p:spPr>
+          <a:xfrm>
+            <a:off x="628075" y="448059"/>
+            <a:ext cx="12561453" cy="1015663"/>
+          </a:xfrm>
+        </p:spPr>
+        <p:txBody>
+          <a:bodyPr/>
+          <a:lstStyle/>
+          <a:p>
+            <a:r>
+              <a:rPr lang="en-US" dirty="0" err="1"/>
+              <a:t>String.format</a:t>
+            </a:r>
+            <a:r>
+              <a:rPr lang="en-US" dirty="0"/>
+              <a:t>/</a:t>
+            </a:r>
+            <a:r>
+              <a:rPr lang="en-US" dirty="0" err="1"/>
+              <a:t>printf</a:t>
+            </a:r>
+            <a:r>
+              <a:rPr lang="en-US" dirty="0"/>
+              <a:t> </a:t>
+            </a:r>
+          </a:p>
+        </p:txBody>
+      </p:sp>
+      <p:pic>
+        <p:nvPicPr>
+          <p:cNvPr id="6" name="Picture 5">
+            <a:extLst>
+              <a:ext uri="{FF2B5EF4-FFF2-40B4-BE49-F238E27FC236}">
+                <a16:creationId xmlns:a16="http://schemas.microsoft.com/office/drawing/2014/main" id="{36AC8121-D986-4F38-BBCF-5BF6C8B5DFEF}"/>
+              </a:ext>
+            </a:extLst>
+          </p:cNvPr>
+          <p:cNvPicPr>
+            <a:picLocks noChangeAspect="1"/>
+          </p:cNvPicPr>
+          <p:nvPr/>
+        </p:nvPicPr>
+        <p:blipFill rotWithShape="1">
+          <a:blip r:embed="rId2"/>
+          <a:srcRect l="20483" t="21288" r="25393" b="15546"/>
+          <a:stretch/>
+        </p:blipFill>
+        <p:spPr>
+          <a:xfrm>
+            <a:off x="1672206" y="1463722"/>
+            <a:ext cx="8636566" cy="5669712"/>
+          </a:xfrm>
+          <a:prstGeom prst="rect">
+            <a:avLst/>
+          </a:prstGeom>
+        </p:spPr>
+      </p:pic>
+    </p:spTree>
+    <p:extLst>
+      <p:ext uri="{BB962C8B-B14F-4D97-AF65-F5344CB8AC3E}">
+        <p14:creationId xmlns:p14="http://schemas.microsoft.com/office/powerpoint/2010/main" val="1614057216"/>
+      </p:ext>
+    </p:extLst>
+  </p:cSld>
+  <p:clrMapOvr>
+    <a:masterClrMapping/>
+  </p:clrMapOvr>
+  <mc:AlternateContent xmlns:mc="http://schemas.openxmlformats.org/markup-compatibility/2006" xmlns:p14="http://schemas.microsoft.com/office/powerpoint/2010/main">
+    <mc:Choice Requires="p14">
+      <p:transition p14:dur="300" advTm="109816">
+        <p:fade/>
+      </p:transition>
+    </mc:Choice>
+    <mc:Fallback xmlns="">
+      <p:transition advTm="109816">
+        <p:fade/>
+      </p:transition>
+    </mc:Fallback>
+  </mc:AlternateContent>
+</p:sld>
+</file>
+
+<file path=ppt/slides/slide17.xml><?xml version="1.0" encoding="utf-8"?>
+<p:sld xmlns:a="http://schemas.openxmlformats.org/drawingml/2006/main" xmlns:r="http://schemas.openxmlformats.org/officeDocument/2006/relationships" xmlns:p="http://schemas.openxmlformats.org/presentationml/2006/main">
+  <p:cSld>
+    <p:spTree>
+      <p:nvGrpSpPr>
+        <p:cNvPr id="1" name=""/>
+        <p:cNvGrpSpPr/>
+        <p:nvPr/>
+      </p:nvGrpSpPr>
+      <p:grpSpPr>
+        <a:xfrm>
+          <a:off x="0" y="0"/>
+          <a:ext cx="0" cy="0"/>
+          <a:chOff x="0" y="0"/>
+          <a:chExt cx="0" cy="0"/>
+        </a:xfrm>
+      </p:grpSpPr>
+      <p:sp>
+        <p:nvSpPr>
+          <p:cNvPr id="2" name="Title 1">
+            <a:extLst>
+              <a:ext uri="{FF2B5EF4-FFF2-40B4-BE49-F238E27FC236}">
+                <a16:creationId xmlns:a16="http://schemas.microsoft.com/office/drawing/2014/main" id="{26C4DA0D-6620-6F49-A65E-18A9237B730E}"/>
+              </a:ext>
+            </a:extLst>
+          </p:cNvPr>
+          <p:cNvSpPr>
+            <a:spLocks noGrp="1"/>
+          </p:cNvSpPr>
+          <p:nvPr>
+            <p:ph type="title"/>
+          </p:nvPr>
+        </p:nvSpPr>
+        <p:spPr>
+          <a:xfrm>
+            <a:off x="628075" y="448059"/>
+            <a:ext cx="12561453" cy="1015663"/>
+          </a:xfrm>
+        </p:spPr>
+        <p:txBody>
+          <a:bodyPr/>
+          <a:lstStyle/>
+          <a:p>
+            <a:r>
+              <a:rPr lang="en-US" dirty="0"/>
+              <a:t>Floating point values </a:t>
+            </a:r>
+          </a:p>
+        </p:txBody>
+      </p:sp>
+      <p:pic>
+        <p:nvPicPr>
+          <p:cNvPr id="3" name="Picture 2">
+            <a:extLst>
+              <a:ext uri="{FF2B5EF4-FFF2-40B4-BE49-F238E27FC236}">
+                <a16:creationId xmlns:a16="http://schemas.microsoft.com/office/drawing/2014/main" id="{3A433226-BB30-4EA3-B4B8-4C2C59D3DA50}"/>
+              </a:ext>
+            </a:extLst>
+          </p:cNvPr>
+          <p:cNvPicPr>
+            <a:picLocks noChangeAspect="1"/>
+          </p:cNvPicPr>
+          <p:nvPr/>
+        </p:nvPicPr>
+        <p:blipFill rotWithShape="1">
+          <a:blip r:embed="rId2"/>
+          <a:srcRect l="23714" t="22269" r="38077" b="62605"/>
+          <a:stretch/>
+        </p:blipFill>
+        <p:spPr>
+          <a:xfrm>
+            <a:off x="7184571" y="442210"/>
+            <a:ext cx="6332415" cy="1410106"/>
+          </a:xfrm>
+          <a:prstGeom prst="rect">
+            <a:avLst/>
+          </a:prstGeom>
+        </p:spPr>
+      </p:pic>
+      <p:pic>
+        <p:nvPicPr>
+          <p:cNvPr id="4" name="Picture 3">
+            <a:extLst>
+              <a:ext uri="{FF2B5EF4-FFF2-40B4-BE49-F238E27FC236}">
+                <a16:creationId xmlns:a16="http://schemas.microsoft.com/office/drawing/2014/main" id="{5EDEC5B4-4AAD-4208-955F-106124E443E3}"/>
+              </a:ext>
+            </a:extLst>
+          </p:cNvPr>
+          <p:cNvPicPr>
+            <a:picLocks noChangeAspect="1"/>
+          </p:cNvPicPr>
+          <p:nvPr/>
+        </p:nvPicPr>
+        <p:blipFill rotWithShape="1">
+          <a:blip r:embed="rId3"/>
+          <a:srcRect l="11818" t="18832" r="13419" b="10364"/>
+          <a:stretch/>
+        </p:blipFill>
+        <p:spPr>
+          <a:xfrm>
+            <a:off x="628075" y="1594350"/>
+            <a:ext cx="10330543" cy="5503135"/>
+          </a:xfrm>
+          <a:prstGeom prst="rect">
+            <a:avLst/>
+          </a:prstGeom>
+        </p:spPr>
+      </p:pic>
+    </p:spTree>
+    <p:extLst>
+      <p:ext uri="{BB962C8B-B14F-4D97-AF65-F5344CB8AC3E}">
+        <p14:creationId xmlns:p14="http://schemas.microsoft.com/office/powerpoint/2010/main" val="2136151688"/>
+      </p:ext>
+    </p:extLst>
+  </p:cSld>
+  <p:clrMapOvr>
+    <a:masterClrMapping/>
+  </p:clrMapOvr>
+  <mc:AlternateContent xmlns:mc="http://schemas.openxmlformats.org/markup-compatibility/2006" xmlns:p14="http://schemas.microsoft.com/office/powerpoint/2010/main">
+    <mc:Choice Requires="p14">
+      <p:transition p14:dur="300" advTm="109816">
+        <p:fade/>
+      </p:transition>
+    </mc:Choice>
+    <mc:Fallback xmlns="">
+      <p:transition advTm="109816">
+        <p:fade/>
+      </p:transition>
+    </mc:Fallback>
+  </mc:AlternateContent>
+</p:sld>
+</file>
+
+<file path=ppt/slides/slide18.xml><?xml version="1.0" encoding="utf-8"?>
 <p:sld xmlns:a="http://schemas.openxmlformats.org/drawingml/2006/main" xmlns:r="http://schemas.openxmlformats.org/officeDocument/2006/relationships" xmlns:p="http://schemas.openxmlformats.org/presentationml/2006/main">
   <p:cSld>
     <p:spTree>
@@ -13827,7 +14396,7 @@
 </p:sld>
 </file>
 
-<file path=ppt/slides/slide17.xml><?xml version="1.0" encoding="utf-8"?>
+<file path=ppt/slides/slide19.xml><?xml version="1.0" encoding="utf-8"?>
 <p:sld xmlns:a="http://schemas.openxmlformats.org/drawingml/2006/main" xmlns:r="http://schemas.openxmlformats.org/officeDocument/2006/relationships" xmlns:p="http://schemas.openxmlformats.org/presentationml/2006/main">
   <p:cSld>
     <p:spTree>
@@ -14681,7 +15250,256 @@
 </p:sld>
 </file>
 
-<file path=ppt/slides/slide18.xml><?xml version="1.0" encoding="utf-8"?>
+<file path=ppt/slides/slide2.xml><?xml version="1.0" encoding="utf-8"?>
+<p:sld xmlns:a="http://schemas.openxmlformats.org/drawingml/2006/main" xmlns:r="http://schemas.openxmlformats.org/officeDocument/2006/relationships" xmlns:p="http://schemas.openxmlformats.org/presentationml/2006/main">
+  <p:cSld>
+    <p:spTree>
+      <p:nvGrpSpPr>
+        <p:cNvPr id="1" name=""/>
+        <p:cNvGrpSpPr/>
+        <p:nvPr/>
+      </p:nvGrpSpPr>
+      <p:grpSpPr>
+        <a:xfrm>
+          <a:off x="0" y="0"/>
+          <a:ext cx="0" cy="0"/>
+          <a:chOff x="0" y="0"/>
+          <a:chExt cx="0" cy="0"/>
+        </a:xfrm>
+      </p:grpSpPr>
+      <p:sp>
+        <p:nvSpPr>
+          <p:cNvPr id="4" name="Title 3">
+            <a:extLst>
+              <a:ext uri="{FF2B5EF4-FFF2-40B4-BE49-F238E27FC236}">
+                <a16:creationId xmlns:a16="http://schemas.microsoft.com/office/drawing/2014/main" id="{11F69212-F891-5844-91B0-396F6B018064}"/>
+              </a:ext>
+            </a:extLst>
+          </p:cNvPr>
+          <p:cNvSpPr>
+            <a:spLocks noGrp="1"/>
+          </p:cNvSpPr>
+          <p:nvPr>
+            <p:ph type="title"/>
+          </p:nvPr>
+        </p:nvSpPr>
+        <p:spPr/>
+        <p:txBody>
+          <a:bodyPr/>
+          <a:lstStyle/>
+          <a:p>
+            <a:r>
+              <a:rPr lang="en-US" dirty="0"/>
+              <a:t>Announcements</a:t>
+            </a:r>
+          </a:p>
+        </p:txBody>
+      </p:sp>
+      <p:sp>
+        <p:nvSpPr>
+          <p:cNvPr id="5" name="Text Placeholder 4">
+            <a:extLst>
+              <a:ext uri="{FF2B5EF4-FFF2-40B4-BE49-F238E27FC236}">
+                <a16:creationId xmlns:a16="http://schemas.microsoft.com/office/drawing/2014/main" id="{D45B7610-981A-7441-A483-AB5BABDA0AB4}"/>
+              </a:ext>
+            </a:extLst>
+          </p:cNvPr>
+          <p:cNvSpPr>
+            <a:spLocks noGrp="1"/>
+          </p:cNvSpPr>
+          <p:nvPr>
+            <p:ph type="body" sz="quarter" idx="10"/>
+          </p:nvPr>
+        </p:nvSpPr>
+        <p:spPr>
+          <a:xfrm>
+            <a:off x="628075" y="1776683"/>
+            <a:ext cx="12561453" cy="3836178"/>
+          </a:xfrm>
+        </p:spPr>
+        <p:txBody>
+          <a:bodyPr/>
+          <a:lstStyle/>
+          <a:p>
+            <a:r>
+              <a:rPr lang="en-US" sz="2000" dirty="0">
+                <a:solidFill>
+                  <a:srgbClr val="092529"/>
+                </a:solidFill>
+              </a:rPr>
+              <a:t>Reminder – readings are due </a:t>
+            </a:r>
+            <a:r>
+              <a:rPr lang="en-US" sz="2000" b="1" dirty="0">
+                <a:solidFill>
+                  <a:srgbClr val="092529"/>
+                </a:solidFill>
+              </a:rPr>
+              <a:t>before</a:t>
+            </a:r>
+            <a:r>
+              <a:rPr lang="en-US" sz="2000" dirty="0">
+                <a:solidFill>
+                  <a:srgbClr val="092529"/>
+                </a:solidFill>
+              </a:rPr>
+              <a:t> lecture</a:t>
+            </a:r>
+          </a:p>
+          <a:p>
+            <a:pPr lvl="1"/>
+            <a:r>
+              <a:rPr lang="en-US" sz="2000" dirty="0">
+                <a:solidFill>
+                  <a:srgbClr val="092529"/>
+                </a:solidFill>
+              </a:rPr>
+              <a:t>You don’t have to do all of it - challenge problems can be challenging…</a:t>
+            </a:r>
+          </a:p>
+          <a:p>
+            <a:pPr lvl="1"/>
+            <a:r>
+              <a:rPr lang="en-US" sz="2000" dirty="0">
+                <a:solidFill>
+                  <a:srgbClr val="092529"/>
+                </a:solidFill>
+              </a:rPr>
+              <a:t>You can return to them. </a:t>
+            </a:r>
+          </a:p>
+          <a:p>
+            <a:pPr lvl="1"/>
+            <a:r>
+              <a:rPr lang="en-US" sz="2000" dirty="0">
+                <a:solidFill>
+                  <a:srgbClr val="092529"/>
+                </a:solidFill>
+              </a:rPr>
+              <a:t>We start off each lecture with a recall activity!</a:t>
+            </a:r>
+          </a:p>
+          <a:p>
+            <a:r>
+              <a:rPr lang="en-US" sz="2200" dirty="0"/>
+              <a:t>Lab teams should be setup</a:t>
+            </a:r>
+          </a:p>
+          <a:p>
+            <a:pPr lvl="1"/>
+            <a:r>
+              <a:rPr lang="en-US" sz="2000" dirty="0">
+                <a:solidFill>
+                  <a:srgbClr val="092529"/>
+                </a:solidFill>
+              </a:rPr>
+              <a:t>If you are not on a private </a:t>
+            </a:r>
+            <a:r>
+              <a:rPr lang="en-US" sz="2000" dirty="0"/>
+              <a:t>channel with your other lab mates, let us know </a:t>
+            </a:r>
+          </a:p>
+          <a:p>
+            <a:r>
+              <a:rPr lang="en-US" sz="2000" dirty="0">
+                <a:solidFill>
+                  <a:srgbClr val="092529"/>
+                </a:solidFill>
+              </a:rPr>
+              <a:t>Thursday </a:t>
+            </a:r>
+            <a:r>
+              <a:rPr lang="en-US" sz="2000" dirty="0"/>
+              <a:t>lab – meant to be done by Monday</a:t>
+            </a:r>
+            <a:r>
+              <a:rPr lang="en-US" sz="2000" dirty="0">
+                <a:solidFill>
+                  <a:srgbClr val="092529"/>
+                </a:solidFill>
+              </a:rPr>
+              <a:t> </a:t>
+            </a:r>
+          </a:p>
+          <a:p>
+            <a:endParaRPr lang="en-US" b="1" dirty="0"/>
+          </a:p>
+        </p:txBody>
+      </p:sp>
+      <p:pic>
+        <p:nvPicPr>
+          <p:cNvPr id="1026" name="Picture 2" descr="We Can Do Hard Things - Abby Off the Record — Abby Off the Record">
+            <a:extLst>
+              <a:ext uri="{FF2B5EF4-FFF2-40B4-BE49-F238E27FC236}">
+                <a16:creationId xmlns:a16="http://schemas.microsoft.com/office/drawing/2014/main" id="{1F717CB0-92E6-4EB8-80C2-70E21F159AED}"/>
+              </a:ext>
+            </a:extLst>
+          </p:cNvPr>
+          <p:cNvPicPr>
+            <a:picLocks noChangeAspect="1" noChangeArrowheads="1"/>
+          </p:cNvPicPr>
+          <p:nvPr/>
+        </p:nvPicPr>
+        <p:blipFill>
+          <a:blip r:embed="rId2">
+            <a:extLst>
+              <a:ext uri="{28A0092B-C50C-407E-A947-70E740481C1C}">
+                <a14:useLocalDpi xmlns:a14="http://schemas.microsoft.com/office/drawing/2010/main" val="0"/>
+              </a:ext>
+            </a:extLst>
+          </a:blip>
+          <a:srcRect/>
+          <a:stretch>
+            <a:fillRect/>
+          </a:stretch>
+        </p:blipFill>
+        <p:spPr bwMode="auto">
+          <a:xfrm>
+            <a:off x="10334172" y="0"/>
+            <a:ext cx="3483428" cy="4180114"/>
+          </a:xfrm>
+          <a:prstGeom prst="rect">
+            <a:avLst/>
+          </a:prstGeom>
+          <a:noFill/>
+          <a:extLst>
+            <a:ext uri="{909E8E84-426E-40DD-AFC4-6F175D3DCCD1}">
+              <a14:hiddenFill xmlns:a14="http://schemas.microsoft.com/office/drawing/2010/main">
+                <a:solidFill>
+                  <a:srgbClr val="FFFFFF"/>
+                </a:solidFill>
+              </a14:hiddenFill>
+            </a:ext>
+          </a:extLst>
+        </p:spPr>
+      </p:pic>
+    </p:spTree>
+    <p:extLst>
+      <p:ext uri="{BB962C8B-B14F-4D97-AF65-F5344CB8AC3E}">
+        <p14:creationId xmlns:p14="http://schemas.microsoft.com/office/powerpoint/2010/main" val="876244202"/>
+      </p:ext>
+    </p:extLst>
+  </p:cSld>
+  <p:clrMapOvr>
+    <a:masterClrMapping/>
+  </p:clrMapOvr>
+  <mc:AlternateContent xmlns:mc="http://schemas.openxmlformats.org/markup-compatibility/2006" xmlns:p14="http://schemas.microsoft.com/office/powerpoint/2010/main">
+    <mc:Choice Requires="p14">
+      <p:transition p14:dur="300">
+        <p:fade/>
+      </p:transition>
+    </mc:Choice>
+    <mc:Fallback xmlns="">
+      <p:transition>
+        <p:fade/>
+      </p:transition>
+    </mc:Fallback>
+  </mc:AlternateContent>
+</p:sld>
+</file>
+
+<file path=ppt/slides/slide20.xml><?xml version="1.0" encoding="utf-8"?>
 <p:sld xmlns:a="http://schemas.openxmlformats.org/drawingml/2006/main" xmlns:r="http://schemas.openxmlformats.org/officeDocument/2006/relationships" xmlns:p="http://schemas.openxmlformats.org/presentationml/2006/main">
   <p:cSld>
     <p:spTree>
@@ -15002,7 +15820,7 @@
 </p:sld>
 </file>
 
-<file path=ppt/slides/slide19.xml><?xml version="1.0" encoding="utf-8"?>
+<file path=ppt/slides/slide21.xml><?xml version="1.0" encoding="utf-8"?>
 <p:sld xmlns:a="http://schemas.openxmlformats.org/drawingml/2006/main" xmlns:r="http://schemas.openxmlformats.org/officeDocument/2006/relationships" xmlns:p="http://schemas.openxmlformats.org/presentationml/2006/main">
   <p:cSld>
     <p:spTree>
@@ -15510,6 +16328,587 @@
           </a:p>
         </p:txBody>
       </p:sp>
+      <p:pic>
+        <p:nvPicPr>
+          <p:cNvPr id="3" name="Picture 2">
+            <a:extLst>
+              <a:ext uri="{FF2B5EF4-FFF2-40B4-BE49-F238E27FC236}">
+                <a16:creationId xmlns:a16="http://schemas.microsoft.com/office/drawing/2014/main" id="{86A5ECAB-7AB0-420D-B935-6E9DB4268B7B}"/>
+              </a:ext>
+            </a:extLst>
+          </p:cNvPr>
+          <p:cNvPicPr>
+            <a:picLocks noChangeAspect="1"/>
+          </p:cNvPicPr>
+          <p:nvPr/>
+        </p:nvPicPr>
+        <p:blipFill rotWithShape="1">
+          <a:blip r:embed="rId2"/>
+          <a:srcRect l="6381" t="36148" r="63997" b="24930"/>
+          <a:stretch/>
+        </p:blipFill>
+        <p:spPr>
+          <a:xfrm>
+            <a:off x="9427028" y="4299152"/>
+            <a:ext cx="4093029" cy="3025189"/>
+          </a:xfrm>
+          <a:prstGeom prst="rect">
+            <a:avLst/>
+          </a:prstGeom>
+          <a:ln>
+            <a:solidFill>
+              <a:schemeClr val="accent1"/>
+            </a:solidFill>
+          </a:ln>
+        </p:spPr>
+      </p:pic>
+    </p:spTree>
+    <p:extLst>
+      <p:ext uri="{BB962C8B-B14F-4D97-AF65-F5344CB8AC3E}">
+        <p14:creationId xmlns:p14="http://schemas.microsoft.com/office/powerpoint/2010/main" val="2264662996"/>
+      </p:ext>
+    </p:extLst>
+  </p:cSld>
+  <p:clrMapOvr>
+    <a:masterClrMapping/>
+  </p:clrMapOvr>
+  <mc:AlternateContent xmlns:mc="http://schemas.openxmlformats.org/markup-compatibility/2006" xmlns:p14="http://schemas.microsoft.com/office/powerpoint/2010/main">
+    <mc:Choice Requires="p14">
+      <p:transition p14:dur="300">
+        <p:fade/>
+      </p:transition>
+    </mc:Choice>
+    <mc:Fallback xmlns="">
+      <p:transition>
+        <p:fade/>
+      </p:transition>
+    </mc:Fallback>
+  </mc:AlternateContent>
+  <p:timing>
+    <p:tnLst>
+      <p:par>
+        <p:cTn id="1" dur="indefinite" restart="never" nodeType="tmRoot">
+          <p:childTnLst>
+            <p:seq concurrent="1" nextAc="seek">
+              <p:cTn id="2" dur="indefinite" nodeType="mainSeq">
+                <p:childTnLst>
+                  <p:par>
+                    <p:cTn id="3" fill="hold">
+                      <p:stCondLst>
+                        <p:cond delay="indefinite"/>
+                      </p:stCondLst>
+                      <p:childTnLst>
+                        <p:par>
+                          <p:cTn id="4" fill="hold">
+                            <p:stCondLst>
+                              <p:cond delay="0"/>
+                            </p:stCondLst>
+                            <p:childTnLst>
+                              <p:par>
+                                <p:cTn id="5" presetID="1" presetClass="entr" presetSubtype="0" fill="hold" nodeType="clickEffect">
+                                  <p:stCondLst>
+                                    <p:cond delay="0"/>
+                                  </p:stCondLst>
+                                  <p:childTnLst>
+                                    <p:set>
+                                      <p:cBhvr>
+                                        <p:cTn id="6" dur="1" fill="hold">
+                                          <p:stCondLst>
+                                            <p:cond delay="0"/>
+                                          </p:stCondLst>
+                                        </p:cTn>
+                                        <p:tgtEl>
+                                          <p:spTgt spid="3"/>
+                                        </p:tgtEl>
+                                        <p:attrNameLst>
+                                          <p:attrName>style.visibility</p:attrName>
+                                        </p:attrNameLst>
+                                      </p:cBhvr>
+                                      <p:to>
+                                        <p:strVal val="visible"/>
+                                      </p:to>
+                                    </p:set>
+                                  </p:childTnLst>
+                                </p:cTn>
+                              </p:par>
+                            </p:childTnLst>
+                          </p:cTn>
+                        </p:par>
+                      </p:childTnLst>
+                    </p:cTn>
+                  </p:par>
+                </p:childTnLst>
+              </p:cTn>
+              <p:prevCondLst>
+                <p:cond evt="onPrev" delay="0">
+                  <p:tgtEl>
+                    <p:sldTgt/>
+                  </p:tgtEl>
+                </p:cond>
+              </p:prevCondLst>
+              <p:nextCondLst>
+                <p:cond evt="onNext" delay="0">
+                  <p:tgtEl>
+                    <p:sldTgt/>
+                  </p:tgtEl>
+                </p:cond>
+              </p:nextCondLst>
+            </p:seq>
+          </p:childTnLst>
+        </p:cTn>
+      </p:par>
+    </p:tnLst>
+  </p:timing>
+</p:sld>
+</file>
+
+<file path=ppt/slides/slide22.xml><?xml version="1.0" encoding="utf-8"?>
+<p:sld xmlns:a="http://schemas.openxmlformats.org/drawingml/2006/main" xmlns:r="http://schemas.openxmlformats.org/officeDocument/2006/relationships" xmlns:p="http://schemas.openxmlformats.org/presentationml/2006/main">
+  <p:cSld>
+    <p:spTree>
+      <p:nvGrpSpPr>
+        <p:cNvPr id="1" name=""/>
+        <p:cNvGrpSpPr/>
+        <p:nvPr/>
+      </p:nvGrpSpPr>
+      <p:grpSpPr>
+        <a:xfrm>
+          <a:off x="0" y="0"/>
+          <a:ext cx="0" cy="0"/>
+          <a:chOff x="0" y="0"/>
+          <a:chExt cx="0" cy="0"/>
+        </a:xfrm>
+      </p:grpSpPr>
+      <p:sp>
+        <p:nvSpPr>
+          <p:cNvPr id="2" name="Title 1">
+            <a:extLst>
+              <a:ext uri="{FF2B5EF4-FFF2-40B4-BE49-F238E27FC236}">
+                <a16:creationId xmlns:a16="http://schemas.microsoft.com/office/drawing/2014/main" id="{B536806E-AD3E-AD40-936F-590919B5FCEE}"/>
+              </a:ext>
+            </a:extLst>
+          </p:cNvPr>
+          <p:cNvSpPr>
+            <a:spLocks noGrp="1"/>
+          </p:cNvSpPr>
+          <p:nvPr>
+            <p:ph type="title"/>
+          </p:nvPr>
+        </p:nvSpPr>
+        <p:spPr/>
+        <p:txBody>
+          <a:bodyPr/>
+          <a:lstStyle/>
+          <a:p>
+            <a:r>
+              <a:rPr lang="en-US" dirty="0"/>
+              <a:t>Quick Practice</a:t>
+            </a:r>
+          </a:p>
+        </p:txBody>
+      </p:sp>
+      <p:sp>
+        <p:nvSpPr>
+          <p:cNvPr id="5" name="TextBox 4">
+            <a:extLst>
+              <a:ext uri="{FF2B5EF4-FFF2-40B4-BE49-F238E27FC236}">
+                <a16:creationId xmlns:a16="http://schemas.microsoft.com/office/drawing/2014/main" id="{BC9EEA87-D34D-C34F-8D45-848ED96537EC}"/>
+              </a:ext>
+            </a:extLst>
+          </p:cNvPr>
+          <p:cNvSpPr txBox="1"/>
+          <p:nvPr/>
+        </p:nvSpPr>
+        <p:spPr>
+          <a:xfrm>
+            <a:off x="787960" y="1675865"/>
+            <a:ext cx="11506863" cy="400110"/>
+          </a:xfrm>
+          <a:prstGeom prst="rect">
+            <a:avLst/>
+          </a:prstGeom>
+          <a:noFill/>
+        </p:spPr>
+        <p:txBody>
+          <a:bodyPr wrap="square">
+            <a:spAutoFit/>
+          </a:bodyPr>
+          <a:lstStyle/>
+          <a:p>
+            <a:endParaRPr lang="en-US" dirty="0">
+              <a:latin typeface="Courier New" panose="02070309020205020404" pitchFamily="49" charset="0"/>
+              <a:cs typeface="Courier New" panose="02070309020205020404" pitchFamily="49" charset="0"/>
+            </a:endParaRPr>
+          </a:p>
+        </p:txBody>
+      </p:sp>
+      <p:sp>
+        <p:nvSpPr>
+          <p:cNvPr id="4" name="Rectangle 3"/>
+          <p:cNvSpPr/>
+          <p:nvPr/>
+        </p:nvSpPr>
+        <p:spPr>
+          <a:xfrm>
+            <a:off x="628075" y="1783924"/>
+            <a:ext cx="11209051" cy="4708981"/>
+          </a:xfrm>
+          <a:prstGeom prst="rect">
+            <a:avLst/>
+          </a:prstGeom>
+        </p:spPr>
+        <p:txBody>
+          <a:bodyPr wrap="square">
+            <a:spAutoFit/>
+          </a:bodyPr>
+          <a:lstStyle/>
+          <a:p>
+            <a:r>
+              <a:rPr lang="en-US" dirty="0">
+                <a:latin typeface="Courier New" panose="02070309020205020404" pitchFamily="49" charset="0"/>
+                <a:cs typeface="Courier New" panose="02070309020205020404" pitchFamily="49" charset="0"/>
+              </a:rPr>
+              <a:t>public class </a:t>
+            </a:r>
+            <a:r>
+              <a:rPr lang="en-US" dirty="0" err="1">
+                <a:latin typeface="Courier New" panose="02070309020205020404" pitchFamily="49" charset="0"/>
+                <a:cs typeface="Courier New" panose="02070309020205020404" pitchFamily="49" charset="0"/>
+              </a:rPr>
+              <a:t>StringFormatProgram</a:t>
+            </a:r>
+            <a:r>
+              <a:rPr lang="en-US" dirty="0">
+                <a:latin typeface="Courier New" panose="02070309020205020404" pitchFamily="49" charset="0"/>
+                <a:cs typeface="Courier New" panose="02070309020205020404" pitchFamily="49" charset="0"/>
+              </a:rPr>
+              <a:t> {</a:t>
+            </a:r>
+          </a:p>
+          <a:p>
+            <a:r>
+              <a:rPr lang="en-US" dirty="0">
+                <a:latin typeface="Courier New" panose="02070309020205020404" pitchFamily="49" charset="0"/>
+                <a:cs typeface="Courier New" panose="02070309020205020404" pitchFamily="49" charset="0"/>
+              </a:rPr>
+              <a:t>   public static void main(String[] </a:t>
+            </a:r>
+            <a:r>
+              <a:rPr lang="en-US" dirty="0" err="1">
+                <a:latin typeface="Courier New" panose="02070309020205020404" pitchFamily="49" charset="0"/>
+                <a:cs typeface="Courier New" panose="02070309020205020404" pitchFamily="49" charset="0"/>
+              </a:rPr>
+              <a:t>args</a:t>
+            </a:r>
+            <a:r>
+              <a:rPr lang="en-US" dirty="0">
+                <a:latin typeface="Courier New" panose="02070309020205020404" pitchFamily="49" charset="0"/>
+                <a:cs typeface="Courier New" panose="02070309020205020404" pitchFamily="49" charset="0"/>
+              </a:rPr>
+              <a:t>) {</a:t>
+            </a:r>
+          </a:p>
+          <a:p>
+            <a:r>
+              <a:rPr lang="en-US" dirty="0">
+                <a:latin typeface="Courier New" panose="02070309020205020404" pitchFamily="49" charset="0"/>
+                <a:cs typeface="Courier New" panose="02070309020205020404" pitchFamily="49" charset="0"/>
+              </a:rPr>
+              <a:t>      </a:t>
+            </a:r>
+            <a:r>
+              <a:rPr lang="en-US" dirty="0" err="1">
+                <a:latin typeface="Courier New" panose="02070309020205020404" pitchFamily="49" charset="0"/>
+                <a:cs typeface="Courier New" panose="02070309020205020404" pitchFamily="49" charset="0"/>
+              </a:rPr>
+              <a:t>int</a:t>
+            </a:r>
+            <a:r>
+              <a:rPr lang="en-US" dirty="0">
+                <a:latin typeface="Courier New" panose="02070309020205020404" pitchFamily="49" charset="0"/>
+                <a:cs typeface="Courier New" panose="02070309020205020404" pitchFamily="49" charset="0"/>
+              </a:rPr>
+              <a:t> value1 = 12;</a:t>
+            </a:r>
+          </a:p>
+          <a:p>
+            <a:r>
+              <a:rPr lang="en-US" dirty="0">
+                <a:latin typeface="Courier New" panose="02070309020205020404" pitchFamily="49" charset="0"/>
+                <a:cs typeface="Courier New" panose="02070309020205020404" pitchFamily="49" charset="0"/>
+              </a:rPr>
+              <a:t>      double value2 = 25.75986;</a:t>
+            </a:r>
+          </a:p>
+          <a:p>
+            <a:r>
+              <a:rPr lang="en-US" dirty="0">
+                <a:latin typeface="Courier New" panose="02070309020205020404" pitchFamily="49" charset="0"/>
+                <a:cs typeface="Courier New" panose="02070309020205020404" pitchFamily="49" charset="0"/>
+              </a:rPr>
+              <a:t>      String color = "red";</a:t>
+            </a:r>
+          </a:p>
+          <a:p>
+            <a:r>
+              <a:rPr lang="en-US" dirty="0">
+                <a:latin typeface="Courier New" panose="02070309020205020404" pitchFamily="49" charset="0"/>
+                <a:cs typeface="Courier New" panose="02070309020205020404" pitchFamily="49" charset="0"/>
+              </a:rPr>
+              <a:t>      </a:t>
+            </a:r>
+            <a:r>
+              <a:rPr lang="en-US" dirty="0" err="1">
+                <a:latin typeface="Courier New" panose="02070309020205020404" pitchFamily="49" charset="0"/>
+                <a:cs typeface="Courier New" panose="02070309020205020404" pitchFamily="49" charset="0"/>
+              </a:rPr>
+              <a:t>int</a:t>
+            </a:r>
+            <a:r>
+              <a:rPr lang="en-US" dirty="0">
+                <a:latin typeface="Courier New" panose="02070309020205020404" pitchFamily="49" charset="0"/>
+                <a:cs typeface="Courier New" panose="02070309020205020404" pitchFamily="49" charset="0"/>
+              </a:rPr>
+              <a:t> </a:t>
+            </a:r>
+            <a:r>
+              <a:rPr lang="en-US" dirty="0" err="1">
+                <a:latin typeface="Courier New" panose="02070309020205020404" pitchFamily="49" charset="0"/>
+                <a:cs typeface="Courier New" panose="02070309020205020404" pitchFamily="49" charset="0"/>
+              </a:rPr>
+              <a:t>len</a:t>
+            </a:r>
+            <a:r>
+              <a:rPr lang="en-US" dirty="0">
+                <a:latin typeface="Courier New" panose="02070309020205020404" pitchFamily="49" charset="0"/>
+                <a:cs typeface="Courier New" panose="02070309020205020404" pitchFamily="49" charset="0"/>
+              </a:rPr>
+              <a:t> = </a:t>
+            </a:r>
+            <a:r>
+              <a:rPr lang="en-US" dirty="0" err="1">
+                <a:latin typeface="Courier New" panose="02070309020205020404" pitchFamily="49" charset="0"/>
+                <a:cs typeface="Courier New" panose="02070309020205020404" pitchFamily="49" charset="0"/>
+              </a:rPr>
+              <a:t>color.length</a:t>
+            </a:r>
+            <a:r>
+              <a:rPr lang="en-US" dirty="0">
+                <a:latin typeface="Courier New" panose="02070309020205020404" pitchFamily="49" charset="0"/>
+                <a:cs typeface="Courier New" panose="02070309020205020404" pitchFamily="49" charset="0"/>
+              </a:rPr>
+              <a:t>();</a:t>
+            </a:r>
+          </a:p>
+          <a:p>
+            <a:r>
+              <a:rPr lang="en-US" dirty="0">
+                <a:latin typeface="Courier New" panose="02070309020205020404" pitchFamily="49" charset="0"/>
+                <a:cs typeface="Courier New" panose="02070309020205020404" pitchFamily="49" charset="0"/>
+              </a:rPr>
+              <a:t>      </a:t>
+            </a:r>
+            <a:r>
+              <a:rPr lang="en-US" dirty="0" err="1">
+                <a:latin typeface="Courier New" panose="02070309020205020404" pitchFamily="49" charset="0"/>
+                <a:cs typeface="Courier New" panose="02070309020205020404" pitchFamily="49" charset="0"/>
+              </a:rPr>
+              <a:t>System.out.println</a:t>
+            </a:r>
+            <a:r>
+              <a:rPr lang="en-US" dirty="0">
+                <a:latin typeface="Courier New" panose="02070309020205020404" pitchFamily="49" charset="0"/>
+                <a:cs typeface="Courier New" panose="02070309020205020404" pitchFamily="49" charset="0"/>
+              </a:rPr>
+              <a:t>("Length of color: " + </a:t>
+            </a:r>
+            <a:r>
+              <a:rPr lang="en-US" dirty="0" err="1">
+                <a:latin typeface="Courier New" panose="02070309020205020404" pitchFamily="49" charset="0"/>
+                <a:cs typeface="Courier New" panose="02070309020205020404" pitchFamily="49" charset="0"/>
+              </a:rPr>
+              <a:t>len</a:t>
+            </a:r>
+            <a:r>
+              <a:rPr lang="en-US" dirty="0">
+                <a:latin typeface="Courier New" panose="02070309020205020404" pitchFamily="49" charset="0"/>
+                <a:cs typeface="Courier New" panose="02070309020205020404" pitchFamily="49" charset="0"/>
+              </a:rPr>
+              <a:t>);</a:t>
+            </a:r>
+          </a:p>
+          <a:p>
+            <a:r>
+              <a:rPr lang="en-US" dirty="0">
+                <a:latin typeface="Courier New" panose="02070309020205020404" pitchFamily="49" charset="0"/>
+                <a:cs typeface="Courier New" panose="02070309020205020404" pitchFamily="49" charset="0"/>
+              </a:rPr>
+              <a:t>      </a:t>
+            </a:r>
+            <a:r>
+              <a:rPr lang="en-US" dirty="0" err="1">
+                <a:latin typeface="Courier New" panose="02070309020205020404" pitchFamily="49" charset="0"/>
+                <a:cs typeface="Courier New" panose="02070309020205020404" pitchFamily="49" charset="0"/>
+              </a:rPr>
+              <a:t>System.out.println</a:t>
+            </a:r>
+            <a:r>
+              <a:rPr lang="en-US" dirty="0">
+                <a:latin typeface="Courier New" panose="02070309020205020404" pitchFamily="49" charset="0"/>
+                <a:cs typeface="Courier New" panose="02070309020205020404" pitchFamily="49" charset="0"/>
+              </a:rPr>
+              <a:t>("First letter of color: " + </a:t>
+            </a:r>
+            <a:r>
+              <a:rPr lang="en-US" dirty="0" err="1">
+                <a:latin typeface="Courier New" panose="02070309020205020404" pitchFamily="49" charset="0"/>
+                <a:cs typeface="Courier New" panose="02070309020205020404" pitchFamily="49" charset="0"/>
+              </a:rPr>
+              <a:t>color.charAt</a:t>
+            </a:r>
+            <a:r>
+              <a:rPr lang="en-US" dirty="0">
+                <a:latin typeface="Courier New" panose="02070309020205020404" pitchFamily="49" charset="0"/>
+                <a:cs typeface="Courier New" panose="02070309020205020404" pitchFamily="49" charset="0"/>
+              </a:rPr>
+              <a:t>(0));</a:t>
+            </a:r>
+          </a:p>
+          <a:p>
+            <a:r>
+              <a:rPr lang="en-US" dirty="0">
+                <a:latin typeface="Courier New" panose="02070309020205020404" pitchFamily="49" charset="0"/>
+                <a:cs typeface="Courier New" panose="02070309020205020404" pitchFamily="49" charset="0"/>
+              </a:rPr>
+              <a:t>      </a:t>
+            </a:r>
+            <a:r>
+              <a:rPr lang="en-US" dirty="0" err="1">
+                <a:latin typeface="Courier New" panose="02070309020205020404" pitchFamily="49" charset="0"/>
+                <a:cs typeface="Courier New" panose="02070309020205020404" pitchFamily="49" charset="0"/>
+              </a:rPr>
+              <a:t>System.out.printf</a:t>
+            </a:r>
+            <a:r>
+              <a:rPr lang="en-US" dirty="0">
+                <a:latin typeface="Courier New" panose="02070309020205020404" pitchFamily="49" charset="0"/>
+                <a:cs typeface="Courier New" panose="02070309020205020404" pitchFamily="49" charset="0"/>
+              </a:rPr>
+              <a:t>("%d\n", value1);</a:t>
+            </a:r>
+          </a:p>
+          <a:p>
+            <a:r>
+              <a:rPr lang="en-US" dirty="0">
+                <a:latin typeface="Courier New" panose="02070309020205020404" pitchFamily="49" charset="0"/>
+                <a:cs typeface="Courier New" panose="02070309020205020404" pitchFamily="49" charset="0"/>
+              </a:rPr>
+              <a:t>      </a:t>
+            </a:r>
+            <a:r>
+              <a:rPr lang="en-US" dirty="0" err="1">
+                <a:latin typeface="Courier New" panose="02070309020205020404" pitchFamily="49" charset="0"/>
+                <a:cs typeface="Courier New" panose="02070309020205020404" pitchFamily="49" charset="0"/>
+              </a:rPr>
+              <a:t>System.out.printf</a:t>
+            </a:r>
+            <a:r>
+              <a:rPr lang="en-US" dirty="0">
+                <a:latin typeface="Courier New" panose="02070309020205020404" pitchFamily="49" charset="0"/>
+                <a:cs typeface="Courier New" panose="02070309020205020404" pitchFamily="49" charset="0"/>
+              </a:rPr>
+              <a:t>("%.2f\n", value2);</a:t>
+            </a:r>
+          </a:p>
+          <a:p>
+            <a:r>
+              <a:rPr lang="en-US" dirty="0">
+                <a:latin typeface="Courier New" panose="02070309020205020404" pitchFamily="49" charset="0"/>
+                <a:cs typeface="Courier New" panose="02070309020205020404" pitchFamily="49" charset="0"/>
+              </a:rPr>
+              <a:t>      </a:t>
+            </a:r>
+            <a:r>
+              <a:rPr lang="en-US" dirty="0" err="1">
+                <a:latin typeface="Courier New" panose="02070309020205020404" pitchFamily="49" charset="0"/>
+                <a:cs typeface="Courier New" panose="02070309020205020404" pitchFamily="49" charset="0"/>
+              </a:rPr>
+              <a:t>System.out.printf</a:t>
+            </a:r>
+            <a:r>
+              <a:rPr lang="en-US" dirty="0">
+                <a:latin typeface="Courier New" panose="02070309020205020404" pitchFamily="49" charset="0"/>
+                <a:cs typeface="Courier New" panose="02070309020205020404" pitchFamily="49" charset="0"/>
+              </a:rPr>
+              <a:t>("%20.2f\n", value2);</a:t>
+            </a:r>
+          </a:p>
+          <a:p>
+            <a:r>
+              <a:rPr lang="en-US" dirty="0">
+                <a:latin typeface="Courier New" panose="02070309020205020404" pitchFamily="49" charset="0"/>
+                <a:cs typeface="Courier New" panose="02070309020205020404" pitchFamily="49" charset="0"/>
+              </a:rPr>
+              <a:t>      </a:t>
+            </a:r>
+            <a:r>
+              <a:rPr lang="en-US" dirty="0" err="1">
+                <a:latin typeface="Courier New" panose="02070309020205020404" pitchFamily="49" charset="0"/>
+                <a:cs typeface="Courier New" panose="02070309020205020404" pitchFamily="49" charset="0"/>
+              </a:rPr>
+              <a:t>System.out.printf</a:t>
+            </a:r>
+            <a:r>
+              <a:rPr lang="en-US" dirty="0">
+                <a:latin typeface="Courier New" panose="02070309020205020404" pitchFamily="49" charset="0"/>
+                <a:cs typeface="Courier New" panose="02070309020205020404" pitchFamily="49" charset="0"/>
+              </a:rPr>
+              <a:t>("%s\n", color);</a:t>
+            </a:r>
+          </a:p>
+          <a:p>
+            <a:r>
+              <a:rPr lang="en-US" dirty="0">
+                <a:latin typeface="Courier New" panose="02070309020205020404" pitchFamily="49" charset="0"/>
+                <a:cs typeface="Courier New" panose="02070309020205020404" pitchFamily="49" charset="0"/>
+              </a:rPr>
+              <a:t>      </a:t>
+            </a:r>
+            <a:r>
+              <a:rPr lang="en-US" dirty="0" err="1">
+                <a:latin typeface="Courier New" panose="02070309020205020404" pitchFamily="49" charset="0"/>
+                <a:cs typeface="Courier New" panose="02070309020205020404" pitchFamily="49" charset="0"/>
+              </a:rPr>
+              <a:t>System.out.printf</a:t>
+            </a:r>
+            <a:r>
+              <a:rPr lang="en-US" dirty="0">
+                <a:latin typeface="Courier New" panose="02070309020205020404" pitchFamily="49" charset="0"/>
+                <a:cs typeface="Courier New" panose="02070309020205020404" pitchFamily="49" charset="0"/>
+              </a:rPr>
+              <a:t>("%S\n", color);</a:t>
+            </a:r>
+          </a:p>
+          <a:p>
+            <a:r>
+              <a:rPr lang="en-US" dirty="0">
+                <a:latin typeface="Courier New" panose="02070309020205020404" pitchFamily="49" charset="0"/>
+                <a:cs typeface="Courier New" panose="02070309020205020404" pitchFamily="49" charset="0"/>
+              </a:rPr>
+              <a:t>   }  </a:t>
+            </a:r>
+          </a:p>
+          <a:p>
+            <a:r>
+              <a:rPr lang="en-US" dirty="0">
+                <a:latin typeface="Courier New" panose="02070309020205020404" pitchFamily="49" charset="0"/>
+                <a:cs typeface="Courier New" panose="02070309020205020404" pitchFamily="49" charset="0"/>
+              </a:rPr>
+              <a:t>}</a:t>
+            </a:r>
+          </a:p>
+        </p:txBody>
+      </p:sp>
       <p:sp>
         <p:nvSpPr>
           <p:cNvPr id="7" name="Rectangle 6">
@@ -15609,6 +17008,1430 @@
               <a:ea typeface="Proxima Nova" charset="0"/>
               <a:cs typeface="Proxima Nova" charset="0"/>
             </a:endParaRPr>
+          </a:p>
+        </p:txBody>
+      </p:sp>
+    </p:spTree>
+    <p:extLst>
+      <p:ext uri="{BB962C8B-B14F-4D97-AF65-F5344CB8AC3E}">
+        <p14:creationId xmlns:p14="http://schemas.microsoft.com/office/powerpoint/2010/main" val="4151940406"/>
+      </p:ext>
+    </p:extLst>
+  </p:cSld>
+  <p:clrMapOvr>
+    <a:masterClrMapping/>
+  </p:clrMapOvr>
+  <mc:AlternateContent xmlns:mc="http://schemas.openxmlformats.org/markup-compatibility/2006" xmlns:p14="http://schemas.microsoft.com/office/powerpoint/2010/main">
+    <mc:Choice Requires="p14">
+      <p:transition p14:dur="300">
+        <p:fade/>
+      </p:transition>
+    </mc:Choice>
+    <mc:Fallback xmlns="">
+      <p:transition>
+        <p:fade/>
+      </p:transition>
+    </mc:Fallback>
+  </mc:AlternateContent>
+</p:sld>
+</file>
+
+<file path=ppt/slides/slide23.xml><?xml version="1.0" encoding="utf-8"?>
+<p:sld xmlns:a="http://schemas.openxmlformats.org/drawingml/2006/main" xmlns:r="http://schemas.openxmlformats.org/officeDocument/2006/relationships" xmlns:p="http://schemas.openxmlformats.org/presentationml/2006/main">
+  <p:cSld>
+    <p:spTree>
+      <p:nvGrpSpPr>
+        <p:cNvPr id="1" name=""/>
+        <p:cNvGrpSpPr/>
+        <p:nvPr/>
+      </p:nvGrpSpPr>
+      <p:grpSpPr>
+        <a:xfrm>
+          <a:off x="0" y="0"/>
+          <a:ext cx="0" cy="0"/>
+          <a:chOff x="0" y="0"/>
+          <a:chExt cx="0" cy="0"/>
+        </a:xfrm>
+      </p:grpSpPr>
+      <p:sp>
+        <p:nvSpPr>
+          <p:cNvPr id="2" name="Title 1">
+            <a:extLst>
+              <a:ext uri="{FF2B5EF4-FFF2-40B4-BE49-F238E27FC236}">
+                <a16:creationId xmlns:a16="http://schemas.microsoft.com/office/drawing/2014/main" id="{B536806E-AD3E-AD40-936F-590919B5FCEE}"/>
+              </a:ext>
+            </a:extLst>
+          </p:cNvPr>
+          <p:cNvSpPr>
+            <a:spLocks noGrp="1"/>
+          </p:cNvSpPr>
+          <p:nvPr>
+            <p:ph type="title"/>
+          </p:nvPr>
+        </p:nvSpPr>
+        <p:spPr/>
+        <p:txBody>
+          <a:bodyPr/>
+          <a:lstStyle/>
+          <a:p>
+            <a:r>
+              <a:rPr lang="en-US" dirty="0"/>
+              <a:t>Quick Practice</a:t>
+            </a:r>
+          </a:p>
+        </p:txBody>
+      </p:sp>
+      <p:sp>
+        <p:nvSpPr>
+          <p:cNvPr id="5" name="TextBox 4">
+            <a:extLst>
+              <a:ext uri="{FF2B5EF4-FFF2-40B4-BE49-F238E27FC236}">
+                <a16:creationId xmlns:a16="http://schemas.microsoft.com/office/drawing/2014/main" id="{BC9EEA87-D34D-C34F-8D45-848ED96537EC}"/>
+              </a:ext>
+            </a:extLst>
+          </p:cNvPr>
+          <p:cNvSpPr txBox="1"/>
+          <p:nvPr/>
+        </p:nvSpPr>
+        <p:spPr>
+          <a:xfrm>
+            <a:off x="787960" y="1675865"/>
+            <a:ext cx="11506863" cy="400110"/>
+          </a:xfrm>
+          <a:prstGeom prst="rect">
+            <a:avLst/>
+          </a:prstGeom>
+          <a:noFill/>
+        </p:spPr>
+        <p:txBody>
+          <a:bodyPr wrap="square">
+            <a:spAutoFit/>
+          </a:bodyPr>
+          <a:lstStyle/>
+          <a:p>
+            <a:endParaRPr lang="en-US" dirty="0">
+              <a:latin typeface="Courier New" panose="02070309020205020404" pitchFamily="49" charset="0"/>
+              <a:cs typeface="Courier New" panose="02070309020205020404" pitchFamily="49" charset="0"/>
+            </a:endParaRPr>
+          </a:p>
+        </p:txBody>
+      </p:sp>
+      <p:sp>
+        <p:nvSpPr>
+          <p:cNvPr id="4" name="Rectangle 3"/>
+          <p:cNvSpPr/>
+          <p:nvPr/>
+        </p:nvSpPr>
+        <p:spPr>
+          <a:xfrm>
+            <a:off x="628075" y="1783924"/>
+            <a:ext cx="11209051" cy="4708981"/>
+          </a:xfrm>
+          <a:prstGeom prst="rect">
+            <a:avLst/>
+          </a:prstGeom>
+        </p:spPr>
+        <p:txBody>
+          <a:bodyPr wrap="square">
+            <a:spAutoFit/>
+          </a:bodyPr>
+          <a:lstStyle/>
+          <a:p>
+            <a:r>
+              <a:rPr lang="en-US" dirty="0">
+                <a:latin typeface="Courier New" panose="02070309020205020404" pitchFamily="49" charset="0"/>
+                <a:cs typeface="Courier New" panose="02070309020205020404" pitchFamily="49" charset="0"/>
+              </a:rPr>
+              <a:t>public class </a:t>
+            </a:r>
+            <a:r>
+              <a:rPr lang="en-US" dirty="0" err="1">
+                <a:latin typeface="Courier New" panose="02070309020205020404" pitchFamily="49" charset="0"/>
+                <a:cs typeface="Courier New" panose="02070309020205020404" pitchFamily="49" charset="0"/>
+              </a:rPr>
+              <a:t>StringFormatProgram</a:t>
+            </a:r>
+            <a:r>
+              <a:rPr lang="en-US" dirty="0">
+                <a:latin typeface="Courier New" panose="02070309020205020404" pitchFamily="49" charset="0"/>
+                <a:cs typeface="Courier New" panose="02070309020205020404" pitchFamily="49" charset="0"/>
+              </a:rPr>
+              <a:t> {</a:t>
+            </a:r>
+          </a:p>
+          <a:p>
+            <a:r>
+              <a:rPr lang="en-US" dirty="0">
+                <a:latin typeface="Courier New" panose="02070309020205020404" pitchFamily="49" charset="0"/>
+                <a:cs typeface="Courier New" panose="02070309020205020404" pitchFamily="49" charset="0"/>
+              </a:rPr>
+              <a:t>   public static void main(String[] </a:t>
+            </a:r>
+            <a:r>
+              <a:rPr lang="en-US" dirty="0" err="1">
+                <a:latin typeface="Courier New" panose="02070309020205020404" pitchFamily="49" charset="0"/>
+                <a:cs typeface="Courier New" panose="02070309020205020404" pitchFamily="49" charset="0"/>
+              </a:rPr>
+              <a:t>args</a:t>
+            </a:r>
+            <a:r>
+              <a:rPr lang="en-US" dirty="0">
+                <a:latin typeface="Courier New" panose="02070309020205020404" pitchFamily="49" charset="0"/>
+                <a:cs typeface="Courier New" panose="02070309020205020404" pitchFamily="49" charset="0"/>
+              </a:rPr>
+              <a:t>) {</a:t>
+            </a:r>
+          </a:p>
+          <a:p>
+            <a:r>
+              <a:rPr lang="en-US" dirty="0">
+                <a:latin typeface="Courier New" panose="02070309020205020404" pitchFamily="49" charset="0"/>
+                <a:cs typeface="Courier New" panose="02070309020205020404" pitchFamily="49" charset="0"/>
+              </a:rPr>
+              <a:t>      </a:t>
+            </a:r>
+            <a:r>
+              <a:rPr lang="en-US" dirty="0" err="1">
+                <a:latin typeface="Courier New" panose="02070309020205020404" pitchFamily="49" charset="0"/>
+                <a:cs typeface="Courier New" panose="02070309020205020404" pitchFamily="49" charset="0"/>
+              </a:rPr>
+              <a:t>int</a:t>
+            </a:r>
+            <a:r>
+              <a:rPr lang="en-US" dirty="0">
+                <a:latin typeface="Courier New" panose="02070309020205020404" pitchFamily="49" charset="0"/>
+                <a:cs typeface="Courier New" panose="02070309020205020404" pitchFamily="49" charset="0"/>
+              </a:rPr>
+              <a:t> value1 = 12;</a:t>
+            </a:r>
+          </a:p>
+          <a:p>
+            <a:r>
+              <a:rPr lang="en-US" dirty="0">
+                <a:latin typeface="Courier New" panose="02070309020205020404" pitchFamily="49" charset="0"/>
+                <a:cs typeface="Courier New" panose="02070309020205020404" pitchFamily="49" charset="0"/>
+              </a:rPr>
+              <a:t>      double value2 = 25.75986;</a:t>
+            </a:r>
+          </a:p>
+          <a:p>
+            <a:r>
+              <a:rPr lang="en-US" dirty="0">
+                <a:latin typeface="Courier New" panose="02070309020205020404" pitchFamily="49" charset="0"/>
+                <a:cs typeface="Courier New" panose="02070309020205020404" pitchFamily="49" charset="0"/>
+              </a:rPr>
+              <a:t>      String color = "red";</a:t>
+            </a:r>
+          </a:p>
+          <a:p>
+            <a:r>
+              <a:rPr lang="en-US" dirty="0">
+                <a:latin typeface="Courier New" panose="02070309020205020404" pitchFamily="49" charset="0"/>
+                <a:cs typeface="Courier New" panose="02070309020205020404" pitchFamily="49" charset="0"/>
+              </a:rPr>
+              <a:t>      </a:t>
+            </a:r>
+            <a:r>
+              <a:rPr lang="en-US" dirty="0" err="1">
+                <a:latin typeface="Courier New" panose="02070309020205020404" pitchFamily="49" charset="0"/>
+                <a:cs typeface="Courier New" panose="02070309020205020404" pitchFamily="49" charset="0"/>
+              </a:rPr>
+              <a:t>int</a:t>
+            </a:r>
+            <a:r>
+              <a:rPr lang="en-US" dirty="0">
+                <a:latin typeface="Courier New" panose="02070309020205020404" pitchFamily="49" charset="0"/>
+                <a:cs typeface="Courier New" panose="02070309020205020404" pitchFamily="49" charset="0"/>
+              </a:rPr>
+              <a:t> </a:t>
+            </a:r>
+            <a:r>
+              <a:rPr lang="en-US" dirty="0" err="1">
+                <a:latin typeface="Courier New" panose="02070309020205020404" pitchFamily="49" charset="0"/>
+                <a:cs typeface="Courier New" panose="02070309020205020404" pitchFamily="49" charset="0"/>
+              </a:rPr>
+              <a:t>len</a:t>
+            </a:r>
+            <a:r>
+              <a:rPr lang="en-US" dirty="0">
+                <a:latin typeface="Courier New" panose="02070309020205020404" pitchFamily="49" charset="0"/>
+                <a:cs typeface="Courier New" panose="02070309020205020404" pitchFamily="49" charset="0"/>
+              </a:rPr>
+              <a:t> = </a:t>
+            </a:r>
+            <a:r>
+              <a:rPr lang="en-US" dirty="0" err="1">
+                <a:latin typeface="Courier New" panose="02070309020205020404" pitchFamily="49" charset="0"/>
+                <a:cs typeface="Courier New" panose="02070309020205020404" pitchFamily="49" charset="0"/>
+              </a:rPr>
+              <a:t>color.length</a:t>
+            </a:r>
+            <a:r>
+              <a:rPr lang="en-US" dirty="0">
+                <a:latin typeface="Courier New" panose="02070309020205020404" pitchFamily="49" charset="0"/>
+                <a:cs typeface="Courier New" panose="02070309020205020404" pitchFamily="49" charset="0"/>
+              </a:rPr>
+              <a:t>();</a:t>
+            </a:r>
+          </a:p>
+          <a:p>
+            <a:r>
+              <a:rPr lang="en-US" dirty="0">
+                <a:latin typeface="Courier New" panose="02070309020205020404" pitchFamily="49" charset="0"/>
+                <a:cs typeface="Courier New" panose="02070309020205020404" pitchFamily="49" charset="0"/>
+              </a:rPr>
+              <a:t>      </a:t>
+            </a:r>
+          </a:p>
+          <a:p>
+            <a:r>
+              <a:rPr lang="en-US" dirty="0">
+                <a:latin typeface="Courier New" panose="02070309020205020404" pitchFamily="49" charset="0"/>
+                <a:cs typeface="Courier New" panose="02070309020205020404" pitchFamily="49" charset="0"/>
+              </a:rPr>
+              <a:t>	</a:t>
+            </a:r>
+          </a:p>
+          <a:p>
+            <a:r>
+              <a:rPr lang="en-US" dirty="0">
+                <a:latin typeface="Courier New" panose="02070309020205020404" pitchFamily="49" charset="0"/>
+                <a:cs typeface="Courier New" panose="02070309020205020404" pitchFamily="49" charset="0"/>
+              </a:rPr>
+              <a:t>      </a:t>
+            </a:r>
+            <a:r>
+              <a:rPr lang="en-US" dirty="0" err="1">
+                <a:latin typeface="Courier New" panose="02070309020205020404" pitchFamily="49" charset="0"/>
+                <a:cs typeface="Courier New" panose="02070309020205020404" pitchFamily="49" charset="0"/>
+              </a:rPr>
+              <a:t>System.out.printf</a:t>
+            </a:r>
+            <a:r>
+              <a:rPr lang="en-US" dirty="0">
+                <a:latin typeface="Courier New" panose="02070309020205020404" pitchFamily="49" charset="0"/>
+                <a:cs typeface="Courier New" panose="02070309020205020404" pitchFamily="49" charset="0"/>
+              </a:rPr>
+              <a:t>("%d\n", value1);</a:t>
+            </a:r>
+          </a:p>
+          <a:p>
+            <a:r>
+              <a:rPr lang="en-US" dirty="0">
+                <a:latin typeface="Courier New" panose="02070309020205020404" pitchFamily="49" charset="0"/>
+                <a:cs typeface="Courier New" panose="02070309020205020404" pitchFamily="49" charset="0"/>
+              </a:rPr>
+              <a:t>      </a:t>
+            </a:r>
+            <a:r>
+              <a:rPr lang="en-US" dirty="0" err="1">
+                <a:latin typeface="Courier New" panose="02070309020205020404" pitchFamily="49" charset="0"/>
+                <a:cs typeface="Courier New" panose="02070309020205020404" pitchFamily="49" charset="0"/>
+              </a:rPr>
+              <a:t>System.out.printf</a:t>
+            </a:r>
+            <a:r>
+              <a:rPr lang="en-US" dirty="0">
+                <a:latin typeface="Courier New" panose="02070309020205020404" pitchFamily="49" charset="0"/>
+                <a:cs typeface="Courier New" panose="02070309020205020404" pitchFamily="49" charset="0"/>
+              </a:rPr>
+              <a:t>("%.2f\n", value2);</a:t>
+            </a:r>
+          </a:p>
+          <a:p>
+            <a:r>
+              <a:rPr lang="en-US" dirty="0">
+                <a:latin typeface="Courier New" panose="02070309020205020404" pitchFamily="49" charset="0"/>
+                <a:cs typeface="Courier New" panose="02070309020205020404" pitchFamily="49" charset="0"/>
+              </a:rPr>
+              <a:t>      </a:t>
+            </a:r>
+            <a:r>
+              <a:rPr lang="en-US" dirty="0" err="1">
+                <a:latin typeface="Courier New" panose="02070309020205020404" pitchFamily="49" charset="0"/>
+                <a:cs typeface="Courier New" panose="02070309020205020404" pitchFamily="49" charset="0"/>
+              </a:rPr>
+              <a:t>System.out.printf</a:t>
+            </a:r>
+            <a:r>
+              <a:rPr lang="en-US" dirty="0">
+                <a:latin typeface="Courier New" panose="02070309020205020404" pitchFamily="49" charset="0"/>
+                <a:cs typeface="Courier New" panose="02070309020205020404" pitchFamily="49" charset="0"/>
+              </a:rPr>
+              <a:t>("%20.2f\n", value2);</a:t>
+            </a:r>
+          </a:p>
+          <a:p>
+            <a:r>
+              <a:rPr lang="en-US" dirty="0">
+                <a:latin typeface="Courier New" panose="02070309020205020404" pitchFamily="49" charset="0"/>
+                <a:cs typeface="Courier New" panose="02070309020205020404" pitchFamily="49" charset="0"/>
+              </a:rPr>
+              <a:t>      </a:t>
+            </a:r>
+            <a:r>
+              <a:rPr lang="en-US" dirty="0" err="1">
+                <a:latin typeface="Courier New" panose="02070309020205020404" pitchFamily="49" charset="0"/>
+                <a:cs typeface="Courier New" panose="02070309020205020404" pitchFamily="49" charset="0"/>
+              </a:rPr>
+              <a:t>System.out.printf</a:t>
+            </a:r>
+            <a:r>
+              <a:rPr lang="en-US" dirty="0">
+                <a:latin typeface="Courier New" panose="02070309020205020404" pitchFamily="49" charset="0"/>
+                <a:cs typeface="Courier New" panose="02070309020205020404" pitchFamily="49" charset="0"/>
+              </a:rPr>
+              <a:t>("%s\n", color);</a:t>
+            </a:r>
+          </a:p>
+          <a:p>
+            <a:r>
+              <a:rPr lang="en-US" dirty="0">
+                <a:latin typeface="Courier New" panose="02070309020205020404" pitchFamily="49" charset="0"/>
+                <a:cs typeface="Courier New" panose="02070309020205020404" pitchFamily="49" charset="0"/>
+              </a:rPr>
+              <a:t>      </a:t>
+            </a:r>
+            <a:r>
+              <a:rPr lang="en-US" dirty="0" err="1">
+                <a:latin typeface="Courier New" panose="02070309020205020404" pitchFamily="49" charset="0"/>
+                <a:cs typeface="Courier New" panose="02070309020205020404" pitchFamily="49" charset="0"/>
+              </a:rPr>
+              <a:t>System.out.printf</a:t>
+            </a:r>
+            <a:r>
+              <a:rPr lang="en-US" dirty="0">
+                <a:latin typeface="Courier New" panose="02070309020205020404" pitchFamily="49" charset="0"/>
+                <a:cs typeface="Courier New" panose="02070309020205020404" pitchFamily="49" charset="0"/>
+              </a:rPr>
+              <a:t>("%S\n", color);</a:t>
+            </a:r>
+          </a:p>
+          <a:p>
+            <a:r>
+              <a:rPr lang="en-US" dirty="0">
+                <a:latin typeface="Courier New" panose="02070309020205020404" pitchFamily="49" charset="0"/>
+                <a:cs typeface="Courier New" panose="02070309020205020404" pitchFamily="49" charset="0"/>
+              </a:rPr>
+              <a:t>   }  </a:t>
+            </a:r>
+          </a:p>
+          <a:p>
+            <a:r>
+              <a:rPr lang="en-US" dirty="0">
+                <a:latin typeface="Courier New" panose="02070309020205020404" pitchFamily="49" charset="0"/>
+                <a:cs typeface="Courier New" panose="02070309020205020404" pitchFamily="49" charset="0"/>
+              </a:rPr>
+              <a:t>}</a:t>
+            </a:r>
+          </a:p>
+        </p:txBody>
+      </p:sp>
+      <p:sp>
+        <p:nvSpPr>
+          <p:cNvPr id="3" name="Rectangle 1">
+            <a:extLst>
+              <a:ext uri="{FF2B5EF4-FFF2-40B4-BE49-F238E27FC236}">
+                <a16:creationId xmlns:a16="http://schemas.microsoft.com/office/drawing/2014/main" id="{0899DD9E-B5F8-4D99-98F7-7C57134C173A}"/>
+              </a:ext>
+            </a:extLst>
+          </p:cNvPr>
+          <p:cNvSpPr>
+            <a:spLocks noChangeArrowheads="1"/>
+          </p:cNvSpPr>
+          <p:nvPr/>
+        </p:nvSpPr>
+        <p:spPr bwMode="auto">
+          <a:xfrm>
+            <a:off x="1524000" y="3628930"/>
+            <a:ext cx="7571303" cy="400110"/>
+          </a:xfrm>
+          <a:prstGeom prst="rect">
+            <a:avLst/>
+          </a:prstGeom>
+          <a:solidFill>
+            <a:srgbClr val="FFFFFF"/>
+          </a:solidFill>
+          <a:ln>
+            <a:noFill/>
+          </a:ln>
+          <a:effectLst/>
+          <a:extLst>
+            <a:ext uri="{91240B29-F687-4F45-9708-019B960494DF}">
+              <a14:hiddenLine xmlns:a14="http://schemas.microsoft.com/office/drawing/2010/main" w="9525">
+                <a:solidFill>
+                  <a:schemeClr val="tx1"/>
+                </a:solidFill>
+                <a:miter lim="800000"/>
+                <a:headEnd/>
+                <a:tailEnd/>
+              </a14:hiddenLine>
+            </a:ext>
+            <a:ext uri="{AF507438-7753-43E0-B8FC-AC1667EBCBE1}">
+              <a14:hiddenEffects xmlns:a14="http://schemas.microsoft.com/office/drawing/2010/main">
+                <a:effectLst>
+                  <a:outerShdw dist="35921" dir="2700000" algn="ctr" rotWithShape="0">
+                    <a:schemeClr val="bg2"/>
+                  </a:outerShdw>
+                </a:effectLst>
+              </a14:hiddenEffects>
+            </a:ext>
+          </a:extLst>
+        </p:spPr>
+        <p:txBody>
+          <a:bodyPr vert="horz" wrap="none" lIns="91440" tIns="45720" rIns="91440" bIns="45720" numCol="1" anchor="ctr" anchorCtr="0" compatLnSpc="1">
+            <a:prstTxWarp prst="textNoShape">
+              <a:avLst/>
+            </a:prstTxWarp>
+            <a:spAutoFit/>
+          </a:bodyPr>
+          <a:lstStyle/>
+          <a:p>
+            <a:pPr marL="0" marR="0" lvl="0" indent="0" algn="l" defTabSz="914400" rtl="0" eaLnBrk="0" fontAlgn="base" latinLnBrk="0" hangingPunct="0">
+              <a:lnSpc>
+                <a:spcPct val="100000"/>
+              </a:lnSpc>
+              <a:spcBef>
+                <a:spcPct val="0"/>
+              </a:spcBef>
+              <a:spcAft>
+                <a:spcPct val="0"/>
+              </a:spcAft>
+              <a:buClrTx/>
+              <a:buSzTx/>
+              <a:buFontTx/>
+              <a:buNone/>
+              <a:tabLst/>
+            </a:pPr>
+            <a:r>
+              <a:rPr kumimoji="0" lang="en-US" altLang="en-US" b="1" i="0" u="none" strike="noStrike" cap="none" normalizeH="0" baseline="0" dirty="0" err="1">
+                <a:ln>
+                  <a:noFill/>
+                </a:ln>
+                <a:solidFill>
+                  <a:srgbClr val="000000"/>
+                </a:solidFill>
+                <a:effectLst/>
+                <a:latin typeface="Courier New" panose="02070309020205020404" pitchFamily="49" charset="0"/>
+                <a:cs typeface="Courier New" panose="02070309020205020404" pitchFamily="49" charset="0"/>
+              </a:rPr>
+              <a:t>System</a:t>
+            </a:r>
+            <a:r>
+              <a:rPr kumimoji="0" lang="en-US" altLang="en-US" b="1" i="0" u="none" strike="noStrike" cap="none" normalizeH="0" baseline="0" dirty="0" err="1">
+                <a:ln>
+                  <a:noFill/>
+                </a:ln>
+                <a:solidFill>
+                  <a:srgbClr val="080808"/>
+                </a:solidFill>
+                <a:effectLst/>
+                <a:latin typeface="Courier New" panose="02070309020205020404" pitchFamily="49" charset="0"/>
+                <a:cs typeface="Courier New" panose="02070309020205020404" pitchFamily="49" charset="0"/>
+              </a:rPr>
+              <a:t>.</a:t>
+            </a:r>
+            <a:r>
+              <a:rPr kumimoji="0" lang="en-US" altLang="en-US" b="1" i="1" u="none" strike="noStrike" cap="none" normalizeH="0" baseline="0" dirty="0" err="1">
+                <a:ln>
+                  <a:noFill/>
+                </a:ln>
+                <a:solidFill>
+                  <a:srgbClr val="871094"/>
+                </a:solidFill>
+                <a:effectLst/>
+                <a:latin typeface="Courier New" panose="02070309020205020404" pitchFamily="49" charset="0"/>
+                <a:cs typeface="Courier New" panose="02070309020205020404" pitchFamily="49" charset="0"/>
+              </a:rPr>
+              <a:t>out</a:t>
+            </a:r>
+            <a:r>
+              <a:rPr kumimoji="0" lang="en-US" altLang="en-US" b="1" i="0" u="none" strike="noStrike" cap="none" normalizeH="0" baseline="0" dirty="0" err="1">
+                <a:ln>
+                  <a:noFill/>
+                </a:ln>
+                <a:solidFill>
+                  <a:srgbClr val="080808"/>
+                </a:solidFill>
+                <a:effectLst/>
+                <a:latin typeface="Courier New" panose="02070309020205020404" pitchFamily="49" charset="0"/>
+                <a:cs typeface="Courier New" panose="02070309020205020404" pitchFamily="49" charset="0"/>
+              </a:rPr>
+              <a:t>.printf</a:t>
+            </a:r>
+            <a:r>
+              <a:rPr kumimoji="0" lang="en-US" altLang="en-US" b="1" i="0" u="none" strike="noStrike" cap="none" normalizeH="0" baseline="0" dirty="0">
+                <a:ln>
+                  <a:noFill/>
+                </a:ln>
+                <a:solidFill>
+                  <a:srgbClr val="080808"/>
+                </a:solidFill>
+                <a:effectLst/>
+                <a:latin typeface="Courier New" panose="02070309020205020404" pitchFamily="49" charset="0"/>
+                <a:cs typeface="Courier New" panose="02070309020205020404" pitchFamily="49" charset="0"/>
+              </a:rPr>
+              <a:t>(</a:t>
+            </a:r>
+            <a:r>
+              <a:rPr kumimoji="0" lang="en-US" altLang="en-US" b="1" i="0" u="none" strike="noStrike" cap="none" normalizeH="0" baseline="0" dirty="0">
+                <a:ln>
+                  <a:noFill/>
+                </a:ln>
+                <a:solidFill>
+                  <a:srgbClr val="067D17"/>
+                </a:solidFill>
+                <a:effectLst/>
+                <a:latin typeface="Courier New" panose="02070309020205020404" pitchFamily="49" charset="0"/>
+                <a:cs typeface="Courier New" panose="02070309020205020404" pitchFamily="49" charset="0"/>
+              </a:rPr>
+              <a:t>"Length of color: %d</a:t>
+            </a:r>
+            <a:r>
+              <a:rPr kumimoji="0" lang="en-US" altLang="en-US" b="1" i="0" u="none" strike="noStrike" cap="none" normalizeH="0" baseline="0" dirty="0">
+                <a:ln>
+                  <a:noFill/>
+                </a:ln>
+                <a:solidFill>
+                  <a:srgbClr val="0037A6"/>
+                </a:solidFill>
+                <a:effectLst/>
+                <a:latin typeface="Courier New" panose="02070309020205020404" pitchFamily="49" charset="0"/>
+                <a:cs typeface="Courier New" panose="02070309020205020404" pitchFamily="49" charset="0"/>
+              </a:rPr>
+              <a:t>\n</a:t>
+            </a:r>
+            <a:r>
+              <a:rPr kumimoji="0" lang="en-US" altLang="en-US" b="1" i="0" u="none" strike="noStrike" cap="none" normalizeH="0" baseline="0" dirty="0">
+                <a:ln>
+                  <a:noFill/>
+                </a:ln>
+                <a:solidFill>
+                  <a:srgbClr val="067D17"/>
+                </a:solidFill>
+                <a:effectLst/>
+                <a:latin typeface="Courier New" panose="02070309020205020404" pitchFamily="49" charset="0"/>
+                <a:cs typeface="Courier New" panose="02070309020205020404" pitchFamily="49" charset="0"/>
+              </a:rPr>
+              <a:t>"</a:t>
+            </a:r>
+            <a:r>
+              <a:rPr kumimoji="0" lang="en-US" altLang="en-US" b="1" i="0" u="none" strike="noStrike" cap="none" normalizeH="0" baseline="0" dirty="0">
+                <a:ln>
+                  <a:noFill/>
+                </a:ln>
+                <a:solidFill>
+                  <a:srgbClr val="080808"/>
+                </a:solidFill>
+                <a:effectLst/>
+                <a:latin typeface="Courier New" panose="02070309020205020404" pitchFamily="49" charset="0"/>
+                <a:cs typeface="Courier New" panose="02070309020205020404" pitchFamily="49" charset="0"/>
+              </a:rPr>
+              <a:t>, </a:t>
+            </a:r>
+            <a:r>
+              <a:rPr kumimoji="0" lang="en-US" altLang="en-US" b="1" i="0" u="none" strike="noStrike" cap="none" normalizeH="0" baseline="0" dirty="0" err="1">
+                <a:ln>
+                  <a:noFill/>
+                </a:ln>
+                <a:solidFill>
+                  <a:srgbClr val="000000"/>
+                </a:solidFill>
+                <a:effectLst/>
+                <a:latin typeface="Courier New" panose="02070309020205020404" pitchFamily="49" charset="0"/>
+                <a:cs typeface="Courier New" panose="02070309020205020404" pitchFamily="49" charset="0"/>
+              </a:rPr>
+              <a:t>len</a:t>
+            </a:r>
+            <a:r>
+              <a:rPr kumimoji="0" lang="en-US" altLang="en-US" b="1" i="0" u="none" strike="noStrike" cap="none" normalizeH="0" baseline="0" dirty="0">
+                <a:ln>
+                  <a:noFill/>
+                </a:ln>
+                <a:solidFill>
+                  <a:srgbClr val="080808"/>
+                </a:solidFill>
+                <a:effectLst/>
+                <a:latin typeface="Courier New" panose="02070309020205020404" pitchFamily="49" charset="0"/>
+                <a:cs typeface="Courier New" panose="02070309020205020404" pitchFamily="49" charset="0"/>
+              </a:rPr>
+              <a:t>);</a:t>
+            </a:r>
+            <a:endParaRPr kumimoji="0" lang="en-US" altLang="en-US" b="1" i="0" u="none" strike="noStrike" cap="none" normalizeH="0" baseline="0" dirty="0">
+              <a:ln>
+                <a:noFill/>
+              </a:ln>
+              <a:solidFill>
+                <a:schemeClr val="tx1"/>
+              </a:solidFill>
+              <a:effectLst/>
+              <a:latin typeface="Courier New" panose="02070309020205020404" pitchFamily="49" charset="0"/>
+              <a:cs typeface="Courier New" panose="02070309020205020404" pitchFamily="49" charset="0"/>
+            </a:endParaRPr>
+          </a:p>
+        </p:txBody>
+      </p:sp>
+      <p:sp>
+        <p:nvSpPr>
+          <p:cNvPr id="9" name="Rectangle 2">
+            <a:extLst>
+              <a:ext uri="{FF2B5EF4-FFF2-40B4-BE49-F238E27FC236}">
+                <a16:creationId xmlns:a16="http://schemas.microsoft.com/office/drawing/2014/main" id="{0F7B3CF4-D174-41F3-B4D8-F2F47B10E6C8}"/>
+              </a:ext>
+            </a:extLst>
+          </p:cNvPr>
+          <p:cNvSpPr>
+            <a:spLocks noChangeArrowheads="1"/>
+          </p:cNvSpPr>
+          <p:nvPr/>
+        </p:nvSpPr>
+        <p:spPr bwMode="auto">
+          <a:xfrm>
+            <a:off x="1524000" y="3954989"/>
+            <a:ext cx="10341293" cy="400110"/>
+          </a:xfrm>
+          <a:prstGeom prst="rect">
+            <a:avLst/>
+          </a:prstGeom>
+          <a:solidFill>
+            <a:srgbClr val="FFFFFF"/>
+          </a:solidFill>
+          <a:ln>
+            <a:noFill/>
+          </a:ln>
+          <a:effectLst/>
+          <a:extLst>
+            <a:ext uri="{91240B29-F687-4F45-9708-019B960494DF}">
+              <a14:hiddenLine xmlns:a14="http://schemas.microsoft.com/office/drawing/2010/main" w="9525">
+                <a:solidFill>
+                  <a:schemeClr val="tx1"/>
+                </a:solidFill>
+                <a:miter lim="800000"/>
+                <a:headEnd/>
+                <a:tailEnd/>
+              </a14:hiddenLine>
+            </a:ext>
+            <a:ext uri="{AF507438-7753-43E0-B8FC-AC1667EBCBE1}">
+              <a14:hiddenEffects xmlns:a14="http://schemas.microsoft.com/office/drawing/2010/main">
+                <a:effectLst>
+                  <a:outerShdw dist="35921" dir="2700000" algn="ctr" rotWithShape="0">
+                    <a:schemeClr val="bg2"/>
+                  </a:outerShdw>
+                </a:effectLst>
+              </a14:hiddenEffects>
+            </a:ext>
+          </a:extLst>
+        </p:spPr>
+        <p:txBody>
+          <a:bodyPr vert="horz" wrap="none" lIns="91440" tIns="45720" rIns="91440" bIns="45720" numCol="1" anchor="ctr" anchorCtr="0" compatLnSpc="1">
+            <a:prstTxWarp prst="textNoShape">
+              <a:avLst/>
+            </a:prstTxWarp>
+            <a:spAutoFit/>
+          </a:bodyPr>
+          <a:lstStyle/>
+          <a:p>
+            <a:pPr marL="0" marR="0" lvl="0" indent="0" algn="l" defTabSz="914400" rtl="0" eaLnBrk="0" fontAlgn="base" latinLnBrk="0" hangingPunct="0">
+              <a:lnSpc>
+                <a:spcPct val="100000"/>
+              </a:lnSpc>
+              <a:spcBef>
+                <a:spcPct val="0"/>
+              </a:spcBef>
+              <a:spcAft>
+                <a:spcPct val="0"/>
+              </a:spcAft>
+              <a:buClrTx/>
+              <a:buSzTx/>
+              <a:buFontTx/>
+              <a:buNone/>
+              <a:tabLst/>
+            </a:pPr>
+            <a:r>
+              <a:rPr kumimoji="0" lang="en-US" altLang="en-US" b="1" i="0" u="none" strike="noStrike" cap="none" normalizeH="0" baseline="0" dirty="0" err="1">
+                <a:ln>
+                  <a:noFill/>
+                </a:ln>
+                <a:solidFill>
+                  <a:srgbClr val="000000"/>
+                </a:solidFill>
+                <a:effectLst/>
+                <a:latin typeface="Courier New" panose="02070309020205020404" pitchFamily="49" charset="0"/>
+                <a:cs typeface="Courier New" panose="02070309020205020404" pitchFamily="49" charset="0"/>
+              </a:rPr>
+              <a:t>System</a:t>
+            </a:r>
+            <a:r>
+              <a:rPr kumimoji="0" lang="en-US" altLang="en-US" b="1" i="0" u="none" strike="noStrike" cap="none" normalizeH="0" baseline="0" dirty="0" err="1">
+                <a:ln>
+                  <a:noFill/>
+                </a:ln>
+                <a:solidFill>
+                  <a:srgbClr val="080808"/>
+                </a:solidFill>
+                <a:effectLst/>
+                <a:latin typeface="Courier New" panose="02070309020205020404" pitchFamily="49" charset="0"/>
+                <a:cs typeface="Courier New" panose="02070309020205020404" pitchFamily="49" charset="0"/>
+              </a:rPr>
+              <a:t>.</a:t>
+            </a:r>
+            <a:r>
+              <a:rPr kumimoji="0" lang="en-US" altLang="en-US" b="1" i="1" u="none" strike="noStrike" cap="none" normalizeH="0" baseline="0" dirty="0" err="1">
+                <a:ln>
+                  <a:noFill/>
+                </a:ln>
+                <a:solidFill>
+                  <a:srgbClr val="871094"/>
+                </a:solidFill>
+                <a:effectLst/>
+                <a:latin typeface="Courier New" panose="02070309020205020404" pitchFamily="49" charset="0"/>
+                <a:cs typeface="Courier New" panose="02070309020205020404" pitchFamily="49" charset="0"/>
+              </a:rPr>
+              <a:t>out</a:t>
+            </a:r>
+            <a:r>
+              <a:rPr kumimoji="0" lang="en-US" altLang="en-US" b="1" i="0" u="none" strike="noStrike" cap="none" normalizeH="0" baseline="0" dirty="0" err="1">
+                <a:ln>
+                  <a:noFill/>
+                </a:ln>
+                <a:solidFill>
+                  <a:srgbClr val="080808"/>
+                </a:solidFill>
+                <a:effectLst/>
+                <a:latin typeface="Courier New" panose="02070309020205020404" pitchFamily="49" charset="0"/>
+                <a:cs typeface="Courier New" panose="02070309020205020404" pitchFamily="49" charset="0"/>
+              </a:rPr>
+              <a:t>.printf</a:t>
+            </a:r>
+            <a:r>
+              <a:rPr kumimoji="0" lang="en-US" altLang="en-US" b="1" i="0" u="none" strike="noStrike" cap="none" normalizeH="0" baseline="0" dirty="0">
+                <a:ln>
+                  <a:noFill/>
+                </a:ln>
+                <a:solidFill>
+                  <a:srgbClr val="080808"/>
+                </a:solidFill>
+                <a:effectLst/>
+                <a:latin typeface="Courier New" panose="02070309020205020404" pitchFamily="49" charset="0"/>
+                <a:cs typeface="Courier New" panose="02070309020205020404" pitchFamily="49" charset="0"/>
+              </a:rPr>
+              <a:t>(</a:t>
+            </a:r>
+            <a:r>
+              <a:rPr kumimoji="0" lang="en-US" altLang="en-US" b="1" i="0" u="none" strike="noStrike" cap="none" normalizeH="0" baseline="0" dirty="0">
+                <a:ln>
+                  <a:noFill/>
+                </a:ln>
+                <a:solidFill>
+                  <a:srgbClr val="067D17"/>
+                </a:solidFill>
+                <a:effectLst/>
+                <a:latin typeface="Courier New" panose="02070309020205020404" pitchFamily="49" charset="0"/>
+                <a:cs typeface="Courier New" panose="02070309020205020404" pitchFamily="49" charset="0"/>
+              </a:rPr>
+              <a:t>"First letter of color: %c</a:t>
+            </a:r>
+            <a:r>
+              <a:rPr kumimoji="0" lang="en-US" altLang="en-US" b="1" i="0" u="none" strike="noStrike" cap="none" normalizeH="0" baseline="0" dirty="0">
+                <a:ln>
+                  <a:noFill/>
+                </a:ln>
+                <a:solidFill>
+                  <a:srgbClr val="0037A6"/>
+                </a:solidFill>
+                <a:effectLst/>
+                <a:latin typeface="Courier New" panose="02070309020205020404" pitchFamily="49" charset="0"/>
+                <a:cs typeface="Courier New" panose="02070309020205020404" pitchFamily="49" charset="0"/>
+              </a:rPr>
+              <a:t>\n</a:t>
+            </a:r>
+            <a:r>
+              <a:rPr kumimoji="0" lang="en-US" altLang="en-US" b="1" i="0" u="none" strike="noStrike" cap="none" normalizeH="0" baseline="0" dirty="0">
+                <a:ln>
+                  <a:noFill/>
+                </a:ln>
+                <a:solidFill>
+                  <a:srgbClr val="067D17"/>
+                </a:solidFill>
+                <a:effectLst/>
+                <a:latin typeface="Courier New" panose="02070309020205020404" pitchFamily="49" charset="0"/>
+                <a:cs typeface="Courier New" panose="02070309020205020404" pitchFamily="49" charset="0"/>
+              </a:rPr>
+              <a:t>"</a:t>
+            </a:r>
+            <a:r>
+              <a:rPr kumimoji="0" lang="en-US" altLang="en-US" b="1" i="0" u="none" strike="noStrike" cap="none" normalizeH="0" baseline="0" dirty="0">
+                <a:ln>
+                  <a:noFill/>
+                </a:ln>
+                <a:solidFill>
+                  <a:srgbClr val="080808"/>
+                </a:solidFill>
+                <a:effectLst/>
+                <a:latin typeface="Courier New" panose="02070309020205020404" pitchFamily="49" charset="0"/>
+                <a:cs typeface="Courier New" panose="02070309020205020404" pitchFamily="49" charset="0"/>
+              </a:rPr>
+              <a:t>, </a:t>
+            </a:r>
+            <a:r>
+              <a:rPr kumimoji="0" lang="en-US" altLang="en-US" b="1" i="0" u="none" strike="noStrike" cap="none" normalizeH="0" baseline="0" dirty="0" err="1">
+                <a:ln>
+                  <a:noFill/>
+                </a:ln>
+                <a:solidFill>
+                  <a:srgbClr val="000000"/>
+                </a:solidFill>
+                <a:effectLst/>
+                <a:latin typeface="Courier New" panose="02070309020205020404" pitchFamily="49" charset="0"/>
+                <a:cs typeface="Courier New" panose="02070309020205020404" pitchFamily="49" charset="0"/>
+              </a:rPr>
+              <a:t>color</a:t>
+            </a:r>
+            <a:r>
+              <a:rPr kumimoji="0" lang="en-US" altLang="en-US" b="1" i="0" u="none" strike="noStrike" cap="none" normalizeH="0" baseline="0" dirty="0" err="1">
+                <a:ln>
+                  <a:noFill/>
+                </a:ln>
+                <a:solidFill>
+                  <a:srgbClr val="080808"/>
+                </a:solidFill>
+                <a:effectLst/>
+                <a:latin typeface="Courier New" panose="02070309020205020404" pitchFamily="49" charset="0"/>
+                <a:cs typeface="Courier New" panose="02070309020205020404" pitchFamily="49" charset="0"/>
+              </a:rPr>
+              <a:t>.charAt</a:t>
+            </a:r>
+            <a:r>
+              <a:rPr kumimoji="0" lang="en-US" altLang="en-US" b="1" i="0" u="none" strike="noStrike" cap="none" normalizeH="0" baseline="0" dirty="0">
+                <a:ln>
+                  <a:noFill/>
+                </a:ln>
+                <a:solidFill>
+                  <a:srgbClr val="080808"/>
+                </a:solidFill>
+                <a:effectLst/>
+                <a:latin typeface="Courier New" panose="02070309020205020404" pitchFamily="49" charset="0"/>
+                <a:cs typeface="Courier New" panose="02070309020205020404" pitchFamily="49" charset="0"/>
+              </a:rPr>
+              <a:t>(</a:t>
+            </a:r>
+            <a:r>
+              <a:rPr kumimoji="0" lang="en-US" altLang="en-US" b="1" i="0" u="none" strike="noStrike" cap="none" normalizeH="0" baseline="0" dirty="0">
+                <a:ln>
+                  <a:noFill/>
+                </a:ln>
+                <a:solidFill>
+                  <a:srgbClr val="1750EB"/>
+                </a:solidFill>
+                <a:effectLst/>
+                <a:latin typeface="Courier New" panose="02070309020205020404" pitchFamily="49" charset="0"/>
+                <a:cs typeface="Courier New" panose="02070309020205020404" pitchFamily="49" charset="0"/>
+              </a:rPr>
+              <a:t>0</a:t>
+            </a:r>
+            <a:r>
+              <a:rPr kumimoji="0" lang="en-US" altLang="en-US" b="1" i="0" u="none" strike="noStrike" cap="none" normalizeH="0" baseline="0" dirty="0">
+                <a:ln>
+                  <a:noFill/>
+                </a:ln>
+                <a:solidFill>
+                  <a:srgbClr val="080808"/>
+                </a:solidFill>
+                <a:effectLst/>
+                <a:latin typeface="Courier New" panose="02070309020205020404" pitchFamily="49" charset="0"/>
+                <a:cs typeface="Courier New" panose="02070309020205020404" pitchFamily="49" charset="0"/>
+              </a:rPr>
+              <a:t>));</a:t>
+            </a:r>
+            <a:endParaRPr kumimoji="0" lang="en-US" altLang="en-US" b="1" i="0" u="none" strike="noStrike" cap="none" normalizeH="0" baseline="0" dirty="0">
+              <a:ln>
+                <a:noFill/>
+              </a:ln>
+              <a:solidFill>
+                <a:schemeClr val="tx1"/>
+              </a:solidFill>
+              <a:effectLst/>
+              <a:latin typeface="Courier New" panose="02070309020205020404" pitchFamily="49" charset="0"/>
+              <a:cs typeface="Courier New" panose="02070309020205020404" pitchFamily="49" charset="0"/>
+            </a:endParaRPr>
+          </a:p>
+        </p:txBody>
+      </p:sp>
+    </p:spTree>
+    <p:extLst>
+      <p:ext uri="{BB962C8B-B14F-4D97-AF65-F5344CB8AC3E}">
+        <p14:creationId xmlns:p14="http://schemas.microsoft.com/office/powerpoint/2010/main" val="2866524206"/>
+      </p:ext>
+    </p:extLst>
+  </p:cSld>
+  <p:clrMapOvr>
+    <a:masterClrMapping/>
+  </p:clrMapOvr>
+  <mc:AlternateContent xmlns:mc="http://schemas.openxmlformats.org/markup-compatibility/2006" xmlns:p14="http://schemas.microsoft.com/office/powerpoint/2010/main">
+    <mc:Choice Requires="p14">
+      <p:transition p14:dur="300">
+        <p:fade/>
+      </p:transition>
+    </mc:Choice>
+    <mc:Fallback xmlns="">
+      <p:transition>
+        <p:fade/>
+      </p:transition>
+    </mc:Fallback>
+  </mc:AlternateContent>
+</p:sld>
+</file>
+
+<file path=ppt/slides/slide24.xml><?xml version="1.0" encoding="utf-8"?>
+<p:sld xmlns:a="http://schemas.openxmlformats.org/drawingml/2006/main" xmlns:r="http://schemas.openxmlformats.org/officeDocument/2006/relationships" xmlns:p="http://schemas.openxmlformats.org/presentationml/2006/main">
+  <p:cSld>
+    <p:spTree>
+      <p:nvGrpSpPr>
+        <p:cNvPr id="1" name=""/>
+        <p:cNvGrpSpPr/>
+        <p:nvPr/>
+      </p:nvGrpSpPr>
+      <p:grpSpPr>
+        <a:xfrm>
+          <a:off x="0" y="0"/>
+          <a:ext cx="0" cy="0"/>
+          <a:chOff x="0" y="0"/>
+          <a:chExt cx="0" cy="0"/>
+        </a:xfrm>
+      </p:grpSpPr>
+      <p:sp>
+        <p:nvSpPr>
+          <p:cNvPr id="2" name="Title 1">
+            <a:extLst>
+              <a:ext uri="{FF2B5EF4-FFF2-40B4-BE49-F238E27FC236}">
+                <a16:creationId xmlns:a16="http://schemas.microsoft.com/office/drawing/2014/main" id="{B536806E-AD3E-AD40-936F-590919B5FCEE}"/>
+              </a:ext>
+            </a:extLst>
+          </p:cNvPr>
+          <p:cNvSpPr>
+            <a:spLocks noGrp="1"/>
+          </p:cNvSpPr>
+          <p:nvPr>
+            <p:ph type="title"/>
+          </p:nvPr>
+        </p:nvSpPr>
+        <p:spPr/>
+        <p:txBody>
+          <a:bodyPr/>
+          <a:lstStyle/>
+          <a:p>
+            <a:r>
+              <a:rPr lang="en-US" dirty="0"/>
+              <a:t>Quick Practice</a:t>
+            </a:r>
+          </a:p>
+        </p:txBody>
+      </p:sp>
+      <p:sp>
+        <p:nvSpPr>
+          <p:cNvPr id="5" name="TextBox 4">
+            <a:extLst>
+              <a:ext uri="{FF2B5EF4-FFF2-40B4-BE49-F238E27FC236}">
+                <a16:creationId xmlns:a16="http://schemas.microsoft.com/office/drawing/2014/main" id="{BC9EEA87-D34D-C34F-8D45-848ED96537EC}"/>
+              </a:ext>
+            </a:extLst>
+          </p:cNvPr>
+          <p:cNvSpPr txBox="1"/>
+          <p:nvPr/>
+        </p:nvSpPr>
+        <p:spPr>
+          <a:xfrm>
+            <a:off x="787960" y="1675865"/>
+            <a:ext cx="11506863" cy="400110"/>
+          </a:xfrm>
+          <a:prstGeom prst="rect">
+            <a:avLst/>
+          </a:prstGeom>
+          <a:noFill/>
+        </p:spPr>
+        <p:txBody>
+          <a:bodyPr wrap="square">
+            <a:spAutoFit/>
+          </a:bodyPr>
+          <a:lstStyle/>
+          <a:p>
+            <a:endParaRPr lang="en-US" dirty="0">
+              <a:latin typeface="Courier New" panose="02070309020205020404" pitchFamily="49" charset="0"/>
+              <a:cs typeface="Courier New" panose="02070309020205020404" pitchFamily="49" charset="0"/>
+            </a:endParaRPr>
+          </a:p>
+        </p:txBody>
+      </p:sp>
+      <p:sp>
+        <p:nvSpPr>
+          <p:cNvPr id="4" name="Rectangle 3"/>
+          <p:cNvSpPr/>
+          <p:nvPr/>
+        </p:nvSpPr>
+        <p:spPr>
+          <a:xfrm>
+            <a:off x="628075" y="1783924"/>
+            <a:ext cx="11209051" cy="5016758"/>
+          </a:xfrm>
+          <a:prstGeom prst="rect">
+            <a:avLst/>
+          </a:prstGeom>
+        </p:spPr>
+        <p:txBody>
+          <a:bodyPr wrap="square">
+            <a:spAutoFit/>
+          </a:bodyPr>
+          <a:lstStyle/>
+          <a:p>
+            <a:r>
+              <a:rPr lang="en-US" dirty="0">
+                <a:latin typeface="Courier New" panose="02070309020205020404" pitchFamily="49" charset="0"/>
+                <a:cs typeface="Courier New" panose="02070309020205020404" pitchFamily="49" charset="0"/>
+              </a:rPr>
+              <a:t>public class </a:t>
+            </a:r>
+            <a:r>
+              <a:rPr lang="en-US" dirty="0" err="1">
+                <a:latin typeface="Courier New" panose="02070309020205020404" pitchFamily="49" charset="0"/>
+                <a:cs typeface="Courier New" panose="02070309020205020404" pitchFamily="49" charset="0"/>
+              </a:rPr>
+              <a:t>StringFormatProgram</a:t>
+            </a:r>
+            <a:r>
+              <a:rPr lang="en-US" dirty="0">
+                <a:latin typeface="Courier New" panose="02070309020205020404" pitchFamily="49" charset="0"/>
+                <a:cs typeface="Courier New" panose="02070309020205020404" pitchFamily="49" charset="0"/>
+              </a:rPr>
+              <a:t> {</a:t>
+            </a:r>
+          </a:p>
+          <a:p>
+            <a:r>
+              <a:rPr lang="en-US" dirty="0">
+                <a:latin typeface="Courier New" panose="02070309020205020404" pitchFamily="49" charset="0"/>
+                <a:cs typeface="Courier New" panose="02070309020205020404" pitchFamily="49" charset="0"/>
+              </a:rPr>
+              <a:t>   public static void main(String[] </a:t>
+            </a:r>
+            <a:r>
+              <a:rPr lang="en-US" dirty="0" err="1">
+                <a:latin typeface="Courier New" panose="02070309020205020404" pitchFamily="49" charset="0"/>
+                <a:cs typeface="Courier New" panose="02070309020205020404" pitchFamily="49" charset="0"/>
+              </a:rPr>
+              <a:t>args</a:t>
+            </a:r>
+            <a:r>
+              <a:rPr lang="en-US" dirty="0">
+                <a:latin typeface="Courier New" panose="02070309020205020404" pitchFamily="49" charset="0"/>
+                <a:cs typeface="Courier New" panose="02070309020205020404" pitchFamily="49" charset="0"/>
+              </a:rPr>
+              <a:t>) {</a:t>
+            </a:r>
+          </a:p>
+          <a:p>
+            <a:r>
+              <a:rPr lang="en-US" dirty="0">
+                <a:latin typeface="Courier New" panose="02070309020205020404" pitchFamily="49" charset="0"/>
+                <a:cs typeface="Courier New" panose="02070309020205020404" pitchFamily="49" charset="0"/>
+              </a:rPr>
+              <a:t>      </a:t>
+            </a:r>
+            <a:r>
+              <a:rPr lang="en-US" dirty="0" err="1">
+                <a:latin typeface="Courier New" panose="02070309020205020404" pitchFamily="49" charset="0"/>
+                <a:cs typeface="Courier New" panose="02070309020205020404" pitchFamily="49" charset="0"/>
+              </a:rPr>
+              <a:t>int</a:t>
+            </a:r>
+            <a:r>
+              <a:rPr lang="en-US" dirty="0">
+                <a:latin typeface="Courier New" panose="02070309020205020404" pitchFamily="49" charset="0"/>
+                <a:cs typeface="Courier New" panose="02070309020205020404" pitchFamily="49" charset="0"/>
+              </a:rPr>
+              <a:t> value1 = 12;</a:t>
+            </a:r>
+          </a:p>
+          <a:p>
+            <a:r>
+              <a:rPr lang="en-US" dirty="0">
+                <a:latin typeface="Courier New" panose="02070309020205020404" pitchFamily="49" charset="0"/>
+                <a:cs typeface="Courier New" panose="02070309020205020404" pitchFamily="49" charset="0"/>
+              </a:rPr>
+              <a:t>      double value2 = 25.75986;</a:t>
+            </a:r>
+          </a:p>
+          <a:p>
+            <a:r>
+              <a:rPr lang="en-US" dirty="0">
+                <a:latin typeface="Courier New" panose="02070309020205020404" pitchFamily="49" charset="0"/>
+                <a:cs typeface="Courier New" panose="02070309020205020404" pitchFamily="49" charset="0"/>
+              </a:rPr>
+              <a:t>      String color = "red";</a:t>
+            </a:r>
+          </a:p>
+          <a:p>
+            <a:r>
+              <a:rPr lang="en-US" dirty="0">
+                <a:latin typeface="Courier New" panose="02070309020205020404" pitchFamily="49" charset="0"/>
+                <a:cs typeface="Courier New" panose="02070309020205020404" pitchFamily="49" charset="0"/>
+              </a:rPr>
+              <a:t>      </a:t>
+            </a:r>
+            <a:r>
+              <a:rPr lang="en-US" dirty="0" err="1">
+                <a:latin typeface="Courier New" panose="02070309020205020404" pitchFamily="49" charset="0"/>
+                <a:cs typeface="Courier New" panose="02070309020205020404" pitchFamily="49" charset="0"/>
+              </a:rPr>
+              <a:t>int</a:t>
+            </a:r>
+            <a:r>
+              <a:rPr lang="en-US" dirty="0">
+                <a:latin typeface="Courier New" panose="02070309020205020404" pitchFamily="49" charset="0"/>
+                <a:cs typeface="Courier New" panose="02070309020205020404" pitchFamily="49" charset="0"/>
+              </a:rPr>
+              <a:t> </a:t>
+            </a:r>
+            <a:r>
+              <a:rPr lang="en-US" dirty="0" err="1">
+                <a:latin typeface="Courier New" panose="02070309020205020404" pitchFamily="49" charset="0"/>
+                <a:cs typeface="Courier New" panose="02070309020205020404" pitchFamily="49" charset="0"/>
+              </a:rPr>
+              <a:t>len</a:t>
+            </a:r>
+            <a:r>
+              <a:rPr lang="en-US" dirty="0">
+                <a:latin typeface="Courier New" panose="02070309020205020404" pitchFamily="49" charset="0"/>
+                <a:cs typeface="Courier New" panose="02070309020205020404" pitchFamily="49" charset="0"/>
+              </a:rPr>
+              <a:t> = </a:t>
+            </a:r>
+            <a:r>
+              <a:rPr lang="en-US" dirty="0" err="1">
+                <a:latin typeface="Courier New" panose="02070309020205020404" pitchFamily="49" charset="0"/>
+                <a:cs typeface="Courier New" panose="02070309020205020404" pitchFamily="49" charset="0"/>
+              </a:rPr>
+              <a:t>color.length</a:t>
+            </a:r>
+            <a:r>
+              <a:rPr lang="en-US" dirty="0">
+                <a:latin typeface="Courier New" panose="02070309020205020404" pitchFamily="49" charset="0"/>
+                <a:cs typeface="Courier New" panose="02070309020205020404" pitchFamily="49" charset="0"/>
+              </a:rPr>
+              <a:t>();</a:t>
+            </a:r>
+          </a:p>
+          <a:p>
+            <a:r>
+              <a:rPr lang="en-US" dirty="0">
+                <a:latin typeface="Courier New" panose="02070309020205020404" pitchFamily="49" charset="0"/>
+                <a:cs typeface="Courier New" panose="02070309020205020404" pitchFamily="49" charset="0"/>
+              </a:rPr>
+              <a:t>      </a:t>
+            </a:r>
+            <a:r>
+              <a:rPr lang="en-US" dirty="0" err="1">
+                <a:latin typeface="Courier New" panose="02070309020205020404" pitchFamily="49" charset="0"/>
+                <a:cs typeface="Courier New" panose="02070309020205020404" pitchFamily="49" charset="0"/>
+              </a:rPr>
+              <a:t>System.out.println</a:t>
+            </a:r>
+            <a:r>
+              <a:rPr lang="en-US" dirty="0">
+                <a:latin typeface="Courier New" panose="02070309020205020404" pitchFamily="49" charset="0"/>
+                <a:cs typeface="Courier New" panose="02070309020205020404" pitchFamily="49" charset="0"/>
+              </a:rPr>
+              <a:t>("Length of color: " + </a:t>
+            </a:r>
+            <a:r>
+              <a:rPr lang="en-US" dirty="0" err="1">
+                <a:latin typeface="Courier New" panose="02070309020205020404" pitchFamily="49" charset="0"/>
+                <a:cs typeface="Courier New" panose="02070309020205020404" pitchFamily="49" charset="0"/>
+              </a:rPr>
+              <a:t>len</a:t>
+            </a:r>
+            <a:r>
+              <a:rPr lang="en-US" dirty="0">
+                <a:latin typeface="Courier New" panose="02070309020205020404" pitchFamily="49" charset="0"/>
+                <a:cs typeface="Courier New" panose="02070309020205020404" pitchFamily="49" charset="0"/>
+              </a:rPr>
+              <a:t>);</a:t>
+            </a:r>
+          </a:p>
+          <a:p>
+            <a:r>
+              <a:rPr lang="en-US" dirty="0">
+                <a:latin typeface="Courier New" panose="02070309020205020404" pitchFamily="49" charset="0"/>
+                <a:cs typeface="Courier New" panose="02070309020205020404" pitchFamily="49" charset="0"/>
+              </a:rPr>
+              <a:t>      </a:t>
+            </a:r>
+            <a:r>
+              <a:rPr lang="en-US" dirty="0" err="1">
+                <a:latin typeface="Courier New" panose="02070309020205020404" pitchFamily="49" charset="0"/>
+                <a:cs typeface="Courier New" panose="02070309020205020404" pitchFamily="49" charset="0"/>
+              </a:rPr>
+              <a:t>System.out.println</a:t>
+            </a:r>
+            <a:r>
+              <a:rPr lang="en-US" dirty="0">
+                <a:latin typeface="Courier New" panose="02070309020205020404" pitchFamily="49" charset="0"/>
+                <a:cs typeface="Courier New" panose="02070309020205020404" pitchFamily="49" charset="0"/>
+              </a:rPr>
+              <a:t>("First letter of color: " + </a:t>
+            </a:r>
+            <a:r>
+              <a:rPr lang="en-US" dirty="0" err="1">
+                <a:latin typeface="Courier New" panose="02070309020205020404" pitchFamily="49" charset="0"/>
+                <a:cs typeface="Courier New" panose="02070309020205020404" pitchFamily="49" charset="0"/>
+              </a:rPr>
+              <a:t>color.charAt</a:t>
+            </a:r>
+            <a:r>
+              <a:rPr lang="en-US" dirty="0">
+                <a:latin typeface="Courier New" panose="02070309020205020404" pitchFamily="49" charset="0"/>
+                <a:cs typeface="Courier New" panose="02070309020205020404" pitchFamily="49" charset="0"/>
+              </a:rPr>
+              <a:t>(0));</a:t>
+            </a:r>
+          </a:p>
+          <a:p>
+            <a:r>
+              <a:rPr lang="en-US" dirty="0">
+                <a:latin typeface="Courier New" panose="02070309020205020404" pitchFamily="49" charset="0"/>
+                <a:cs typeface="Courier New" panose="02070309020205020404" pitchFamily="49" charset="0"/>
+              </a:rPr>
+              <a:t>      </a:t>
+            </a:r>
+            <a:r>
+              <a:rPr lang="en-US" dirty="0" err="1">
+                <a:latin typeface="Courier New" panose="02070309020205020404" pitchFamily="49" charset="0"/>
+                <a:cs typeface="Courier New" panose="02070309020205020404" pitchFamily="49" charset="0"/>
+              </a:rPr>
+              <a:t>System.out.printf</a:t>
+            </a:r>
+            <a:r>
+              <a:rPr lang="en-US" dirty="0">
+                <a:latin typeface="Courier New" panose="02070309020205020404" pitchFamily="49" charset="0"/>
+                <a:cs typeface="Courier New" panose="02070309020205020404" pitchFamily="49" charset="0"/>
+              </a:rPr>
+              <a:t>("%d\n", value1);</a:t>
+            </a:r>
+          </a:p>
+          <a:p>
+            <a:r>
+              <a:rPr lang="en-US" dirty="0">
+                <a:latin typeface="Courier New" panose="02070309020205020404" pitchFamily="49" charset="0"/>
+                <a:cs typeface="Courier New" panose="02070309020205020404" pitchFamily="49" charset="0"/>
+              </a:rPr>
+              <a:t>      </a:t>
+            </a:r>
+            <a:r>
+              <a:rPr lang="en-US" dirty="0" err="1">
+                <a:latin typeface="Courier New" panose="02070309020205020404" pitchFamily="49" charset="0"/>
+                <a:cs typeface="Courier New" panose="02070309020205020404" pitchFamily="49" charset="0"/>
+              </a:rPr>
+              <a:t>System.out.printf</a:t>
+            </a:r>
+            <a:r>
+              <a:rPr lang="en-US" dirty="0">
+                <a:latin typeface="Courier New" panose="02070309020205020404" pitchFamily="49" charset="0"/>
+                <a:cs typeface="Courier New" panose="02070309020205020404" pitchFamily="49" charset="0"/>
+              </a:rPr>
+              <a:t>("%.2f\n", value2);</a:t>
+            </a:r>
+          </a:p>
+          <a:p>
+            <a:r>
+              <a:rPr lang="en-US" dirty="0">
+                <a:latin typeface="Courier New" panose="02070309020205020404" pitchFamily="49" charset="0"/>
+                <a:cs typeface="Courier New" panose="02070309020205020404" pitchFamily="49" charset="0"/>
+              </a:rPr>
+              <a:t>      </a:t>
+            </a:r>
+            <a:r>
+              <a:rPr lang="en-US" dirty="0" err="1">
+                <a:latin typeface="Courier New" panose="02070309020205020404" pitchFamily="49" charset="0"/>
+                <a:cs typeface="Courier New" panose="02070309020205020404" pitchFamily="49" charset="0"/>
+              </a:rPr>
+              <a:t>System.out.printf</a:t>
+            </a:r>
+            <a:r>
+              <a:rPr lang="en-US" dirty="0">
+                <a:latin typeface="Courier New" panose="02070309020205020404" pitchFamily="49" charset="0"/>
+                <a:cs typeface="Courier New" panose="02070309020205020404" pitchFamily="49" charset="0"/>
+              </a:rPr>
+              <a:t>("%20.2f\n", value2);</a:t>
+            </a:r>
+          </a:p>
+          <a:p>
+            <a:r>
+              <a:rPr lang="en-US" dirty="0">
+                <a:latin typeface="Courier New" panose="02070309020205020404" pitchFamily="49" charset="0"/>
+                <a:cs typeface="Courier New" panose="02070309020205020404" pitchFamily="49" charset="0"/>
+              </a:rPr>
+              <a:t>      </a:t>
+            </a:r>
+            <a:r>
+              <a:rPr lang="en-US" dirty="0" err="1">
+                <a:latin typeface="Courier New" panose="02070309020205020404" pitchFamily="49" charset="0"/>
+                <a:cs typeface="Courier New" panose="02070309020205020404" pitchFamily="49" charset="0"/>
+              </a:rPr>
+              <a:t>System.out.printf</a:t>
+            </a:r>
+            <a:r>
+              <a:rPr lang="en-US" dirty="0">
+                <a:latin typeface="Courier New" panose="02070309020205020404" pitchFamily="49" charset="0"/>
+                <a:cs typeface="Courier New" panose="02070309020205020404" pitchFamily="49" charset="0"/>
+              </a:rPr>
+              <a:t>("%s\n", color);</a:t>
+            </a:r>
+          </a:p>
+          <a:p>
+            <a:r>
+              <a:rPr lang="en-US" dirty="0">
+                <a:latin typeface="Courier New" panose="02070309020205020404" pitchFamily="49" charset="0"/>
+                <a:cs typeface="Courier New" panose="02070309020205020404" pitchFamily="49" charset="0"/>
+              </a:rPr>
+              <a:t>      </a:t>
+            </a:r>
+            <a:r>
+              <a:rPr lang="en-US" dirty="0" err="1">
+                <a:latin typeface="Courier New" panose="02070309020205020404" pitchFamily="49" charset="0"/>
+                <a:cs typeface="Courier New" panose="02070309020205020404" pitchFamily="49" charset="0"/>
+              </a:rPr>
+              <a:t>System.out.printf</a:t>
+            </a:r>
+            <a:r>
+              <a:rPr lang="en-US" dirty="0">
+                <a:latin typeface="Courier New" panose="02070309020205020404" pitchFamily="49" charset="0"/>
+                <a:cs typeface="Courier New" panose="02070309020205020404" pitchFamily="49" charset="0"/>
+              </a:rPr>
+              <a:t>("%S\n", color);</a:t>
+            </a:r>
+          </a:p>
+          <a:p>
+            <a:endParaRPr lang="en-US" dirty="0">
+              <a:latin typeface="Courier New" panose="02070309020205020404" pitchFamily="49" charset="0"/>
+              <a:cs typeface="Courier New" panose="02070309020205020404" pitchFamily="49" charset="0"/>
+            </a:endParaRPr>
+          </a:p>
+          <a:p>
+            <a:r>
+              <a:rPr lang="en-US" dirty="0">
+                <a:latin typeface="Courier New" panose="02070309020205020404" pitchFamily="49" charset="0"/>
+                <a:cs typeface="Courier New" panose="02070309020205020404" pitchFamily="49" charset="0"/>
+              </a:rPr>
+              <a:t>   }  </a:t>
+            </a:r>
+          </a:p>
+          <a:p>
+            <a:r>
+              <a:rPr lang="en-US" dirty="0">
+                <a:latin typeface="Courier New" panose="02070309020205020404" pitchFamily="49" charset="0"/>
+                <a:cs typeface="Courier New" panose="02070309020205020404" pitchFamily="49" charset="0"/>
+              </a:rPr>
+              <a:t>}</a:t>
+            </a:r>
           </a:p>
         </p:txBody>
       </p:sp>
@@ -15695,10 +18518,324 @@
           </a:p>
         </p:txBody>
       </p:sp>
+      <p:sp>
+        <p:nvSpPr>
+          <p:cNvPr id="3" name="Rectangle 1">
+            <a:extLst>
+              <a:ext uri="{FF2B5EF4-FFF2-40B4-BE49-F238E27FC236}">
+                <a16:creationId xmlns:a16="http://schemas.microsoft.com/office/drawing/2014/main" id="{1F0F88B9-C8CF-4880-8C8A-4164D23B7F2B}"/>
+              </a:ext>
+            </a:extLst>
+          </p:cNvPr>
+          <p:cNvSpPr>
+            <a:spLocks noChangeArrowheads="1"/>
+          </p:cNvSpPr>
+          <p:nvPr/>
+        </p:nvSpPr>
+        <p:spPr bwMode="auto">
+          <a:xfrm>
+            <a:off x="1513114" y="5847088"/>
+            <a:ext cx="7417415" cy="400110"/>
+          </a:xfrm>
+          <a:prstGeom prst="rect">
+            <a:avLst/>
+          </a:prstGeom>
+          <a:solidFill>
+            <a:srgbClr val="FFFFFF"/>
+          </a:solidFill>
+          <a:ln>
+            <a:noFill/>
+          </a:ln>
+          <a:effectLst/>
+          <a:extLst>
+            <a:ext uri="{91240B29-F687-4F45-9708-019B960494DF}">
+              <a14:hiddenLine xmlns:a14="http://schemas.microsoft.com/office/drawing/2010/main" w="9525">
+                <a:solidFill>
+                  <a:schemeClr val="tx1"/>
+                </a:solidFill>
+                <a:miter lim="800000"/>
+                <a:headEnd/>
+                <a:tailEnd/>
+              </a14:hiddenLine>
+            </a:ext>
+            <a:ext uri="{AF507438-7753-43E0-B8FC-AC1667EBCBE1}">
+              <a14:hiddenEffects xmlns:a14="http://schemas.microsoft.com/office/drawing/2010/main">
+                <a:effectLst>
+                  <a:outerShdw dist="35921" dir="2700000" algn="ctr" rotWithShape="0">
+                    <a:schemeClr val="bg2"/>
+                  </a:outerShdw>
+                </a:effectLst>
+              </a14:hiddenEffects>
+            </a:ext>
+          </a:extLst>
+        </p:spPr>
+        <p:txBody>
+          <a:bodyPr vert="horz" wrap="none" lIns="91440" tIns="45720" rIns="91440" bIns="45720" numCol="1" anchor="ctr" anchorCtr="0" compatLnSpc="1">
+            <a:prstTxWarp prst="textNoShape">
+              <a:avLst/>
+            </a:prstTxWarp>
+            <a:spAutoFit/>
+          </a:bodyPr>
+          <a:lstStyle/>
+          <a:p>
+            <a:pPr marL="0" marR="0" lvl="0" indent="0" algn="l" defTabSz="914400" rtl="0" eaLnBrk="0" fontAlgn="base" latinLnBrk="0" hangingPunct="0">
+              <a:lnSpc>
+                <a:spcPct val="100000"/>
+              </a:lnSpc>
+              <a:spcBef>
+                <a:spcPct val="0"/>
+              </a:spcBef>
+              <a:spcAft>
+                <a:spcPct val="0"/>
+              </a:spcAft>
+              <a:buClrTx/>
+              <a:buSzTx/>
+              <a:buFontTx/>
+              <a:buNone/>
+              <a:tabLst/>
+            </a:pPr>
+            <a:r>
+              <a:rPr kumimoji="0" lang="en-US" altLang="en-US" b="1" i="0" u="none" strike="noStrike" cap="none" normalizeH="0" baseline="0" dirty="0" err="1">
+                <a:ln>
+                  <a:noFill/>
+                </a:ln>
+                <a:solidFill>
+                  <a:srgbClr val="000000"/>
+                </a:solidFill>
+                <a:effectLst/>
+                <a:latin typeface="Courier New" panose="02070309020205020404" pitchFamily="49" charset="0"/>
+                <a:cs typeface="Courier New" panose="02070309020205020404" pitchFamily="49" charset="0"/>
+              </a:rPr>
+              <a:t>System</a:t>
+            </a:r>
+            <a:r>
+              <a:rPr kumimoji="0" lang="en-US" altLang="en-US" b="1" i="0" u="none" strike="noStrike" cap="none" normalizeH="0" baseline="0" dirty="0" err="1">
+                <a:ln>
+                  <a:noFill/>
+                </a:ln>
+                <a:solidFill>
+                  <a:srgbClr val="080808"/>
+                </a:solidFill>
+                <a:effectLst/>
+                <a:latin typeface="Courier New" panose="02070309020205020404" pitchFamily="49" charset="0"/>
+                <a:cs typeface="Courier New" panose="02070309020205020404" pitchFamily="49" charset="0"/>
+              </a:rPr>
+              <a:t>.</a:t>
+            </a:r>
+            <a:r>
+              <a:rPr kumimoji="0" lang="en-US" altLang="en-US" b="1" i="1" u="none" strike="noStrike" cap="none" normalizeH="0" baseline="0" dirty="0" err="1">
+                <a:ln>
+                  <a:noFill/>
+                </a:ln>
+                <a:solidFill>
+                  <a:srgbClr val="871094"/>
+                </a:solidFill>
+                <a:effectLst/>
+                <a:latin typeface="Courier New" panose="02070309020205020404" pitchFamily="49" charset="0"/>
+                <a:cs typeface="Courier New" panose="02070309020205020404" pitchFamily="49" charset="0"/>
+              </a:rPr>
+              <a:t>out</a:t>
+            </a:r>
+            <a:r>
+              <a:rPr kumimoji="0" lang="en-US" altLang="en-US" b="1" i="0" u="none" strike="noStrike" cap="none" normalizeH="0" baseline="0" dirty="0" err="1">
+                <a:ln>
+                  <a:noFill/>
+                </a:ln>
+                <a:solidFill>
+                  <a:srgbClr val="080808"/>
+                </a:solidFill>
+                <a:effectLst/>
+                <a:latin typeface="Courier New" panose="02070309020205020404" pitchFamily="49" charset="0"/>
+                <a:cs typeface="Courier New" panose="02070309020205020404" pitchFamily="49" charset="0"/>
+              </a:rPr>
+              <a:t>.printf</a:t>
+            </a:r>
+            <a:r>
+              <a:rPr kumimoji="0" lang="en-US" altLang="en-US" b="1" i="0" u="none" strike="noStrike" cap="none" normalizeH="0" baseline="0" dirty="0">
+                <a:ln>
+                  <a:noFill/>
+                </a:ln>
+                <a:solidFill>
+                  <a:srgbClr val="080808"/>
+                </a:solidFill>
+                <a:effectLst/>
+                <a:latin typeface="Courier New" panose="02070309020205020404" pitchFamily="49" charset="0"/>
+                <a:cs typeface="Courier New" panose="02070309020205020404" pitchFamily="49" charset="0"/>
+              </a:rPr>
+              <a:t>(</a:t>
+            </a:r>
+            <a:r>
+              <a:rPr kumimoji="0" lang="en-US" altLang="en-US" b="1" i="0" u="none" strike="noStrike" cap="none" normalizeH="0" baseline="0" dirty="0">
+                <a:ln>
+                  <a:noFill/>
+                </a:ln>
+                <a:solidFill>
+                  <a:srgbClr val="067D17"/>
+                </a:solidFill>
+                <a:effectLst/>
+                <a:latin typeface="Courier New" panose="02070309020205020404" pitchFamily="49" charset="0"/>
+                <a:cs typeface="Courier New" panose="02070309020205020404" pitchFamily="49" charset="0"/>
+              </a:rPr>
+              <a:t>"%c</a:t>
+            </a:r>
+            <a:r>
+              <a:rPr kumimoji="0" lang="en-US" altLang="en-US" b="1" i="0" u="none" strike="noStrike" cap="none" normalizeH="0" baseline="0" dirty="0">
+                <a:ln>
+                  <a:noFill/>
+                </a:ln>
+                <a:solidFill>
+                  <a:srgbClr val="0037A6"/>
+                </a:solidFill>
+                <a:effectLst/>
+                <a:latin typeface="Courier New" panose="02070309020205020404" pitchFamily="49" charset="0"/>
+                <a:cs typeface="Courier New" panose="02070309020205020404" pitchFamily="49" charset="0"/>
+              </a:rPr>
+              <a:t>\n</a:t>
+            </a:r>
+            <a:r>
+              <a:rPr kumimoji="0" lang="en-US" altLang="en-US" b="1" i="0" u="none" strike="noStrike" cap="none" normalizeH="0" baseline="0" dirty="0">
+                <a:ln>
+                  <a:noFill/>
+                </a:ln>
+                <a:solidFill>
+                  <a:srgbClr val="067D17"/>
+                </a:solidFill>
+                <a:effectLst/>
+                <a:latin typeface="Courier New" panose="02070309020205020404" pitchFamily="49" charset="0"/>
+                <a:cs typeface="Courier New" panose="02070309020205020404" pitchFamily="49" charset="0"/>
+              </a:rPr>
+              <a:t>"</a:t>
+            </a:r>
+            <a:r>
+              <a:rPr kumimoji="0" lang="en-US" altLang="en-US" b="1" i="0" u="none" strike="noStrike" cap="none" normalizeH="0" baseline="0" dirty="0">
+                <a:ln>
+                  <a:noFill/>
+                </a:ln>
+                <a:solidFill>
+                  <a:srgbClr val="080808"/>
+                </a:solidFill>
+                <a:effectLst/>
+                <a:latin typeface="Courier New" panose="02070309020205020404" pitchFamily="49" charset="0"/>
+                <a:cs typeface="Courier New" panose="02070309020205020404" pitchFamily="49" charset="0"/>
+              </a:rPr>
+              <a:t>, </a:t>
+            </a:r>
+            <a:r>
+              <a:rPr kumimoji="0" lang="en-US" altLang="en-US" b="1" i="0" u="none" strike="noStrike" cap="none" normalizeH="0" baseline="0" dirty="0" err="1">
+                <a:ln>
+                  <a:noFill/>
+                </a:ln>
+                <a:solidFill>
+                  <a:srgbClr val="000000"/>
+                </a:solidFill>
+                <a:effectLst/>
+                <a:latin typeface="Courier New" panose="02070309020205020404" pitchFamily="49" charset="0"/>
+                <a:cs typeface="Courier New" panose="02070309020205020404" pitchFamily="49" charset="0"/>
+              </a:rPr>
+              <a:t>color</a:t>
+            </a:r>
+            <a:r>
+              <a:rPr kumimoji="0" lang="en-US" altLang="en-US" b="1" i="0" u="none" strike="noStrike" cap="none" normalizeH="0" baseline="0" dirty="0" err="1">
+                <a:ln>
+                  <a:noFill/>
+                </a:ln>
+                <a:solidFill>
+                  <a:srgbClr val="080808"/>
+                </a:solidFill>
+                <a:effectLst/>
+                <a:latin typeface="Courier New" panose="02070309020205020404" pitchFamily="49" charset="0"/>
+                <a:cs typeface="Courier New" panose="02070309020205020404" pitchFamily="49" charset="0"/>
+              </a:rPr>
+              <a:t>.charAt</a:t>
+            </a:r>
+            <a:r>
+              <a:rPr kumimoji="0" lang="en-US" altLang="en-US" b="1" i="0" u="none" strike="noStrike" cap="none" normalizeH="0" baseline="0" dirty="0">
+                <a:ln>
+                  <a:noFill/>
+                </a:ln>
+                <a:solidFill>
+                  <a:srgbClr val="080808"/>
+                </a:solidFill>
+                <a:effectLst/>
+                <a:latin typeface="Courier New" panose="02070309020205020404" pitchFamily="49" charset="0"/>
+                <a:cs typeface="Courier New" panose="02070309020205020404" pitchFamily="49" charset="0"/>
+              </a:rPr>
+              <a:t>(</a:t>
+            </a:r>
+            <a:r>
+              <a:rPr kumimoji="0" lang="en-US" altLang="en-US" b="1" i="0" u="none" strike="noStrike" cap="none" normalizeH="0" baseline="0" dirty="0">
+                <a:ln>
+                  <a:noFill/>
+                </a:ln>
+                <a:solidFill>
+                  <a:srgbClr val="000000"/>
+                </a:solidFill>
+                <a:effectLst/>
+                <a:latin typeface="Courier New" panose="02070309020205020404" pitchFamily="49" charset="0"/>
+                <a:cs typeface="Courier New" panose="02070309020205020404" pitchFamily="49" charset="0"/>
+              </a:rPr>
+              <a:t>len</a:t>
+            </a:r>
+            <a:r>
+              <a:rPr kumimoji="0" lang="en-US" altLang="en-US" b="1" i="0" u="none" strike="noStrike" cap="none" normalizeH="0" baseline="0" dirty="0">
+                <a:ln>
+                  <a:noFill/>
+                </a:ln>
+                <a:solidFill>
+                  <a:srgbClr val="080808"/>
+                </a:solidFill>
+                <a:effectLst/>
+                <a:latin typeface="Courier New" panose="02070309020205020404" pitchFamily="49" charset="0"/>
+                <a:cs typeface="Courier New" panose="02070309020205020404" pitchFamily="49" charset="0"/>
+              </a:rPr>
+              <a:t>-</a:t>
+            </a:r>
+            <a:r>
+              <a:rPr kumimoji="0" lang="en-US" altLang="en-US" b="1" i="0" u="none" strike="noStrike" cap="none" normalizeH="0" baseline="0" dirty="0">
+                <a:ln>
+                  <a:noFill/>
+                </a:ln>
+                <a:solidFill>
+                  <a:srgbClr val="1750EB"/>
+                </a:solidFill>
+                <a:effectLst/>
+                <a:latin typeface="Courier New" panose="02070309020205020404" pitchFamily="49" charset="0"/>
+                <a:cs typeface="Courier New" panose="02070309020205020404" pitchFamily="49" charset="0"/>
+              </a:rPr>
+              <a:t>1</a:t>
+            </a:r>
+            <a:r>
+              <a:rPr kumimoji="0" lang="en-US" altLang="en-US" b="1" i="0" u="none" strike="noStrike" cap="none" normalizeH="0" baseline="0" dirty="0">
+                <a:ln>
+                  <a:noFill/>
+                </a:ln>
+                <a:solidFill>
+                  <a:srgbClr val="080808"/>
+                </a:solidFill>
+                <a:effectLst/>
+                <a:latin typeface="Courier New" panose="02070309020205020404" pitchFamily="49" charset="0"/>
+                <a:cs typeface="Courier New" panose="02070309020205020404" pitchFamily="49" charset="0"/>
+              </a:rPr>
+              <a:t>));</a:t>
+            </a:r>
+            <a:endParaRPr kumimoji="0" lang="en-US" altLang="en-US" b="1" i="0" u="none" strike="noStrike" cap="none" normalizeH="0" baseline="0" dirty="0">
+              <a:ln>
+                <a:noFill/>
+              </a:ln>
+              <a:solidFill>
+                <a:schemeClr val="tx1"/>
+              </a:solidFill>
+              <a:effectLst/>
+              <a:latin typeface="Courier New" panose="02070309020205020404" pitchFamily="49" charset="0"/>
+              <a:cs typeface="Courier New" panose="02070309020205020404" pitchFamily="49" charset="0"/>
+            </a:endParaRPr>
+          </a:p>
+        </p:txBody>
+      </p:sp>
     </p:spTree>
     <p:extLst>
       <p:ext uri="{BB962C8B-B14F-4D97-AF65-F5344CB8AC3E}">
-        <p14:creationId xmlns:p14="http://schemas.microsoft.com/office/powerpoint/2010/main" val="2264662996"/>
+        <p14:creationId xmlns:p14="http://schemas.microsoft.com/office/powerpoint/2010/main" val="2125741387"/>
       </p:ext>
     </p:extLst>
   </p:cSld>
@@ -15738,7 +18875,7 @@
                             </p:stCondLst>
                             <p:childTnLst>
                               <p:par>
-                                <p:cTn id="5" presetID="9" presetClass="entr" presetSubtype="0" fill="hold" grpId="0" nodeType="clickEffect">
+                                <p:cTn id="5" presetID="1" presetClass="entr" presetSubtype="0" fill="hold" grpId="0" nodeType="clickEffect">
                                   <p:stCondLst>
                                     <p:cond delay="0"/>
                                   </p:stCondLst>
@@ -15751,7 +18888,7 @@
                                           </p:stCondLst>
                                         </p:cTn>
                                         <p:tgtEl>
-                                          <p:spTgt spid="6"/>
+                                          <p:spTgt spid="3"/>
                                         </p:tgtEl>
                                         <p:attrNameLst>
                                           <p:attrName>style.visibility</p:attrName>
@@ -15761,120 +18898,6 @@
                                         <p:strVal val="visible"/>
                                       </p:to>
                                     </p:set>
-                                    <p:animEffect transition="in" filter="dissolve">
-                                      <p:cBhvr>
-                                        <p:cTn id="7" dur="500"/>
-                                        <p:tgtEl>
-                                          <p:spTgt spid="6"/>
-                                        </p:tgtEl>
-                                      </p:cBhvr>
-                                    </p:animEffect>
-                                  </p:childTnLst>
-                                </p:cTn>
-                              </p:par>
-                            </p:childTnLst>
-                          </p:cTn>
-                        </p:par>
-                      </p:childTnLst>
-                    </p:cTn>
-                  </p:par>
-                  <p:par>
-                    <p:cTn id="8" fill="hold">
-                      <p:stCondLst>
-                        <p:cond delay="indefinite"/>
-                      </p:stCondLst>
-                      <p:childTnLst>
-                        <p:par>
-                          <p:cTn id="9" fill="hold">
-                            <p:stCondLst>
-                              <p:cond delay="0"/>
-                            </p:stCondLst>
-                            <p:childTnLst>
-                              <p:par>
-                                <p:cTn id="10" presetID="9" presetClass="entr" presetSubtype="0" fill="hold" grpId="0" nodeType="clickEffect">
-                                  <p:stCondLst>
-                                    <p:cond delay="0"/>
-                                  </p:stCondLst>
-                                  <p:childTnLst>
-                                    <p:set>
-                                      <p:cBhvr>
-                                        <p:cTn id="11" dur="1" fill="hold">
-                                          <p:stCondLst>
-                                            <p:cond delay="0"/>
-                                          </p:stCondLst>
-                                        </p:cTn>
-                                        <p:tgtEl>
-                                          <p:spTgt spid="7"/>
-                                        </p:tgtEl>
-                                        <p:attrNameLst>
-                                          <p:attrName>style.visibility</p:attrName>
-                                        </p:attrNameLst>
-                                      </p:cBhvr>
-                                      <p:to>
-                                        <p:strVal val="visible"/>
-                                      </p:to>
-                                    </p:set>
-                                    <p:animEffect transition="in" filter="dissolve">
-                                      <p:cBhvr>
-                                        <p:cTn id="12" dur="500"/>
-                                        <p:tgtEl>
-                                          <p:spTgt spid="7"/>
-                                        </p:tgtEl>
-                                      </p:cBhvr>
-                                    </p:animEffect>
-                                  </p:childTnLst>
-                                </p:cTn>
-                              </p:par>
-                            </p:childTnLst>
-                          </p:cTn>
-                        </p:par>
-                      </p:childTnLst>
-                    </p:cTn>
-                  </p:par>
-                  <p:par>
-                    <p:cTn id="13" fill="hold">
-                      <p:stCondLst>
-                        <p:cond delay="indefinite"/>
-                      </p:stCondLst>
-                      <p:childTnLst>
-                        <p:par>
-                          <p:cTn id="14" fill="hold">
-                            <p:stCondLst>
-                              <p:cond delay="0"/>
-                            </p:stCondLst>
-                            <p:childTnLst>
-                              <p:par>
-                                <p:cTn id="15" presetID="9" presetClass="entr" presetSubtype="0" fill="hold" grpId="0" nodeType="clickEffect">
-                                  <p:stCondLst>
-                                    <p:cond delay="0"/>
-                                  </p:stCondLst>
-                                  <p:childTnLst>
-                                    <p:set>
-                                      <p:cBhvr>
-                                        <p:cTn id="16" dur="1" fill="hold">
-                                          <p:stCondLst>
-                                            <p:cond delay="0"/>
-                                          </p:stCondLst>
-                                        </p:cTn>
-                                        <p:tgtEl>
-                                          <p:spTgt spid="8"/>
-                                        </p:tgtEl>
-                                        <p:attrNameLst>
-                                          <p:attrName>style.visibility</p:attrName>
-                                        </p:attrNameLst>
-                                      </p:cBhvr>
-                                      <p:to>
-                                        <p:strVal val="visible"/>
-                                      </p:to>
-                                    </p:set>
-                                    <p:animEffect transition="in" filter="dissolve">
-                                      <p:cBhvr>
-                                        <p:cTn id="17" dur="500"/>
-                                        <p:tgtEl>
-                                          <p:spTgt spid="8"/>
-                                        </p:tgtEl>
-                                      </p:cBhvr>
-                                    </p:animEffect>
                                   </p:childTnLst>
                                 </p:cTn>
                               </p:par>
@@ -15906,283 +18929,14 @@
       </p:par>
     </p:tnLst>
     <p:bldLst>
-      <p:bldP spid="6" grpId="0" animBg="1"/>
-      <p:bldP spid="7" grpId="0" animBg="1"/>
-      <p:bldP spid="8" grpId="0" animBg="1"/>
+      <p:bldP spid="3" grpId="0" animBg="1"/>
     </p:bldLst>
   </p:timing>
 </p:sld>
 </file>
 
-<file path=ppt/slides/slide2.xml><?xml version="1.0" encoding="utf-8"?>
+<file path=ppt/slides/slide25.xml><?xml version="1.0" encoding="utf-8"?>
 <p:sld xmlns:a="http://schemas.openxmlformats.org/drawingml/2006/main" xmlns:r="http://schemas.openxmlformats.org/officeDocument/2006/relationships" xmlns:p="http://schemas.openxmlformats.org/presentationml/2006/main">
-  <p:cSld>
-    <p:spTree>
-      <p:nvGrpSpPr>
-        <p:cNvPr id="1" name=""/>
-        <p:cNvGrpSpPr/>
-        <p:nvPr/>
-      </p:nvGrpSpPr>
-      <p:grpSpPr>
-        <a:xfrm>
-          <a:off x="0" y="0"/>
-          <a:ext cx="0" cy="0"/>
-          <a:chOff x="0" y="0"/>
-          <a:chExt cx="0" cy="0"/>
-        </a:xfrm>
-      </p:grpSpPr>
-      <p:sp>
-        <p:nvSpPr>
-          <p:cNvPr id="4" name="Title 3">
-            <a:extLst>
-              <a:ext uri="{FF2B5EF4-FFF2-40B4-BE49-F238E27FC236}">
-                <a16:creationId xmlns:a16="http://schemas.microsoft.com/office/drawing/2014/main" id="{11F69212-F891-5844-91B0-396F6B018064}"/>
-              </a:ext>
-            </a:extLst>
-          </p:cNvPr>
-          <p:cNvSpPr>
-            <a:spLocks noGrp="1"/>
-          </p:cNvSpPr>
-          <p:nvPr>
-            <p:ph type="title"/>
-          </p:nvPr>
-        </p:nvSpPr>
-        <p:spPr/>
-        <p:txBody>
-          <a:bodyPr/>
-          <a:lstStyle/>
-          <a:p>
-            <a:r>
-              <a:rPr lang="en-US" dirty="0"/>
-              <a:t>Announcements</a:t>
-            </a:r>
-          </a:p>
-        </p:txBody>
-      </p:sp>
-      <p:sp>
-        <p:nvSpPr>
-          <p:cNvPr id="5" name="Text Placeholder 4">
-            <a:extLst>
-              <a:ext uri="{FF2B5EF4-FFF2-40B4-BE49-F238E27FC236}">
-                <a16:creationId xmlns:a16="http://schemas.microsoft.com/office/drawing/2014/main" id="{D45B7610-981A-7441-A483-AB5BABDA0AB4}"/>
-              </a:ext>
-            </a:extLst>
-          </p:cNvPr>
-          <p:cNvSpPr>
-            <a:spLocks noGrp="1"/>
-          </p:cNvSpPr>
-          <p:nvPr>
-            <p:ph type="body" sz="quarter" idx="10"/>
-          </p:nvPr>
-        </p:nvSpPr>
-        <p:spPr>
-          <a:xfrm>
-            <a:off x="628075" y="1776683"/>
-            <a:ext cx="12561453" cy="4728730"/>
-          </a:xfrm>
-        </p:spPr>
-        <p:txBody>
-          <a:bodyPr/>
-          <a:lstStyle/>
-          <a:p>
-            <a:r>
-              <a:rPr lang="en-US" sz="2000" dirty="0">
-                <a:solidFill>
-                  <a:srgbClr val="092529"/>
-                </a:solidFill>
-              </a:rPr>
-              <a:t>Reminder – readings are due </a:t>
-            </a:r>
-            <a:r>
-              <a:rPr lang="en-US" sz="2000" b="1" dirty="0">
-                <a:solidFill>
-                  <a:srgbClr val="092529"/>
-                </a:solidFill>
-              </a:rPr>
-              <a:t>before</a:t>
-            </a:r>
-            <a:r>
-              <a:rPr lang="en-US" sz="2000" dirty="0">
-                <a:solidFill>
-                  <a:srgbClr val="092529"/>
-                </a:solidFill>
-              </a:rPr>
-              <a:t> lecture</a:t>
-            </a:r>
-          </a:p>
-          <a:p>
-            <a:pPr lvl="1"/>
-            <a:r>
-              <a:rPr lang="en-US" sz="2000" dirty="0">
-                <a:solidFill>
-                  <a:srgbClr val="092529"/>
-                </a:solidFill>
-              </a:rPr>
-              <a:t>You don’t have to do all of it - challenge problems can be challenging…</a:t>
-            </a:r>
-          </a:p>
-          <a:p>
-            <a:pPr lvl="1"/>
-            <a:r>
-              <a:rPr lang="en-US" sz="2000" dirty="0">
-                <a:solidFill>
-                  <a:srgbClr val="092529"/>
-                </a:solidFill>
-              </a:rPr>
-              <a:t>You can return to them. </a:t>
-            </a:r>
-          </a:p>
-          <a:p>
-            <a:pPr lvl="1"/>
-            <a:r>
-              <a:rPr lang="en-US" sz="2000" dirty="0">
-                <a:solidFill>
-                  <a:srgbClr val="092529"/>
-                </a:solidFill>
-              </a:rPr>
-              <a:t>We start off each lecture with a recall activity!</a:t>
-            </a:r>
-          </a:p>
-          <a:p>
-            <a:r>
-              <a:rPr lang="en-US" sz="2000" dirty="0">
-                <a:solidFill>
-                  <a:srgbClr val="092529"/>
-                </a:solidFill>
-              </a:rPr>
-              <a:t>Help Sessions</a:t>
-            </a:r>
-          </a:p>
-          <a:p>
-            <a:pPr lvl="1"/>
-            <a:r>
-              <a:rPr lang="en-US" sz="2000" dirty="0"/>
-              <a:t>Go to them! They make a difference</a:t>
-            </a:r>
-          </a:p>
-          <a:p>
-            <a:pPr lvl="1"/>
-            <a:r>
-              <a:rPr lang="en-US" sz="2000" dirty="0"/>
-              <a:t>Lab teams should be setup</a:t>
-            </a:r>
-          </a:p>
-          <a:p>
-            <a:pPr lvl="2"/>
-            <a:r>
-              <a:rPr lang="en-US" sz="2000" dirty="0">
-                <a:solidFill>
-                  <a:srgbClr val="092529"/>
-                </a:solidFill>
-              </a:rPr>
-              <a:t>If you are not on a private </a:t>
-            </a:r>
-            <a:r>
-              <a:rPr lang="en-US" sz="2000" dirty="0"/>
-              <a:t>channel with your other lab mates, let us know </a:t>
-            </a:r>
-          </a:p>
-          <a:p>
-            <a:r>
-              <a:rPr lang="en-US" sz="2000" dirty="0">
-                <a:solidFill>
-                  <a:srgbClr val="092529"/>
-                </a:solidFill>
-              </a:rPr>
-              <a:t>Thursday </a:t>
-            </a:r>
-            <a:r>
-              <a:rPr lang="en-US" sz="2000" dirty="0"/>
-              <a:t>lab – meant to be done by Monday</a:t>
-            </a:r>
-            <a:r>
-              <a:rPr lang="en-US" sz="2000" dirty="0">
-                <a:solidFill>
-                  <a:srgbClr val="092529"/>
-                </a:solidFill>
-              </a:rPr>
-              <a:t> </a:t>
-            </a:r>
-          </a:p>
-          <a:p>
-            <a:endParaRPr lang="en-US" b="1" dirty="0"/>
-          </a:p>
-        </p:txBody>
-      </p:sp>
-      <p:pic>
-        <p:nvPicPr>
-          <p:cNvPr id="1026" name="Picture 2" descr="We Can Do Hard Things - Abby Off the Record — Abby Off the Record">
-            <a:extLst>
-              <a:ext uri="{FF2B5EF4-FFF2-40B4-BE49-F238E27FC236}">
-                <a16:creationId xmlns:a16="http://schemas.microsoft.com/office/drawing/2014/main" id="{1F717CB0-92E6-4EB8-80C2-70E21F159AED}"/>
-              </a:ext>
-            </a:extLst>
-          </p:cNvPr>
-          <p:cNvPicPr>
-            <a:picLocks noChangeAspect="1" noChangeArrowheads="1"/>
-          </p:cNvPicPr>
-          <p:nvPr/>
-        </p:nvPicPr>
-        <p:blipFill>
-          <a:blip r:embed="rId2">
-            <a:extLst>
-              <a:ext uri="{28A0092B-C50C-407E-A947-70E740481C1C}">
-                <a14:useLocalDpi xmlns:a14="http://schemas.microsoft.com/office/drawing/2010/main" val="0"/>
-              </a:ext>
-            </a:extLst>
-          </a:blip>
-          <a:srcRect/>
-          <a:stretch>
-            <a:fillRect/>
-          </a:stretch>
-        </p:blipFill>
-        <p:spPr bwMode="auto">
-          <a:xfrm>
-            <a:off x="10127117" y="0"/>
-            <a:ext cx="3690483" cy="4428580"/>
-          </a:xfrm>
-          <a:prstGeom prst="rect">
-            <a:avLst/>
-          </a:prstGeom>
-          <a:noFill/>
-          <a:extLst>
-            <a:ext uri="{909E8E84-426E-40DD-AFC4-6F175D3DCCD1}">
-              <a14:hiddenFill xmlns:a14="http://schemas.microsoft.com/office/drawing/2010/main">
-                <a:solidFill>
-                  <a:srgbClr val="FFFFFF"/>
-                </a:solidFill>
-              </a14:hiddenFill>
-            </a:ext>
-          </a:extLst>
-        </p:spPr>
-      </p:pic>
-    </p:spTree>
-    <p:extLst>
-      <p:ext uri="{BB962C8B-B14F-4D97-AF65-F5344CB8AC3E}">
-        <p14:creationId xmlns:p14="http://schemas.microsoft.com/office/powerpoint/2010/main" val="876244202"/>
-      </p:ext>
-    </p:extLst>
-  </p:cSld>
-  <p:clrMapOvr>
-    <a:masterClrMapping/>
-  </p:clrMapOvr>
-  <mc:AlternateContent xmlns:mc="http://schemas.openxmlformats.org/markup-compatibility/2006" xmlns:p14="http://schemas.microsoft.com/office/powerpoint/2010/main">
-    <mc:Choice Requires="p14">
-      <p:transition p14:dur="300">
-        <p:fade/>
-      </p:transition>
-    </mc:Choice>
-    <mc:Fallback xmlns="">
-      <p:transition>
-        <p:fade/>
-      </p:transition>
-    </mc:Fallback>
-  </mc:AlternateContent>
-</p:sld>
-</file>
-
-<file path=ppt/slides/slide20.xml><?xml version="1.0" encoding="utf-8"?>
-<p:sld xmlns:a="http://schemas.openxmlformats.org/drawingml/2006/main" xmlns:r="http://schemas.openxmlformats.org/officeDocument/2006/relationships" xmlns:p="http://schemas.openxmlformats.org/presentationml/2006/main" show="0">
   <p:cSld>
     <p:spTree>
       <p:nvGrpSpPr>
@@ -16338,13 +19092,13 @@
   <p:clrMapOvr>
     <a:masterClrMapping/>
   </p:clrMapOvr>
-  <mc:AlternateContent xmlns:mc="http://schemas.openxmlformats.org/markup-compatibility/2006" xmlns:p14="http://schemas.microsoft.com/office/powerpoint/2010/main">
-    <mc:Choice Requires="p14">
+  <mc:AlternateContent xmlns:mc="http://schemas.openxmlformats.org/markup-compatibility/2006">
+    <mc:Choice xmlns:p14="http://schemas.microsoft.com/office/powerpoint/2010/main" Requires="p14">
       <p:transition p14:dur="300">
         <p:fade/>
       </p:transition>
     </mc:Choice>
-    <mc:Fallback xmlns="">
+    <mc:Fallback>
       <p:transition>
         <p:fade/>
       </p:transition>
@@ -16434,7 +19188,7 @@
             </a:pPr>
             <a:r>
               <a:rPr lang="en-US" b="1" dirty="0"/>
-              <a:t>Grab a paper, write your name and your answers to the following questions. Turn this as your attendance for today’s lecture.</a:t>
+              <a:t>Grab a paper, write your name, as it is on Canvas, and your answers to the following questions. Turn this as your attendance for today’s lecture.</a:t>
             </a:r>
           </a:p>
           <a:p>
@@ -17042,7 +19796,7 @@
         <p:spPr>
           <a:xfrm>
             <a:off x="628075" y="1776682"/>
-            <a:ext cx="12561453" cy="3399136"/>
+            <a:ext cx="12561453" cy="5147307"/>
           </a:xfrm>
         </p:spPr>
         <p:txBody>
@@ -17051,22 +19805,22 @@
           <a:p>
             <a:pPr fontAlgn="base"/>
             <a:r>
-              <a:rPr lang="en-US" dirty="0"/>
-              <a:t>primitive - stores </a:t>
-            </a:r>
-            <a:r>
-              <a:rPr lang="en-US" b="1" dirty="0"/>
+              <a:rPr lang="en-US" sz="2400" dirty="0"/>
+              <a:t>Primitive - stores </a:t>
+            </a:r>
+            <a:r>
+              <a:rPr lang="en-US" sz="2400" b="1" dirty="0"/>
               <a:t>values</a:t>
             </a:r>
             <a:r>
-              <a:rPr lang="en-US" dirty="0"/>
+              <a:rPr lang="en-US" sz="2400" dirty="0"/>
               <a:t> only</a:t>
             </a:r>
           </a:p>
           <a:p>
             <a:pPr fontAlgn="base"/>
             <a:r>
-              <a:rPr lang="en-US" dirty="0"/>
+              <a:rPr lang="en-US" sz="2400" dirty="0"/>
               <a:t>Example declarations:</a:t>
             </a:r>
           </a:p>
@@ -17084,18 +19838,26 @@
           </a:p>
           <a:p>
             <a:pPr fontAlgn="base"/>
-            <a:r>
-              <a:rPr lang="en-US" dirty="0"/>
+            <a:endParaRPr lang="en-US" dirty="0"/>
+          </a:p>
+          <a:p>
+            <a:pPr fontAlgn="base"/>
+            <a:endParaRPr lang="en-US" dirty="0"/>
+          </a:p>
+          <a:p>
+            <a:pPr fontAlgn="base"/>
+            <a:r>
+              <a:rPr lang="en-US" sz="2400" dirty="0"/>
               <a:t>A char is an int behind the scenes - and java uses the </a:t>
             </a:r>
             <a:r>
-              <a:rPr lang="en-US" u="sng" dirty="0">
+              <a:rPr lang="en-US" sz="2400" u="sng" dirty="0">
                 <a:hlinkClick r:id="rId2"/>
               </a:rPr>
               <a:t>ASCII Table</a:t>
             </a:r>
             <a:r>
-              <a:rPr lang="en-US" dirty="0"/>
+              <a:rPr lang="en-US" sz="2400" dirty="0"/>
               <a:t> to figure out the character value</a:t>
             </a:r>
           </a:p>
@@ -17118,7 +19880,7 @@
         </p:nvSpPr>
         <p:spPr>
           <a:xfrm>
-            <a:off x="382249" y="2814530"/>
+            <a:off x="948306" y="3304387"/>
             <a:ext cx="13053102" cy="1323439"/>
           </a:xfrm>
           <a:prstGeom prst="rect">
@@ -18006,8 +20768,8 @@
         </p:nvSpPr>
         <p:spPr bwMode="auto">
           <a:xfrm>
-            <a:off x="749805" y="1599862"/>
-            <a:ext cx="9195979" cy="892552"/>
+            <a:off x="749805" y="1492140"/>
+            <a:ext cx="12015662" cy="1107996"/>
           </a:xfrm>
           <a:prstGeom prst="rect">
             <a:avLst/>
@@ -18183,7 +20945,7 @@
               </a:lnSpc>
             </a:pPr>
             <a:r>
-              <a:rPr lang="en-US" altLang="en-US" dirty="0">
+              <a:rPr lang="en-US" altLang="en-US" sz="2400" dirty="0">
                 <a:solidFill>
                   <a:srgbClr val="092529"/>
                 </a:solidFill>
@@ -18199,7 +20961,7 @@
               </a:lnSpc>
             </a:pPr>
             <a:r>
-              <a:rPr lang="en-US" altLang="en-US" dirty="0">
+              <a:rPr lang="en-US" altLang="en-US" sz="2400" dirty="0">
                 <a:solidFill>
                   <a:srgbClr val="092529"/>
                 </a:solidFill>
@@ -20999,7 +23761,7 @@
         <p:spPr>
           <a:xfrm>
             <a:off x="628075" y="1776683"/>
-            <a:ext cx="12561453" cy="3316036"/>
+            <a:ext cx="12561453" cy="4276299"/>
           </a:xfrm>
         </p:spPr>
         <p:txBody>
@@ -21008,57 +23770,57 @@
           <a:p>
             <a:pPr fontAlgn="base"/>
             <a:r>
-              <a:rPr lang="en-US" dirty="0"/>
+              <a:rPr lang="en-US" sz="2400" dirty="0"/>
               <a:t>A String is a collection of ordered characters</a:t>
             </a:r>
           </a:p>
           <a:p>
             <a:pPr lvl="1" fontAlgn="base"/>
             <a:r>
-              <a:rPr lang="en-US" dirty="0"/>
+              <a:rPr lang="en-US" sz="2400" dirty="0"/>
               <a:t>It has data</a:t>
             </a:r>
           </a:p>
           <a:p>
             <a:pPr lvl="1" fontAlgn="base"/>
             <a:r>
-              <a:rPr lang="en-US" dirty="0"/>
+              <a:rPr lang="en-US" sz="2400" dirty="0"/>
               <a:t>It has functionality (methods)</a:t>
             </a:r>
           </a:p>
           <a:p>
             <a:pPr lvl="1" fontAlgn="base"/>
             <a:r>
-              <a:rPr lang="en-US" dirty="0"/>
+              <a:rPr lang="en-US" sz="2400" dirty="0"/>
               <a:t>It is also </a:t>
             </a:r>
             <a:r>
-              <a:rPr lang="en-US" b="1" dirty="0"/>
+              <a:rPr lang="en-US" sz="2400" b="1" dirty="0"/>
               <a:t>immutable</a:t>
             </a:r>
             <a:r>
-              <a:rPr lang="en-US" dirty="0"/>
+              <a:rPr lang="en-US" sz="2400" dirty="0"/>
               <a:t> ( can’t be directly modified)</a:t>
             </a:r>
           </a:p>
           <a:p>
             <a:pPr lvl="2" fontAlgn="base"/>
             <a:r>
-              <a:rPr lang="en-US" dirty="0"/>
+              <a:rPr lang="en-US" sz="2400" dirty="0"/>
               <a:t>Every method that builds a String, returns a copy</a:t>
             </a:r>
           </a:p>
           <a:p>
             <a:pPr lvl="2" fontAlgn="base"/>
             <a:r>
-              <a:rPr lang="en-US" dirty="0"/>
+              <a:rPr lang="en-US" sz="2400" dirty="0"/>
               <a:t>Will cover this more in the future</a:t>
             </a:r>
           </a:p>
           <a:p>
             <a:pPr fontAlgn="base"/>
             <a:r>
-              <a:rPr lang="en-US" dirty="0"/>
+              <a:rPr lang="en-US" sz="2400" dirty="0"/>
               <a:t>But what does a String really look like?</a:t>
             </a:r>
           </a:p>
@@ -21117,7 +23879,7 @@
     </p:spTree>
     <p:extLst>
       <p:ext uri="{BB962C8B-B14F-4D97-AF65-F5344CB8AC3E}">
-        <p14:creationId xmlns:p14="http://schemas.microsoft.com/office/powerpoint/2010/main" val="3146645207"/>
+        <p14:creationId xmlns:p14="http://schemas.microsoft.com/office/powerpoint/2010/main" val="1175657051"/>
       </p:ext>
     </p:extLst>
   </p:cSld>
@@ -22074,6 +24836,15 @@
 </file>
 
 <file path=customXml/item1.xml><?xml version="1.0" encoding="utf-8"?>
+<?mso-contentType ?>
+<FormTemplates xmlns="http://schemas.microsoft.com/sharepoint/v3/contenttype/forms">
+  <Display>DocumentLibraryForm</Display>
+  <Edit>DocumentLibraryForm</Edit>
+  <New>DocumentLibraryForm</New>
+</FormTemplates>
+</file>
+
+<file path=customXml/item2.xml><?xml version="1.0" encoding="utf-8"?>
 <ct:contentTypeSchema xmlns:ct="http://schemas.microsoft.com/office/2006/metadata/contentType" xmlns:ma="http://schemas.microsoft.com/office/2006/metadata/properties/metaAttributes" ct:_="" ma:_="" ma:contentTypeName="Document" ma:contentTypeID="0x010100074387D78AC76C4289401EF66FB51FCC" ma:contentTypeVersion="15" ma:contentTypeDescription="Create a new document." ma:contentTypeScope="" ma:versionID="d3659bec8b8330148a03d82a9d99f412">
   <xsd:schema xmlns:xsd="http://www.w3.org/2001/XMLSchema" xmlns:xs="http://www.w3.org/2001/XMLSchema" xmlns:p="http://schemas.microsoft.com/office/2006/metadata/properties" xmlns:ns3="92c41bee-f0ee-4aa6-9399-a35fbb883510" xmlns:ns4="e06ed288-fd75-4b50-bbed-f5a5df88c31c" targetNamespace="http://schemas.microsoft.com/office/2006/metadata/properties" ma:root="true" ma:fieldsID="1a21d371127b63848c9a2290f5945250" ns3:_="" ns4:_="">
     <xsd:import namespace="92c41bee-f0ee-4aa6-9399-a35fbb883510"/>
@@ -22308,15 +25079,6 @@
 </ct:contentTypeSchema>
 </file>
 
-<file path=customXml/item2.xml><?xml version="1.0" encoding="utf-8"?>
-<?mso-contentType ?>
-<FormTemplates xmlns="http://schemas.microsoft.com/sharepoint/v3/contenttype/forms">
-  <Display>DocumentLibraryForm</Display>
-  <Edit>DocumentLibraryForm</Edit>
-  <New>DocumentLibraryForm</New>
-</FormTemplates>
-</file>
-
 <file path=customXml/item3.xml><?xml version="1.0" encoding="utf-8"?>
 <p:properties xmlns:p="http://schemas.microsoft.com/office/2006/metadata/properties" xmlns:xsi="http://www.w3.org/2001/XMLSchema-instance" xmlns:pc="http://schemas.microsoft.com/office/infopath/2007/PartnerControls">
   <documentManagement>
@@ -22326,6 +25088,14 @@
 </file>
 
 <file path=customXml/itemProps1.xml><?xml version="1.0" encoding="utf-8"?>
+<ds:datastoreItem xmlns:ds="http://schemas.openxmlformats.org/officeDocument/2006/customXml" ds:itemID="{4B903E96-C6E2-40D8-A3A3-05875AEE91EA}">
+  <ds:schemaRefs>
+    <ds:schemaRef ds:uri="http://schemas.microsoft.com/sharepoint/v3/contenttype/forms"/>
+  </ds:schemaRefs>
+</ds:datastoreItem>
+</file>
+
+<file path=customXml/itemProps2.xml><?xml version="1.0" encoding="utf-8"?>
 <ds:datastoreItem xmlns:ds="http://schemas.openxmlformats.org/officeDocument/2006/customXml" ds:itemID="{0A5081FA-6D35-4CCE-9A66-B873D5C98160}">
   <ds:schemaRefs>
     <ds:schemaRef ds:uri="http://schemas.microsoft.com/office/2006/metadata/contentType"/>
@@ -22344,27 +25114,19 @@
 </ds:datastoreItem>
 </file>
 
-<file path=customXml/itemProps2.xml><?xml version="1.0" encoding="utf-8"?>
-<ds:datastoreItem xmlns:ds="http://schemas.openxmlformats.org/officeDocument/2006/customXml" ds:itemID="{4B903E96-C6E2-40D8-A3A3-05875AEE91EA}">
-  <ds:schemaRefs>
-    <ds:schemaRef ds:uri="http://schemas.microsoft.com/sharepoint/v3/contenttype/forms"/>
-  </ds:schemaRefs>
-</ds:datastoreItem>
-</file>
-
 <file path=customXml/itemProps3.xml><?xml version="1.0" encoding="utf-8"?>
 <ds:datastoreItem xmlns:ds="http://schemas.openxmlformats.org/officeDocument/2006/customXml" ds:itemID="{C0E5B609-0234-4A99-86EA-1E109F589FEC}">
   <ds:schemaRefs>
+    <ds:schemaRef ds:uri="http://purl.org/dc/elements/1.1/"/>
+    <ds:schemaRef ds:uri="http://purl.org/dc/terms/"/>
+    <ds:schemaRef ds:uri="92c41bee-f0ee-4aa6-9399-a35fbb883510"/>
+    <ds:schemaRef ds:uri="http://www.w3.org/XML/1998/namespace"/>
+    <ds:schemaRef ds:uri="http://schemas.microsoft.com/office/2006/documentManagement/types"/>
     <ds:schemaRef ds:uri="http://schemas.microsoft.com/office/2006/metadata/properties"/>
-    <ds:schemaRef ds:uri="http://www.w3.org/XML/1998/namespace"/>
+    <ds:schemaRef ds:uri="http://purl.org/dc/dcmitype/"/>
+    <ds:schemaRef ds:uri="http://schemas.microsoft.com/office/infopath/2007/PartnerControls"/>
+    <ds:schemaRef ds:uri="http://schemas.openxmlformats.org/package/2006/metadata/core-properties"/>
     <ds:schemaRef ds:uri="e06ed288-fd75-4b50-bbed-f5a5df88c31c"/>
-    <ds:schemaRef ds:uri="http://schemas.openxmlformats.org/package/2006/metadata/core-properties"/>
-    <ds:schemaRef ds:uri="92c41bee-f0ee-4aa6-9399-a35fbb883510"/>
-    <ds:schemaRef ds:uri="http://schemas.microsoft.com/office/2006/documentManagement/types"/>
-    <ds:schemaRef ds:uri="http://purl.org/dc/terms/"/>
-    <ds:schemaRef ds:uri="http://schemas.microsoft.com/office/infopath/2007/PartnerControls"/>
-    <ds:schemaRef ds:uri="http://purl.org/dc/dcmitype/"/>
-    <ds:schemaRef ds:uri="http://purl.org/dc/elements/1.1/"/>
   </ds:schemaRefs>
 </ds:datastoreItem>
 </file>
</xml_diff>